<commit_message>
presentation game introducing divided to 3 parts
</commit_message>
<xml_diff>
--- a/others/presentation.pptx
+++ b/others/presentation.pptx
@@ -5,7 +5,7 @@
     <p:sldMasterId id="2147483648" r:id="rId1"/>
   </p:sldMasterIdLst>
   <p:notesMasterIdLst>
-    <p:notesMasterId r:id="rId16"/>
+    <p:notesMasterId r:id="rId18"/>
   </p:notesMasterIdLst>
   <p:sldIdLst>
     <p:sldId id="256" r:id="rId2"/>
@@ -15,13 +15,15 @@
     <p:sldId id="267" r:id="rId6"/>
     <p:sldId id="259" r:id="rId7"/>
     <p:sldId id="260" r:id="rId8"/>
-    <p:sldId id="261" r:id="rId9"/>
-    <p:sldId id="262" r:id="rId10"/>
-    <p:sldId id="263" r:id="rId11"/>
-    <p:sldId id="268" r:id="rId12"/>
-    <p:sldId id="264" r:id="rId13"/>
-    <p:sldId id="265" r:id="rId14"/>
-    <p:sldId id="266" r:id="rId15"/>
+    <p:sldId id="270" r:id="rId9"/>
+    <p:sldId id="271" r:id="rId10"/>
+    <p:sldId id="261" r:id="rId11"/>
+    <p:sldId id="262" r:id="rId12"/>
+    <p:sldId id="263" r:id="rId13"/>
+    <p:sldId id="268" r:id="rId14"/>
+    <p:sldId id="264" r:id="rId15"/>
+    <p:sldId id="265" r:id="rId16"/>
+    <p:sldId id="266" r:id="rId17"/>
   </p:sldIdLst>
   <p:sldSz cx="12192000" cy="6858000"/>
   <p:notesSz cx="6858000" cy="9144000"/>
@@ -3777,7 +3779,7 @@
           <p:cNvPr id="2" name="제목 1">
             <a:extLst>
               <a:ext uri="{FF2B5EF4-FFF2-40B4-BE49-F238E27FC236}">
-                <a16:creationId xmlns:a16="http://schemas.microsoft.com/office/drawing/2014/main" id="{DD9F7CD1-FBF3-45FE-AA6A-5CB21CF6D170}"/>
+                <a16:creationId xmlns:a16="http://schemas.microsoft.com/office/drawing/2014/main" id="{33EE91B0-5BCC-4566-9903-3AC5761D5596}"/>
               </a:ext>
             </a:extLst>
           </p:cNvPr>
@@ -3790,38 +3792,15 @@
         </p:nvSpPr>
         <p:spPr/>
         <p:txBody>
-          <a:bodyPr/>
+          <a:bodyPr>
+            <a:normAutofit fontScale="90000"/>
+          </a:bodyPr>
           <a:lstStyle/>
           <a:p>
             <a:r>
               <a:rPr lang="ko-KR" altLang="en-US" dirty="0"/>
-              <a:t>일정</a:t>
-            </a:r>
-          </a:p>
-        </p:txBody>
-      </p:sp>
-      <p:sp>
-        <p:nvSpPr>
-          <p:cNvPr id="5" name="텍스트 개체 틀 4">
-            <a:extLst>
-              <a:ext uri="{FF2B5EF4-FFF2-40B4-BE49-F238E27FC236}">
-                <a16:creationId xmlns:a16="http://schemas.microsoft.com/office/drawing/2014/main" id="{C6206F02-555F-4A78-83E4-289280B259BC}"/>
-              </a:ext>
-            </a:extLst>
-          </p:cNvPr>
-          <p:cNvSpPr>
-            <a:spLocks noGrp="1"/>
-          </p:cNvSpPr>
-          <p:nvPr>
-            <p:ph type="body" idx="1"/>
-          </p:nvPr>
-        </p:nvSpPr>
-        <p:spPr/>
-        <p:txBody>
-          <a:bodyPr/>
-          <a:lstStyle/>
-          <a:p>
-            <a:endParaRPr lang="ko-KR" altLang="en-US"/>
+              <a:t>프로그램 개요</a:t>
+            </a:r>
           </a:p>
         </p:txBody>
       </p:sp>
@@ -3830,7 +3809,7 @@
           <p:cNvPr id="4" name="슬라이드 번호 개체 틀 3">
             <a:extLst>
               <a:ext uri="{FF2B5EF4-FFF2-40B4-BE49-F238E27FC236}">
-                <a16:creationId xmlns:a16="http://schemas.microsoft.com/office/drawing/2014/main" id="{646E525D-DA28-4539-8871-8904DA14B0B4}"/>
+                <a16:creationId xmlns:a16="http://schemas.microsoft.com/office/drawing/2014/main" id="{DD254026-3AAF-4AB5-8CA9-4C98AD7E75CB}"/>
               </a:ext>
             </a:extLst>
           </p:cNvPr>
@@ -3849,1323 +3828,6 @@
             <a:fld id="{D74ECCE6-482B-4E3F-A4EE-5A2B5F793A19}" type="slidenum">
               <a:rPr lang="ko-KR" altLang="en-US" smtClean="0"/>
               <a:t>10</a:t>
-            </a:fld>
-            <a:endParaRPr lang="ko-KR" altLang="en-US"/>
-          </a:p>
-        </p:txBody>
-      </p:sp>
-    </p:spTree>
-    <p:extLst>
-      <p:ext uri="{BB962C8B-B14F-4D97-AF65-F5344CB8AC3E}">
-        <p14:creationId xmlns:p14="http://schemas.microsoft.com/office/powerpoint/2010/main" val="1601629160"/>
-      </p:ext>
-    </p:extLst>
-  </p:cSld>
-  <p:clrMapOvr>
-    <a:masterClrMapping/>
-  </p:clrMapOvr>
-</p:sld>
-</file>
-
-<file path=ppt/slides/slide11.xml><?xml version="1.0" encoding="utf-8"?>
-<p:sld xmlns:a="http://schemas.openxmlformats.org/drawingml/2006/main" xmlns:r="http://schemas.openxmlformats.org/officeDocument/2006/relationships" xmlns:p="http://schemas.openxmlformats.org/presentationml/2006/main">
-  <p:cSld>
-    <p:spTree>
-      <p:nvGrpSpPr>
-        <p:cNvPr id="1" name=""/>
-        <p:cNvGrpSpPr/>
-        <p:nvPr/>
-      </p:nvGrpSpPr>
-      <p:grpSpPr>
-        <a:xfrm>
-          <a:off x="0" y="0"/>
-          <a:ext cx="0" cy="0"/>
-          <a:chOff x="0" y="0"/>
-          <a:chExt cx="0" cy="0"/>
-        </a:xfrm>
-      </p:grpSpPr>
-      <p:sp>
-        <p:nvSpPr>
-          <p:cNvPr id="5" name="제목 4">
-            <a:extLst>
-              <a:ext uri="{FF2B5EF4-FFF2-40B4-BE49-F238E27FC236}">
-                <a16:creationId xmlns:a16="http://schemas.microsoft.com/office/drawing/2014/main" id="{0760860C-2517-4D92-951A-6A1C370339E6}"/>
-              </a:ext>
-            </a:extLst>
-          </p:cNvPr>
-          <p:cNvSpPr>
-            <a:spLocks noGrp="1"/>
-          </p:cNvSpPr>
-          <p:nvPr>
-            <p:ph type="title"/>
-          </p:nvPr>
-        </p:nvSpPr>
-        <p:spPr/>
-        <p:txBody>
-          <a:bodyPr>
-            <a:normAutofit fontScale="90000"/>
-          </a:bodyPr>
-          <a:lstStyle/>
-          <a:p>
-            <a:r>
-              <a:rPr lang="ko-KR" altLang="en-US" dirty="0"/>
-              <a:t>일정</a:t>
-            </a:r>
-          </a:p>
-        </p:txBody>
-      </p:sp>
-      <p:sp>
-        <p:nvSpPr>
-          <p:cNvPr id="4" name="슬라이드 번호 개체 틀 3">
-            <a:extLst>
-              <a:ext uri="{FF2B5EF4-FFF2-40B4-BE49-F238E27FC236}">
-                <a16:creationId xmlns:a16="http://schemas.microsoft.com/office/drawing/2014/main" id="{832C4B06-F407-42FF-816F-73ECCD8610C1}"/>
-              </a:ext>
-            </a:extLst>
-          </p:cNvPr>
-          <p:cNvSpPr>
-            <a:spLocks noGrp="1"/>
-          </p:cNvSpPr>
-          <p:nvPr>
-            <p:ph type="sldNum" sz="quarter" idx="12"/>
-          </p:nvPr>
-        </p:nvSpPr>
-        <p:spPr/>
-        <p:txBody>
-          <a:bodyPr/>
-          <a:lstStyle/>
-          <a:p>
-            <a:fld id="{D74ECCE6-482B-4E3F-A4EE-5A2B5F793A19}" type="slidenum">
-              <a:rPr lang="ko-KR" altLang="en-US" smtClean="0"/>
-              <a:t>11</a:t>
-            </a:fld>
-            <a:endParaRPr lang="ko-KR" altLang="en-US"/>
-          </a:p>
-        </p:txBody>
-      </p:sp>
-      <p:sp>
-        <p:nvSpPr>
-          <p:cNvPr id="6" name="텍스트 개체 틀 5">
-            <a:extLst>
-              <a:ext uri="{FF2B5EF4-FFF2-40B4-BE49-F238E27FC236}">
-                <a16:creationId xmlns:a16="http://schemas.microsoft.com/office/drawing/2014/main" id="{56EED388-EC91-4203-860D-2970B0226BC5}"/>
-              </a:ext>
-            </a:extLst>
-          </p:cNvPr>
-          <p:cNvSpPr>
-            <a:spLocks noGrp="1"/>
-          </p:cNvSpPr>
-          <p:nvPr>
-            <p:ph type="body" sz="quarter" idx="13"/>
-          </p:nvPr>
-        </p:nvSpPr>
-        <p:spPr/>
-        <p:txBody>
-          <a:bodyPr/>
-          <a:lstStyle/>
-          <a:p>
-            <a:endParaRPr lang="ko-KR" altLang="en-US"/>
-          </a:p>
-        </p:txBody>
-      </p:sp>
-    </p:spTree>
-    <p:extLst>
-      <p:ext uri="{BB962C8B-B14F-4D97-AF65-F5344CB8AC3E}">
-        <p14:creationId xmlns:p14="http://schemas.microsoft.com/office/powerpoint/2010/main" val="3619935219"/>
-      </p:ext>
-    </p:extLst>
-  </p:cSld>
-  <p:clrMapOvr>
-    <a:masterClrMapping/>
-  </p:clrMapOvr>
-</p:sld>
-</file>
-
-<file path=ppt/slides/slide12.xml><?xml version="1.0" encoding="utf-8"?>
-<p:sld xmlns:a="http://schemas.openxmlformats.org/drawingml/2006/main" xmlns:r="http://schemas.openxmlformats.org/officeDocument/2006/relationships" xmlns:p="http://schemas.openxmlformats.org/presentationml/2006/main">
-  <p:cSld>
-    <p:spTree>
-      <p:nvGrpSpPr>
-        <p:cNvPr id="1" name=""/>
-        <p:cNvGrpSpPr/>
-        <p:nvPr/>
-      </p:nvGrpSpPr>
-      <p:grpSpPr>
-        <a:xfrm>
-          <a:off x="0" y="0"/>
-          <a:ext cx="0" cy="0"/>
-          <a:chOff x="0" y="0"/>
-          <a:chExt cx="0" cy="0"/>
-        </a:xfrm>
-      </p:grpSpPr>
-      <p:sp>
-        <p:nvSpPr>
-          <p:cNvPr id="2" name="제목 1">
-            <a:extLst>
-              <a:ext uri="{FF2B5EF4-FFF2-40B4-BE49-F238E27FC236}">
-                <a16:creationId xmlns:a16="http://schemas.microsoft.com/office/drawing/2014/main" id="{49D47D17-BE2B-4CC8-8B7D-BAC586CAC626}"/>
-              </a:ext>
-            </a:extLst>
-          </p:cNvPr>
-          <p:cNvSpPr>
-            <a:spLocks noGrp="1"/>
-          </p:cNvSpPr>
-          <p:nvPr>
-            <p:ph type="title"/>
-          </p:nvPr>
-        </p:nvSpPr>
-        <p:spPr/>
-        <p:txBody>
-          <a:bodyPr/>
-          <a:lstStyle/>
-          <a:p>
-            <a:r>
-              <a:rPr lang="ko-KR" altLang="en-US" dirty="0"/>
-              <a:t>시연</a:t>
-            </a:r>
-          </a:p>
-        </p:txBody>
-      </p:sp>
-      <p:sp>
-        <p:nvSpPr>
-          <p:cNvPr id="3" name="텍스트 개체 틀 2">
-            <a:extLst>
-              <a:ext uri="{FF2B5EF4-FFF2-40B4-BE49-F238E27FC236}">
-                <a16:creationId xmlns:a16="http://schemas.microsoft.com/office/drawing/2014/main" id="{AB416C76-8ABE-48F8-A598-F09F6A1F311B}"/>
-              </a:ext>
-            </a:extLst>
-          </p:cNvPr>
-          <p:cNvSpPr>
-            <a:spLocks noGrp="1"/>
-          </p:cNvSpPr>
-          <p:nvPr>
-            <p:ph type="body" idx="1"/>
-          </p:nvPr>
-        </p:nvSpPr>
-        <p:spPr/>
-        <p:txBody>
-          <a:bodyPr/>
-          <a:lstStyle/>
-          <a:p>
-            <a:endParaRPr lang="ko-KR" altLang="en-US"/>
-          </a:p>
-        </p:txBody>
-      </p:sp>
-      <p:sp>
-        <p:nvSpPr>
-          <p:cNvPr id="4" name="슬라이드 번호 개체 틀 3">
-            <a:extLst>
-              <a:ext uri="{FF2B5EF4-FFF2-40B4-BE49-F238E27FC236}">
-                <a16:creationId xmlns:a16="http://schemas.microsoft.com/office/drawing/2014/main" id="{974F7345-C186-4EBC-ACD7-22B505F29B8C}"/>
-              </a:ext>
-            </a:extLst>
-          </p:cNvPr>
-          <p:cNvSpPr>
-            <a:spLocks noGrp="1"/>
-          </p:cNvSpPr>
-          <p:nvPr>
-            <p:ph type="sldNum" sz="quarter" idx="12"/>
-          </p:nvPr>
-        </p:nvSpPr>
-        <p:spPr/>
-        <p:txBody>
-          <a:bodyPr/>
-          <a:lstStyle/>
-          <a:p>
-            <a:fld id="{D74ECCE6-482B-4E3F-A4EE-5A2B5F793A19}" type="slidenum">
-              <a:rPr lang="ko-KR" altLang="en-US" smtClean="0"/>
-              <a:t>12</a:t>
-            </a:fld>
-            <a:endParaRPr lang="ko-KR" altLang="en-US"/>
-          </a:p>
-        </p:txBody>
-      </p:sp>
-    </p:spTree>
-    <p:extLst>
-      <p:ext uri="{BB962C8B-B14F-4D97-AF65-F5344CB8AC3E}">
-        <p14:creationId xmlns:p14="http://schemas.microsoft.com/office/powerpoint/2010/main" val="3827647575"/>
-      </p:ext>
-    </p:extLst>
-  </p:cSld>
-  <p:clrMapOvr>
-    <a:masterClrMapping/>
-  </p:clrMapOvr>
-</p:sld>
-</file>
-
-<file path=ppt/slides/slide13.xml><?xml version="1.0" encoding="utf-8"?>
-<p:sld xmlns:a="http://schemas.openxmlformats.org/drawingml/2006/main" xmlns:r="http://schemas.openxmlformats.org/officeDocument/2006/relationships" xmlns:p="http://schemas.openxmlformats.org/presentationml/2006/main">
-  <p:cSld>
-    <p:spTree>
-      <p:nvGrpSpPr>
-        <p:cNvPr id="1" name=""/>
-        <p:cNvGrpSpPr/>
-        <p:nvPr/>
-      </p:nvGrpSpPr>
-      <p:grpSpPr>
-        <a:xfrm>
-          <a:off x="0" y="0"/>
-          <a:ext cx="0" cy="0"/>
-          <a:chOff x="0" y="0"/>
-          <a:chExt cx="0" cy="0"/>
-        </a:xfrm>
-      </p:grpSpPr>
-      <p:sp>
-        <p:nvSpPr>
-          <p:cNvPr id="2" name="제목 1">
-            <a:extLst>
-              <a:ext uri="{FF2B5EF4-FFF2-40B4-BE49-F238E27FC236}">
-                <a16:creationId xmlns:a16="http://schemas.microsoft.com/office/drawing/2014/main" id="{5F865E60-EE87-4130-AFD0-4408F48F6F13}"/>
-              </a:ext>
-            </a:extLst>
-          </p:cNvPr>
-          <p:cNvSpPr>
-            <a:spLocks noGrp="1"/>
-          </p:cNvSpPr>
-          <p:nvPr>
-            <p:ph type="ctrTitle"/>
-          </p:nvPr>
-        </p:nvSpPr>
-        <p:spPr/>
-        <p:txBody>
-          <a:bodyPr/>
-          <a:lstStyle/>
-          <a:p>
-            <a:r>
-              <a:rPr lang="en-US" altLang="ko-KR" dirty="0" err="1"/>
-              <a:t>QnA</a:t>
-            </a:r>
-            <a:endParaRPr lang="ko-KR" altLang="en-US" dirty="0"/>
-          </a:p>
-        </p:txBody>
-      </p:sp>
-      <p:sp>
-        <p:nvSpPr>
-          <p:cNvPr id="5" name="부제목 4">
-            <a:extLst>
-              <a:ext uri="{FF2B5EF4-FFF2-40B4-BE49-F238E27FC236}">
-                <a16:creationId xmlns:a16="http://schemas.microsoft.com/office/drawing/2014/main" id="{CC4FBDDD-B840-46AF-9EC6-01D0C36536B5}"/>
-              </a:ext>
-            </a:extLst>
-          </p:cNvPr>
-          <p:cNvSpPr>
-            <a:spLocks noGrp="1"/>
-          </p:cNvSpPr>
-          <p:nvPr>
-            <p:ph type="subTitle" idx="1"/>
-          </p:nvPr>
-        </p:nvSpPr>
-        <p:spPr/>
-        <p:txBody>
-          <a:bodyPr/>
-          <a:lstStyle/>
-          <a:p>
-            <a:endParaRPr lang="ko-KR" altLang="en-US"/>
-          </a:p>
-        </p:txBody>
-      </p:sp>
-      <p:sp>
-        <p:nvSpPr>
-          <p:cNvPr id="4" name="슬라이드 번호 개체 틀 3">
-            <a:extLst>
-              <a:ext uri="{FF2B5EF4-FFF2-40B4-BE49-F238E27FC236}">
-                <a16:creationId xmlns:a16="http://schemas.microsoft.com/office/drawing/2014/main" id="{F47744C0-1AA0-4A12-924F-F86DBD15EEB6}"/>
-              </a:ext>
-            </a:extLst>
-          </p:cNvPr>
-          <p:cNvSpPr>
-            <a:spLocks noGrp="1"/>
-          </p:cNvSpPr>
-          <p:nvPr>
-            <p:ph type="sldNum" sz="quarter" idx="12"/>
-          </p:nvPr>
-        </p:nvSpPr>
-        <p:spPr/>
-        <p:txBody>
-          <a:bodyPr/>
-          <a:lstStyle/>
-          <a:p>
-            <a:fld id="{D74ECCE6-482B-4E3F-A4EE-5A2B5F793A19}" type="slidenum">
-              <a:rPr lang="ko-KR" altLang="en-US" smtClean="0"/>
-              <a:t>13</a:t>
-            </a:fld>
-            <a:endParaRPr lang="ko-KR" altLang="en-US"/>
-          </a:p>
-        </p:txBody>
-      </p:sp>
-    </p:spTree>
-    <p:extLst>
-      <p:ext uri="{BB962C8B-B14F-4D97-AF65-F5344CB8AC3E}">
-        <p14:creationId xmlns:p14="http://schemas.microsoft.com/office/powerpoint/2010/main" val="3306686152"/>
-      </p:ext>
-    </p:extLst>
-  </p:cSld>
-  <p:clrMapOvr>
-    <a:masterClrMapping/>
-  </p:clrMapOvr>
-</p:sld>
-</file>
-
-<file path=ppt/slides/slide14.xml><?xml version="1.0" encoding="utf-8"?>
-<p:sld xmlns:a="http://schemas.openxmlformats.org/drawingml/2006/main" xmlns:r="http://schemas.openxmlformats.org/officeDocument/2006/relationships" xmlns:p="http://schemas.openxmlformats.org/presentationml/2006/main">
-  <p:cSld>
-    <p:spTree>
-      <p:nvGrpSpPr>
-        <p:cNvPr id="1" name=""/>
-        <p:cNvGrpSpPr/>
-        <p:nvPr/>
-      </p:nvGrpSpPr>
-      <p:grpSpPr>
-        <a:xfrm>
-          <a:off x="0" y="0"/>
-          <a:ext cx="0" cy="0"/>
-          <a:chOff x="0" y="0"/>
-          <a:chExt cx="0" cy="0"/>
-        </a:xfrm>
-      </p:grpSpPr>
-      <p:sp>
-        <p:nvSpPr>
-          <p:cNvPr id="2" name="제목 1">
-            <a:extLst>
-              <a:ext uri="{FF2B5EF4-FFF2-40B4-BE49-F238E27FC236}">
-                <a16:creationId xmlns:a16="http://schemas.microsoft.com/office/drawing/2014/main" id="{5C86C485-EF0A-455D-B1B9-8B1BA21A4C34}"/>
-              </a:ext>
-            </a:extLst>
-          </p:cNvPr>
-          <p:cNvSpPr>
-            <a:spLocks noGrp="1"/>
-          </p:cNvSpPr>
-          <p:nvPr>
-            <p:ph type="ctrTitle"/>
-          </p:nvPr>
-        </p:nvSpPr>
-        <p:spPr/>
-        <p:txBody>
-          <a:bodyPr/>
-          <a:lstStyle/>
-          <a:p>
-            <a:r>
-              <a:rPr lang="ko-KR" altLang="en-US" dirty="0"/>
-              <a:t>감사합니다</a:t>
-            </a:r>
-          </a:p>
-        </p:txBody>
-      </p:sp>
-      <p:sp>
-        <p:nvSpPr>
-          <p:cNvPr id="5" name="부제목 4">
-            <a:extLst>
-              <a:ext uri="{FF2B5EF4-FFF2-40B4-BE49-F238E27FC236}">
-                <a16:creationId xmlns:a16="http://schemas.microsoft.com/office/drawing/2014/main" id="{11AC2380-A42C-4414-9F89-7E6E7C4EB47C}"/>
-              </a:ext>
-            </a:extLst>
-          </p:cNvPr>
-          <p:cNvSpPr>
-            <a:spLocks noGrp="1"/>
-          </p:cNvSpPr>
-          <p:nvPr>
-            <p:ph type="subTitle" idx="1"/>
-          </p:nvPr>
-        </p:nvSpPr>
-        <p:spPr/>
-        <p:txBody>
-          <a:bodyPr/>
-          <a:lstStyle/>
-          <a:p>
-            <a:endParaRPr lang="ko-KR" altLang="en-US"/>
-          </a:p>
-        </p:txBody>
-      </p:sp>
-      <p:sp>
-        <p:nvSpPr>
-          <p:cNvPr id="4" name="슬라이드 번호 개체 틀 3">
-            <a:extLst>
-              <a:ext uri="{FF2B5EF4-FFF2-40B4-BE49-F238E27FC236}">
-                <a16:creationId xmlns:a16="http://schemas.microsoft.com/office/drawing/2014/main" id="{77231C97-BFE7-43C5-820C-FF8BA3E36A98}"/>
-              </a:ext>
-            </a:extLst>
-          </p:cNvPr>
-          <p:cNvSpPr>
-            <a:spLocks noGrp="1"/>
-          </p:cNvSpPr>
-          <p:nvPr>
-            <p:ph type="sldNum" sz="quarter" idx="12"/>
-          </p:nvPr>
-        </p:nvSpPr>
-        <p:spPr/>
-        <p:txBody>
-          <a:bodyPr/>
-          <a:lstStyle/>
-          <a:p>
-            <a:fld id="{D74ECCE6-482B-4E3F-A4EE-5A2B5F793A19}" type="slidenum">
-              <a:rPr lang="ko-KR" altLang="en-US" smtClean="0"/>
-              <a:t>14</a:t>
-            </a:fld>
-            <a:endParaRPr lang="ko-KR" altLang="en-US"/>
-          </a:p>
-        </p:txBody>
-      </p:sp>
-    </p:spTree>
-    <p:extLst>
-      <p:ext uri="{BB962C8B-B14F-4D97-AF65-F5344CB8AC3E}">
-        <p14:creationId xmlns:p14="http://schemas.microsoft.com/office/powerpoint/2010/main" val="3791566108"/>
-      </p:ext>
-    </p:extLst>
-  </p:cSld>
-  <p:clrMapOvr>
-    <a:masterClrMapping/>
-  </p:clrMapOvr>
-</p:sld>
-</file>
-
-<file path=ppt/slides/slide2.xml><?xml version="1.0" encoding="utf-8"?>
-<p:sld xmlns:a="http://schemas.openxmlformats.org/drawingml/2006/main" xmlns:r="http://schemas.openxmlformats.org/officeDocument/2006/relationships" xmlns:p="http://schemas.openxmlformats.org/presentationml/2006/main">
-  <p:cSld>
-    <p:spTree>
-      <p:nvGrpSpPr>
-        <p:cNvPr id="1" name=""/>
-        <p:cNvGrpSpPr/>
-        <p:nvPr/>
-      </p:nvGrpSpPr>
-      <p:grpSpPr>
-        <a:xfrm>
-          <a:off x="0" y="0"/>
-          <a:ext cx="0" cy="0"/>
-          <a:chOff x="0" y="0"/>
-          <a:chExt cx="0" cy="0"/>
-        </a:xfrm>
-      </p:grpSpPr>
-      <p:sp>
-        <p:nvSpPr>
-          <p:cNvPr id="2" name="제목 1">
-            <a:extLst>
-              <a:ext uri="{FF2B5EF4-FFF2-40B4-BE49-F238E27FC236}">
-                <a16:creationId xmlns:a16="http://schemas.microsoft.com/office/drawing/2014/main" id="{9B307B50-AFCE-4EFE-BF30-FE9BE4CCF505}"/>
-              </a:ext>
-            </a:extLst>
-          </p:cNvPr>
-          <p:cNvSpPr>
-            <a:spLocks noGrp="1"/>
-          </p:cNvSpPr>
-          <p:nvPr>
-            <p:ph type="title"/>
-          </p:nvPr>
-        </p:nvSpPr>
-        <p:spPr/>
-        <p:txBody>
-          <a:bodyPr/>
-          <a:lstStyle/>
-          <a:p>
-            <a:r>
-              <a:rPr lang="ko-KR" altLang="en-US" dirty="0"/>
-              <a:t>목차</a:t>
-            </a:r>
-          </a:p>
-        </p:txBody>
-      </p:sp>
-      <p:sp>
-        <p:nvSpPr>
-          <p:cNvPr id="3" name="내용 개체 틀 2">
-            <a:extLst>
-              <a:ext uri="{FF2B5EF4-FFF2-40B4-BE49-F238E27FC236}">
-                <a16:creationId xmlns:a16="http://schemas.microsoft.com/office/drawing/2014/main" id="{7F400C1E-17E0-4C94-B584-0424CA04616C}"/>
-              </a:ext>
-            </a:extLst>
-          </p:cNvPr>
-          <p:cNvSpPr>
-            <a:spLocks noGrp="1"/>
-          </p:cNvSpPr>
-          <p:nvPr>
-            <p:ph idx="1"/>
-          </p:nvPr>
-        </p:nvSpPr>
-        <p:spPr/>
-        <p:txBody>
-          <a:bodyPr/>
-          <a:lstStyle/>
-          <a:p>
-            <a:r>
-              <a:rPr lang="ko-KR" altLang="en-US" dirty="0"/>
-              <a:t>동기</a:t>
-            </a:r>
-            <a:endParaRPr lang="en-US" altLang="ko-KR" dirty="0"/>
-          </a:p>
-          <a:p>
-            <a:r>
-              <a:rPr lang="ko-KR" altLang="en-US" dirty="0"/>
-              <a:t>프로그램 개요</a:t>
-            </a:r>
-            <a:endParaRPr lang="en-US" altLang="ko-KR" dirty="0"/>
-          </a:p>
-          <a:p>
-            <a:r>
-              <a:rPr lang="ko-KR" altLang="en-US" dirty="0"/>
-              <a:t>순서도</a:t>
-            </a:r>
-            <a:r>
-              <a:rPr lang="en-US" altLang="ko-KR" dirty="0"/>
-              <a:t>(?)</a:t>
-            </a:r>
-          </a:p>
-          <a:p>
-            <a:r>
-              <a:rPr lang="ko-KR" altLang="en-US" dirty="0"/>
-              <a:t>일정</a:t>
-            </a:r>
-            <a:endParaRPr lang="en-US" altLang="ko-KR" dirty="0"/>
-          </a:p>
-          <a:p>
-            <a:r>
-              <a:rPr lang="ko-KR" altLang="en-US" dirty="0"/>
-              <a:t>시연</a:t>
-            </a:r>
-            <a:endParaRPr lang="en-US" altLang="ko-KR" dirty="0"/>
-          </a:p>
-          <a:p>
-            <a:endParaRPr lang="en-US" altLang="ko-KR" dirty="0"/>
-          </a:p>
-          <a:p>
-            <a:endParaRPr lang="ko-KR" altLang="en-US" dirty="0"/>
-          </a:p>
-        </p:txBody>
-      </p:sp>
-      <p:sp>
-        <p:nvSpPr>
-          <p:cNvPr id="4" name="슬라이드 번호 개체 틀 3">
-            <a:extLst>
-              <a:ext uri="{FF2B5EF4-FFF2-40B4-BE49-F238E27FC236}">
-                <a16:creationId xmlns:a16="http://schemas.microsoft.com/office/drawing/2014/main" id="{924562C3-AB7C-42E4-B4B5-C299866C7D2A}"/>
-              </a:ext>
-            </a:extLst>
-          </p:cNvPr>
-          <p:cNvSpPr>
-            <a:spLocks noGrp="1"/>
-          </p:cNvSpPr>
-          <p:nvPr>
-            <p:ph type="sldNum" sz="quarter" idx="12"/>
-          </p:nvPr>
-        </p:nvSpPr>
-        <p:spPr/>
-        <p:txBody>
-          <a:bodyPr/>
-          <a:lstStyle/>
-          <a:p>
-            <a:fld id="{D74ECCE6-482B-4E3F-A4EE-5A2B5F793A19}" type="slidenum">
-              <a:rPr lang="ko-KR" altLang="en-US" smtClean="0"/>
-              <a:t>2</a:t>
-            </a:fld>
-            <a:endParaRPr lang="ko-KR" altLang="en-US"/>
-          </a:p>
-        </p:txBody>
-      </p:sp>
-    </p:spTree>
-    <p:extLst>
-      <p:ext uri="{BB962C8B-B14F-4D97-AF65-F5344CB8AC3E}">
-        <p14:creationId xmlns:p14="http://schemas.microsoft.com/office/powerpoint/2010/main" val="589209927"/>
-      </p:ext>
-    </p:extLst>
-  </p:cSld>
-  <p:clrMapOvr>
-    <a:masterClrMapping/>
-  </p:clrMapOvr>
-</p:sld>
-</file>
-
-<file path=ppt/slides/slide3.xml><?xml version="1.0" encoding="utf-8"?>
-<p:sld xmlns:a="http://schemas.openxmlformats.org/drawingml/2006/main" xmlns:r="http://schemas.openxmlformats.org/officeDocument/2006/relationships" xmlns:p="http://schemas.openxmlformats.org/presentationml/2006/main">
-  <p:cSld>
-    <p:spTree>
-      <p:nvGrpSpPr>
-        <p:cNvPr id="1" name=""/>
-        <p:cNvGrpSpPr/>
-        <p:nvPr/>
-      </p:nvGrpSpPr>
-      <p:grpSpPr>
-        <a:xfrm>
-          <a:off x="0" y="0"/>
-          <a:ext cx="0" cy="0"/>
-          <a:chOff x="0" y="0"/>
-          <a:chExt cx="0" cy="0"/>
-        </a:xfrm>
-      </p:grpSpPr>
-      <p:sp>
-        <p:nvSpPr>
-          <p:cNvPr id="2" name="제목 1">
-            <a:extLst>
-              <a:ext uri="{FF2B5EF4-FFF2-40B4-BE49-F238E27FC236}">
-                <a16:creationId xmlns:a16="http://schemas.microsoft.com/office/drawing/2014/main" id="{726EA825-3053-4BB1-A4DD-7E4D23F91AA2}"/>
-              </a:ext>
-            </a:extLst>
-          </p:cNvPr>
-          <p:cNvSpPr>
-            <a:spLocks noGrp="1"/>
-          </p:cNvSpPr>
-          <p:nvPr>
-            <p:ph type="title"/>
-          </p:nvPr>
-        </p:nvSpPr>
-        <p:spPr/>
-        <p:txBody>
-          <a:bodyPr/>
-          <a:lstStyle/>
-          <a:p>
-            <a:r>
-              <a:rPr lang="ko-KR" altLang="en-US" dirty="0"/>
-              <a:t>동기</a:t>
-            </a:r>
-          </a:p>
-        </p:txBody>
-      </p:sp>
-      <p:sp>
-        <p:nvSpPr>
-          <p:cNvPr id="5" name="텍스트 개체 틀 4">
-            <a:extLst>
-              <a:ext uri="{FF2B5EF4-FFF2-40B4-BE49-F238E27FC236}">
-                <a16:creationId xmlns:a16="http://schemas.microsoft.com/office/drawing/2014/main" id="{9371C56F-0EA2-479C-B271-E4ECF656501C}"/>
-              </a:ext>
-            </a:extLst>
-          </p:cNvPr>
-          <p:cNvSpPr>
-            <a:spLocks noGrp="1"/>
-          </p:cNvSpPr>
-          <p:nvPr>
-            <p:ph type="body" idx="1"/>
-          </p:nvPr>
-        </p:nvSpPr>
-        <p:spPr/>
-        <p:txBody>
-          <a:bodyPr/>
-          <a:lstStyle/>
-          <a:p>
-            <a:endParaRPr lang="ko-KR" altLang="en-US"/>
-          </a:p>
-        </p:txBody>
-      </p:sp>
-      <p:sp>
-        <p:nvSpPr>
-          <p:cNvPr id="4" name="슬라이드 번호 개체 틀 3">
-            <a:extLst>
-              <a:ext uri="{FF2B5EF4-FFF2-40B4-BE49-F238E27FC236}">
-                <a16:creationId xmlns:a16="http://schemas.microsoft.com/office/drawing/2014/main" id="{55E3A155-78B4-439F-AF18-2D06E0AD5CB8}"/>
-              </a:ext>
-            </a:extLst>
-          </p:cNvPr>
-          <p:cNvSpPr>
-            <a:spLocks noGrp="1"/>
-          </p:cNvSpPr>
-          <p:nvPr>
-            <p:ph type="sldNum" sz="quarter" idx="12"/>
-          </p:nvPr>
-        </p:nvSpPr>
-        <p:spPr/>
-        <p:txBody>
-          <a:bodyPr/>
-          <a:lstStyle/>
-          <a:p>
-            <a:fld id="{D74ECCE6-482B-4E3F-A4EE-5A2B5F793A19}" type="slidenum">
-              <a:rPr lang="ko-KR" altLang="en-US" smtClean="0"/>
-              <a:t>3</a:t>
-            </a:fld>
-            <a:endParaRPr lang="ko-KR" altLang="en-US"/>
-          </a:p>
-        </p:txBody>
-      </p:sp>
-    </p:spTree>
-    <p:extLst>
-      <p:ext uri="{BB962C8B-B14F-4D97-AF65-F5344CB8AC3E}">
-        <p14:creationId xmlns:p14="http://schemas.microsoft.com/office/powerpoint/2010/main" val="1110084134"/>
-      </p:ext>
-    </p:extLst>
-  </p:cSld>
-  <p:clrMapOvr>
-    <a:masterClrMapping/>
-  </p:clrMapOvr>
-</p:sld>
-</file>
-
-<file path=ppt/slides/slide4.xml><?xml version="1.0" encoding="utf-8"?>
-<p:sld xmlns:a="http://schemas.openxmlformats.org/drawingml/2006/main" xmlns:r="http://schemas.openxmlformats.org/officeDocument/2006/relationships" xmlns:p="http://schemas.openxmlformats.org/presentationml/2006/main">
-  <p:cSld>
-    <p:spTree>
-      <p:nvGrpSpPr>
-        <p:cNvPr id="1" name=""/>
-        <p:cNvGrpSpPr/>
-        <p:nvPr/>
-      </p:nvGrpSpPr>
-      <p:grpSpPr>
-        <a:xfrm>
-          <a:off x="0" y="0"/>
-          <a:ext cx="0" cy="0"/>
-          <a:chOff x="0" y="0"/>
-          <a:chExt cx="0" cy="0"/>
-        </a:xfrm>
-      </p:grpSpPr>
-      <p:sp>
-        <p:nvSpPr>
-          <p:cNvPr id="5" name="제목 4">
-            <a:extLst>
-              <a:ext uri="{FF2B5EF4-FFF2-40B4-BE49-F238E27FC236}">
-                <a16:creationId xmlns:a16="http://schemas.microsoft.com/office/drawing/2014/main" id="{42F40077-90A9-43AE-85B1-66BF6460383D}"/>
-              </a:ext>
-            </a:extLst>
-          </p:cNvPr>
-          <p:cNvSpPr>
-            <a:spLocks noGrp="1"/>
-          </p:cNvSpPr>
-          <p:nvPr>
-            <p:ph type="title"/>
-          </p:nvPr>
-        </p:nvSpPr>
-        <p:spPr/>
-        <p:txBody>
-          <a:bodyPr>
-            <a:normAutofit fontScale="90000"/>
-          </a:bodyPr>
-          <a:lstStyle/>
-          <a:p>
-            <a:r>
-              <a:rPr lang="ko-KR" altLang="en-US" dirty="0"/>
-              <a:t>동기</a:t>
-            </a:r>
-          </a:p>
-        </p:txBody>
-      </p:sp>
-      <p:sp>
-        <p:nvSpPr>
-          <p:cNvPr id="4" name="슬라이드 번호 개체 틀 3">
-            <a:extLst>
-              <a:ext uri="{FF2B5EF4-FFF2-40B4-BE49-F238E27FC236}">
-                <a16:creationId xmlns:a16="http://schemas.microsoft.com/office/drawing/2014/main" id="{0528BB13-2A83-4D15-B800-1DB639DF9713}"/>
-              </a:ext>
-            </a:extLst>
-          </p:cNvPr>
-          <p:cNvSpPr>
-            <a:spLocks noGrp="1"/>
-          </p:cNvSpPr>
-          <p:nvPr>
-            <p:ph type="sldNum" sz="quarter" idx="12"/>
-          </p:nvPr>
-        </p:nvSpPr>
-        <p:spPr/>
-        <p:txBody>
-          <a:bodyPr/>
-          <a:lstStyle/>
-          <a:p>
-            <a:fld id="{D74ECCE6-482B-4E3F-A4EE-5A2B5F793A19}" type="slidenum">
-              <a:rPr lang="ko-KR" altLang="en-US" smtClean="0"/>
-              <a:t>4</a:t>
-            </a:fld>
-            <a:endParaRPr lang="ko-KR" altLang="en-US"/>
-          </a:p>
-        </p:txBody>
-      </p:sp>
-      <p:sp>
-        <p:nvSpPr>
-          <p:cNvPr id="6" name="텍스트 개체 틀 5">
-            <a:extLst>
-              <a:ext uri="{FF2B5EF4-FFF2-40B4-BE49-F238E27FC236}">
-                <a16:creationId xmlns:a16="http://schemas.microsoft.com/office/drawing/2014/main" id="{434A8414-5F70-4176-9C67-F599FEAF37C7}"/>
-              </a:ext>
-            </a:extLst>
-          </p:cNvPr>
-          <p:cNvSpPr>
-            <a:spLocks noGrp="1"/>
-          </p:cNvSpPr>
-          <p:nvPr>
-            <p:ph type="body" sz="quarter" idx="13"/>
-          </p:nvPr>
-        </p:nvSpPr>
-        <p:spPr/>
-        <p:txBody>
-          <a:bodyPr/>
-          <a:lstStyle/>
-          <a:p>
-            <a:endParaRPr lang="ko-KR" altLang="en-US" dirty="0"/>
-          </a:p>
-        </p:txBody>
-      </p:sp>
-    </p:spTree>
-    <p:extLst>
-      <p:ext uri="{BB962C8B-B14F-4D97-AF65-F5344CB8AC3E}">
-        <p14:creationId xmlns:p14="http://schemas.microsoft.com/office/powerpoint/2010/main" val="2820595356"/>
-      </p:ext>
-    </p:extLst>
-  </p:cSld>
-  <p:clrMapOvr>
-    <a:masterClrMapping/>
-  </p:clrMapOvr>
-</p:sld>
-</file>
-
-<file path=ppt/slides/slide5.xml><?xml version="1.0" encoding="utf-8"?>
-<p:sld xmlns:a="http://schemas.openxmlformats.org/drawingml/2006/main" xmlns:r="http://schemas.openxmlformats.org/officeDocument/2006/relationships" xmlns:p="http://schemas.openxmlformats.org/presentationml/2006/main">
-  <p:cSld>
-    <p:spTree>
-      <p:nvGrpSpPr>
-        <p:cNvPr id="1" name=""/>
-        <p:cNvGrpSpPr/>
-        <p:nvPr/>
-      </p:nvGrpSpPr>
-      <p:grpSpPr>
-        <a:xfrm>
-          <a:off x="0" y="0"/>
-          <a:ext cx="0" cy="0"/>
-          <a:chOff x="0" y="0"/>
-          <a:chExt cx="0" cy="0"/>
-        </a:xfrm>
-      </p:grpSpPr>
-      <p:sp>
-        <p:nvSpPr>
-          <p:cNvPr id="2" name="제목 1">
-            <a:extLst>
-              <a:ext uri="{FF2B5EF4-FFF2-40B4-BE49-F238E27FC236}">
-                <a16:creationId xmlns:a16="http://schemas.microsoft.com/office/drawing/2014/main" id="{726EA825-3053-4BB1-A4DD-7E4D23F91AA2}"/>
-              </a:ext>
-            </a:extLst>
-          </p:cNvPr>
-          <p:cNvSpPr>
-            <a:spLocks noGrp="1"/>
-          </p:cNvSpPr>
-          <p:nvPr>
-            <p:ph type="title"/>
-          </p:nvPr>
-        </p:nvSpPr>
-        <p:spPr/>
-        <p:txBody>
-          <a:bodyPr/>
-          <a:lstStyle/>
-          <a:p>
-            <a:r>
-              <a:rPr lang="ko-KR" altLang="en-US" dirty="0"/>
-              <a:t>프로그램 개요</a:t>
-            </a:r>
-          </a:p>
-        </p:txBody>
-      </p:sp>
-      <p:sp>
-        <p:nvSpPr>
-          <p:cNvPr id="5" name="텍스트 개체 틀 4">
-            <a:extLst>
-              <a:ext uri="{FF2B5EF4-FFF2-40B4-BE49-F238E27FC236}">
-                <a16:creationId xmlns:a16="http://schemas.microsoft.com/office/drawing/2014/main" id="{59475BC8-9E84-447B-BB2C-33A73FF61442}"/>
-              </a:ext>
-            </a:extLst>
-          </p:cNvPr>
-          <p:cNvSpPr>
-            <a:spLocks noGrp="1"/>
-          </p:cNvSpPr>
-          <p:nvPr>
-            <p:ph type="body" idx="1"/>
-          </p:nvPr>
-        </p:nvSpPr>
-        <p:spPr/>
-        <p:txBody>
-          <a:bodyPr/>
-          <a:lstStyle/>
-          <a:p>
-            <a:endParaRPr lang="ko-KR" altLang="en-US"/>
-          </a:p>
-        </p:txBody>
-      </p:sp>
-      <p:sp>
-        <p:nvSpPr>
-          <p:cNvPr id="4" name="슬라이드 번호 개체 틀 3">
-            <a:extLst>
-              <a:ext uri="{FF2B5EF4-FFF2-40B4-BE49-F238E27FC236}">
-                <a16:creationId xmlns:a16="http://schemas.microsoft.com/office/drawing/2014/main" id="{55E3A155-78B4-439F-AF18-2D06E0AD5CB8}"/>
-              </a:ext>
-            </a:extLst>
-          </p:cNvPr>
-          <p:cNvSpPr>
-            <a:spLocks noGrp="1"/>
-          </p:cNvSpPr>
-          <p:nvPr>
-            <p:ph type="sldNum" sz="quarter" idx="12"/>
-          </p:nvPr>
-        </p:nvSpPr>
-        <p:spPr/>
-        <p:txBody>
-          <a:bodyPr/>
-          <a:lstStyle/>
-          <a:p>
-            <a:fld id="{D74ECCE6-482B-4E3F-A4EE-5A2B5F793A19}" type="slidenum">
-              <a:rPr lang="ko-KR" altLang="en-US" smtClean="0"/>
-              <a:t>5</a:t>
-            </a:fld>
-            <a:endParaRPr lang="ko-KR" altLang="en-US"/>
-          </a:p>
-        </p:txBody>
-      </p:sp>
-    </p:spTree>
-    <p:extLst>
-      <p:ext uri="{BB962C8B-B14F-4D97-AF65-F5344CB8AC3E}">
-        <p14:creationId xmlns:p14="http://schemas.microsoft.com/office/powerpoint/2010/main" val="777200461"/>
-      </p:ext>
-    </p:extLst>
-  </p:cSld>
-  <p:clrMapOvr>
-    <a:masterClrMapping/>
-  </p:clrMapOvr>
-</p:sld>
-</file>
-
-<file path=ppt/slides/slide6.xml><?xml version="1.0" encoding="utf-8"?>
-<p:sld xmlns:a="http://schemas.openxmlformats.org/drawingml/2006/main" xmlns:r="http://schemas.openxmlformats.org/officeDocument/2006/relationships" xmlns:p="http://schemas.openxmlformats.org/presentationml/2006/main">
-  <p:cSld>
-    <p:spTree>
-      <p:nvGrpSpPr>
-        <p:cNvPr id="1" name=""/>
-        <p:cNvGrpSpPr/>
-        <p:nvPr/>
-      </p:nvGrpSpPr>
-      <p:grpSpPr>
-        <a:xfrm>
-          <a:off x="0" y="0"/>
-          <a:ext cx="0" cy="0"/>
-          <a:chOff x="0" y="0"/>
-          <a:chExt cx="0" cy="0"/>
-        </a:xfrm>
-      </p:grpSpPr>
-      <p:sp>
-        <p:nvSpPr>
-          <p:cNvPr id="2" name="제목 1">
-            <a:extLst>
-              <a:ext uri="{FF2B5EF4-FFF2-40B4-BE49-F238E27FC236}">
-                <a16:creationId xmlns:a16="http://schemas.microsoft.com/office/drawing/2014/main" id="{598A6417-3B36-4277-8644-E0246B6DAA2F}"/>
-              </a:ext>
-            </a:extLst>
-          </p:cNvPr>
-          <p:cNvSpPr>
-            <a:spLocks noGrp="1"/>
-          </p:cNvSpPr>
-          <p:nvPr>
-            <p:ph type="title"/>
-          </p:nvPr>
-        </p:nvSpPr>
-        <p:spPr/>
-        <p:txBody>
-          <a:bodyPr>
-            <a:normAutofit fontScale="90000"/>
-          </a:bodyPr>
-          <a:lstStyle/>
-          <a:p>
-            <a:r>
-              <a:rPr lang="ko-KR" altLang="en-US" dirty="0"/>
-              <a:t>프로그램 개요</a:t>
-            </a:r>
-          </a:p>
-        </p:txBody>
-      </p:sp>
-      <p:sp>
-        <p:nvSpPr>
-          <p:cNvPr id="4" name="슬라이드 번호 개체 틀 3">
-            <a:extLst>
-              <a:ext uri="{FF2B5EF4-FFF2-40B4-BE49-F238E27FC236}">
-                <a16:creationId xmlns:a16="http://schemas.microsoft.com/office/drawing/2014/main" id="{38FDC87F-11A9-4652-95C5-53FE09F401B2}"/>
-              </a:ext>
-            </a:extLst>
-          </p:cNvPr>
-          <p:cNvSpPr>
-            <a:spLocks noGrp="1"/>
-          </p:cNvSpPr>
-          <p:nvPr>
-            <p:ph type="sldNum" sz="quarter" idx="12"/>
-          </p:nvPr>
-        </p:nvSpPr>
-        <p:spPr/>
-        <p:txBody>
-          <a:bodyPr/>
-          <a:lstStyle/>
-          <a:p>
-            <a:fld id="{D74ECCE6-482B-4E3F-A4EE-5A2B5F793A19}" type="slidenum">
-              <a:rPr lang="ko-KR" altLang="en-US" smtClean="0"/>
-              <a:t>6</a:t>
-            </a:fld>
-            <a:endParaRPr lang="ko-KR" altLang="en-US"/>
-          </a:p>
-        </p:txBody>
-      </p:sp>
-      <p:sp>
-        <p:nvSpPr>
-          <p:cNvPr id="3" name="내용 개체 틀 2">
-            <a:extLst>
-              <a:ext uri="{FF2B5EF4-FFF2-40B4-BE49-F238E27FC236}">
-                <a16:creationId xmlns:a16="http://schemas.microsoft.com/office/drawing/2014/main" id="{ABF2E82B-560E-457B-8261-C9AB63C3E27A}"/>
-              </a:ext>
-            </a:extLst>
-          </p:cNvPr>
-          <p:cNvSpPr>
-            <a:spLocks noGrp="1"/>
-          </p:cNvSpPr>
-          <p:nvPr>
-            <p:ph type="body" sz="quarter" idx="13"/>
-          </p:nvPr>
-        </p:nvSpPr>
-        <p:spPr/>
-        <p:txBody>
-          <a:bodyPr>
-            <a:normAutofit/>
-          </a:bodyPr>
-          <a:lstStyle/>
-          <a:p>
-            <a:r>
-              <a:rPr lang="ko-KR" altLang="en-US" dirty="0"/>
-              <a:t>개발환경</a:t>
-            </a:r>
-            <a:endParaRPr lang="en-US" altLang="ko-KR" dirty="0"/>
-          </a:p>
-        </p:txBody>
-      </p:sp>
-      <p:sp>
-        <p:nvSpPr>
-          <p:cNvPr id="5" name="직사각형 4">
-            <a:extLst>
-              <a:ext uri="{FF2B5EF4-FFF2-40B4-BE49-F238E27FC236}">
-                <a16:creationId xmlns:a16="http://schemas.microsoft.com/office/drawing/2014/main" id="{D8022088-43F3-48C8-85FA-3E254A17B535}"/>
-              </a:ext>
-            </a:extLst>
-          </p:cNvPr>
-          <p:cNvSpPr/>
-          <p:nvPr/>
-        </p:nvSpPr>
-        <p:spPr>
-          <a:xfrm>
-            <a:off x="903005" y="1653050"/>
-            <a:ext cx="6096000" cy="646331"/>
-          </a:xfrm>
-          <a:prstGeom prst="rect">
-            <a:avLst/>
-          </a:prstGeom>
-        </p:spPr>
-        <p:txBody>
-          <a:bodyPr>
-            <a:spAutoFit/>
-          </a:bodyPr>
-          <a:lstStyle/>
-          <a:p>
-            <a:r>
-              <a:rPr lang="ko-KR" altLang="en-US" dirty="0"/>
-              <a:t>자바</a:t>
-            </a:r>
-            <a:br>
-              <a:rPr lang="en-US" altLang="ko-KR" dirty="0"/>
-            </a:br>
-            <a:r>
-              <a:rPr lang="ko-KR" altLang="en-US" dirty="0"/>
-              <a:t>이클립스</a:t>
-            </a:r>
-          </a:p>
-        </p:txBody>
-      </p:sp>
-    </p:spTree>
-    <p:extLst>
-      <p:ext uri="{BB962C8B-B14F-4D97-AF65-F5344CB8AC3E}">
-        <p14:creationId xmlns:p14="http://schemas.microsoft.com/office/powerpoint/2010/main" val="2410395274"/>
-      </p:ext>
-    </p:extLst>
-  </p:cSld>
-  <p:clrMapOvr>
-    <a:masterClrMapping/>
-  </p:clrMapOvr>
-</p:sld>
-</file>
-
-<file path=ppt/slides/slide7.xml><?xml version="1.0" encoding="utf-8"?>
-<p:sld xmlns:a="http://schemas.openxmlformats.org/drawingml/2006/main" xmlns:r="http://schemas.openxmlformats.org/officeDocument/2006/relationships" xmlns:p="http://schemas.openxmlformats.org/presentationml/2006/main">
-  <p:cSld>
-    <p:spTree>
-      <p:nvGrpSpPr>
-        <p:cNvPr id="1" name=""/>
-        <p:cNvGrpSpPr/>
-        <p:nvPr/>
-      </p:nvGrpSpPr>
-      <p:grpSpPr>
-        <a:xfrm>
-          <a:off x="0" y="0"/>
-          <a:ext cx="0" cy="0"/>
-          <a:chOff x="0" y="0"/>
-          <a:chExt cx="0" cy="0"/>
-        </a:xfrm>
-      </p:grpSpPr>
-      <p:sp>
-        <p:nvSpPr>
-          <p:cNvPr id="2" name="제목 1">
-            <a:extLst>
-              <a:ext uri="{FF2B5EF4-FFF2-40B4-BE49-F238E27FC236}">
-                <a16:creationId xmlns:a16="http://schemas.microsoft.com/office/drawing/2014/main" id="{7A7984E6-50C5-409C-B450-EDAC56BA783A}"/>
-              </a:ext>
-            </a:extLst>
-          </p:cNvPr>
-          <p:cNvSpPr>
-            <a:spLocks noGrp="1"/>
-          </p:cNvSpPr>
-          <p:nvPr>
-            <p:ph type="title"/>
-          </p:nvPr>
-        </p:nvSpPr>
-        <p:spPr/>
-        <p:txBody>
-          <a:bodyPr>
-            <a:normAutofit fontScale="90000"/>
-          </a:bodyPr>
-          <a:lstStyle/>
-          <a:p>
-            <a:r>
-              <a:rPr lang="ko-KR" altLang="en-US" dirty="0"/>
-              <a:t>프로그램 개요</a:t>
-            </a:r>
-          </a:p>
-        </p:txBody>
-      </p:sp>
-      <p:sp>
-        <p:nvSpPr>
-          <p:cNvPr id="4" name="슬라이드 번호 개체 틀 3">
-            <a:extLst>
-              <a:ext uri="{FF2B5EF4-FFF2-40B4-BE49-F238E27FC236}">
-                <a16:creationId xmlns:a16="http://schemas.microsoft.com/office/drawing/2014/main" id="{10FE4884-37B3-4D6E-A12D-36F3EC4FACCE}"/>
-              </a:ext>
-            </a:extLst>
-          </p:cNvPr>
-          <p:cNvSpPr>
-            <a:spLocks noGrp="1"/>
-          </p:cNvSpPr>
-          <p:nvPr>
-            <p:ph type="sldNum" sz="quarter" idx="12"/>
-          </p:nvPr>
-        </p:nvSpPr>
-        <p:spPr/>
-        <p:txBody>
-          <a:bodyPr/>
-          <a:lstStyle/>
-          <a:p>
-            <a:fld id="{D74ECCE6-482B-4E3F-A4EE-5A2B5F793A19}" type="slidenum">
-              <a:rPr lang="ko-KR" altLang="en-US" smtClean="0"/>
-              <a:t>7</a:t>
-            </a:fld>
-            <a:endParaRPr lang="ko-KR" altLang="en-US"/>
-          </a:p>
-        </p:txBody>
-      </p:sp>
-      <p:sp>
-        <p:nvSpPr>
-          <p:cNvPr id="3" name="내용 개체 틀 2">
-            <a:extLst>
-              <a:ext uri="{FF2B5EF4-FFF2-40B4-BE49-F238E27FC236}">
-                <a16:creationId xmlns:a16="http://schemas.microsoft.com/office/drawing/2014/main" id="{863C020D-B5BB-4513-8E55-4275CA0364BB}"/>
-              </a:ext>
-            </a:extLst>
-          </p:cNvPr>
-          <p:cNvSpPr>
-            <a:spLocks noGrp="1"/>
-          </p:cNvSpPr>
-          <p:nvPr>
-            <p:ph type="body" sz="quarter" idx="13"/>
-          </p:nvPr>
-        </p:nvSpPr>
-        <p:spPr/>
-        <p:txBody>
-          <a:bodyPr/>
-          <a:lstStyle/>
-          <a:p>
-            <a:r>
-              <a:rPr lang="ko-KR" altLang="en-US" dirty="0"/>
-              <a:t>게임 </a:t>
-            </a:r>
-            <a:r>
-              <a:rPr lang="ko-KR" altLang="en-US" dirty="0" err="1"/>
-              <a:t>하는법</a:t>
-            </a:r>
-            <a:endParaRPr lang="en-US" altLang="ko-KR" dirty="0"/>
-          </a:p>
-          <a:p>
-            <a:endParaRPr lang="en-US" altLang="ko-KR" dirty="0"/>
-          </a:p>
-        </p:txBody>
-      </p:sp>
-    </p:spTree>
-    <p:extLst>
-      <p:ext uri="{BB962C8B-B14F-4D97-AF65-F5344CB8AC3E}">
-        <p14:creationId xmlns:p14="http://schemas.microsoft.com/office/powerpoint/2010/main" val="1598646997"/>
-      </p:ext>
-    </p:extLst>
-  </p:cSld>
-  <p:clrMapOvr>
-    <a:masterClrMapping/>
-  </p:clrMapOvr>
-</p:sld>
-</file>
-
-<file path=ppt/slides/slide8.xml><?xml version="1.0" encoding="utf-8"?>
-<p:sld xmlns:a="http://schemas.openxmlformats.org/drawingml/2006/main" xmlns:r="http://schemas.openxmlformats.org/officeDocument/2006/relationships" xmlns:p="http://schemas.openxmlformats.org/presentationml/2006/main">
-  <p:cSld>
-    <p:spTree>
-      <p:nvGrpSpPr>
-        <p:cNvPr id="1" name=""/>
-        <p:cNvGrpSpPr/>
-        <p:nvPr/>
-      </p:nvGrpSpPr>
-      <p:grpSpPr>
-        <a:xfrm>
-          <a:off x="0" y="0"/>
-          <a:ext cx="0" cy="0"/>
-          <a:chOff x="0" y="0"/>
-          <a:chExt cx="0" cy="0"/>
-        </a:xfrm>
-      </p:grpSpPr>
-      <p:sp>
-        <p:nvSpPr>
-          <p:cNvPr id="2" name="제목 1">
-            <a:extLst>
-              <a:ext uri="{FF2B5EF4-FFF2-40B4-BE49-F238E27FC236}">
-                <a16:creationId xmlns:a16="http://schemas.microsoft.com/office/drawing/2014/main" id="{33EE91B0-5BCC-4566-9903-3AC5761D5596}"/>
-              </a:ext>
-            </a:extLst>
-          </p:cNvPr>
-          <p:cNvSpPr>
-            <a:spLocks noGrp="1"/>
-          </p:cNvSpPr>
-          <p:nvPr>
-            <p:ph type="title"/>
-          </p:nvPr>
-        </p:nvSpPr>
-        <p:spPr/>
-        <p:txBody>
-          <a:bodyPr>
-            <a:normAutofit fontScale="90000"/>
-          </a:bodyPr>
-          <a:lstStyle/>
-          <a:p>
-            <a:r>
-              <a:rPr lang="ko-KR" altLang="en-US" dirty="0"/>
-              <a:t>프로그램 개요</a:t>
-            </a:r>
-          </a:p>
-        </p:txBody>
-      </p:sp>
-      <p:sp>
-        <p:nvSpPr>
-          <p:cNvPr id="4" name="슬라이드 번호 개체 틀 3">
-            <a:extLst>
-              <a:ext uri="{FF2B5EF4-FFF2-40B4-BE49-F238E27FC236}">
-                <a16:creationId xmlns:a16="http://schemas.microsoft.com/office/drawing/2014/main" id="{DD254026-3AAF-4AB5-8CA9-4C98AD7E75CB}"/>
-              </a:ext>
-            </a:extLst>
-          </p:cNvPr>
-          <p:cNvSpPr>
-            <a:spLocks noGrp="1"/>
-          </p:cNvSpPr>
-          <p:nvPr>
-            <p:ph type="sldNum" sz="quarter" idx="12"/>
-          </p:nvPr>
-        </p:nvSpPr>
-        <p:spPr/>
-        <p:txBody>
-          <a:bodyPr/>
-          <a:lstStyle/>
-          <a:p>
-            <a:fld id="{D74ECCE6-482B-4E3F-A4EE-5A2B5F793A19}" type="slidenum">
-              <a:rPr lang="ko-KR" altLang="en-US" smtClean="0"/>
-              <a:t>8</a:t>
             </a:fld>
             <a:endParaRPr lang="ko-KR" altLang="en-US"/>
           </a:p>
@@ -6063,6 +4725,1601 @@
 </p:sld>
 </file>
 
+<file path=ppt/slides/slide11.xml><?xml version="1.0" encoding="utf-8"?>
+<p:sld xmlns:a="http://schemas.openxmlformats.org/drawingml/2006/main" xmlns:r="http://schemas.openxmlformats.org/officeDocument/2006/relationships" xmlns:p="http://schemas.openxmlformats.org/presentationml/2006/main">
+  <p:cSld>
+    <p:spTree>
+      <p:nvGrpSpPr>
+        <p:cNvPr id="1" name=""/>
+        <p:cNvGrpSpPr/>
+        <p:nvPr/>
+      </p:nvGrpSpPr>
+      <p:grpSpPr>
+        <a:xfrm>
+          <a:off x="0" y="0"/>
+          <a:ext cx="0" cy="0"/>
+          <a:chOff x="0" y="0"/>
+          <a:chExt cx="0" cy="0"/>
+        </a:xfrm>
+      </p:grpSpPr>
+      <p:sp>
+        <p:nvSpPr>
+          <p:cNvPr id="2" name="제목 1">
+            <a:extLst>
+              <a:ext uri="{FF2B5EF4-FFF2-40B4-BE49-F238E27FC236}">
+                <a16:creationId xmlns:a16="http://schemas.microsoft.com/office/drawing/2014/main" id="{C7A0B280-F0CD-4164-8680-F811DB928ABA}"/>
+              </a:ext>
+            </a:extLst>
+          </p:cNvPr>
+          <p:cNvSpPr>
+            <a:spLocks noGrp="1"/>
+          </p:cNvSpPr>
+          <p:nvPr>
+            <p:ph type="title"/>
+          </p:nvPr>
+        </p:nvSpPr>
+        <p:spPr/>
+        <p:txBody>
+          <a:bodyPr>
+            <a:normAutofit fontScale="90000"/>
+          </a:bodyPr>
+          <a:lstStyle/>
+          <a:p>
+            <a:r>
+              <a:rPr lang="ko-KR" altLang="en-US" dirty="0"/>
+              <a:t>프로그램 개요</a:t>
+            </a:r>
+          </a:p>
+        </p:txBody>
+      </p:sp>
+      <p:sp>
+        <p:nvSpPr>
+          <p:cNvPr id="4" name="슬라이드 번호 개체 틀 3">
+            <a:extLst>
+              <a:ext uri="{FF2B5EF4-FFF2-40B4-BE49-F238E27FC236}">
+                <a16:creationId xmlns:a16="http://schemas.microsoft.com/office/drawing/2014/main" id="{5E0697F5-2C89-4895-95F1-AA1640583757}"/>
+              </a:ext>
+            </a:extLst>
+          </p:cNvPr>
+          <p:cNvSpPr>
+            <a:spLocks noGrp="1"/>
+          </p:cNvSpPr>
+          <p:nvPr>
+            <p:ph type="sldNum" sz="quarter" idx="12"/>
+          </p:nvPr>
+        </p:nvSpPr>
+        <p:spPr/>
+        <p:txBody>
+          <a:bodyPr/>
+          <a:lstStyle/>
+          <a:p>
+            <a:fld id="{D74ECCE6-482B-4E3F-A4EE-5A2B5F793A19}" type="slidenum">
+              <a:rPr lang="ko-KR" altLang="en-US" smtClean="0"/>
+              <a:t>11</a:t>
+            </a:fld>
+            <a:endParaRPr lang="ko-KR" altLang="en-US"/>
+          </a:p>
+        </p:txBody>
+      </p:sp>
+      <p:sp>
+        <p:nvSpPr>
+          <p:cNvPr id="5" name="텍스트 개체 틀 4">
+            <a:extLst>
+              <a:ext uri="{FF2B5EF4-FFF2-40B4-BE49-F238E27FC236}">
+                <a16:creationId xmlns:a16="http://schemas.microsoft.com/office/drawing/2014/main" id="{050A3EDA-FB36-4940-AF46-FD171AE934BC}"/>
+              </a:ext>
+            </a:extLst>
+          </p:cNvPr>
+          <p:cNvSpPr>
+            <a:spLocks noGrp="1"/>
+          </p:cNvSpPr>
+          <p:nvPr>
+            <p:ph type="body" sz="quarter" idx="13"/>
+          </p:nvPr>
+        </p:nvSpPr>
+        <p:spPr/>
+        <p:txBody>
+          <a:bodyPr/>
+          <a:lstStyle/>
+          <a:p>
+            <a:r>
+              <a:rPr lang="ko-KR" altLang="en-US" dirty="0"/>
+              <a:t>순서도</a:t>
+            </a:r>
+            <a:r>
+              <a:rPr lang="en-US" altLang="ko-KR" dirty="0"/>
+              <a:t>(?)</a:t>
+            </a:r>
+            <a:endParaRPr lang="ko-KR" altLang="en-US" dirty="0"/>
+          </a:p>
+        </p:txBody>
+      </p:sp>
+    </p:spTree>
+    <p:extLst>
+      <p:ext uri="{BB962C8B-B14F-4D97-AF65-F5344CB8AC3E}">
+        <p14:creationId xmlns:p14="http://schemas.microsoft.com/office/powerpoint/2010/main" val="3864131948"/>
+      </p:ext>
+    </p:extLst>
+  </p:cSld>
+  <p:clrMapOvr>
+    <a:masterClrMapping/>
+  </p:clrMapOvr>
+</p:sld>
+</file>
+
+<file path=ppt/slides/slide12.xml><?xml version="1.0" encoding="utf-8"?>
+<p:sld xmlns:a="http://schemas.openxmlformats.org/drawingml/2006/main" xmlns:r="http://schemas.openxmlformats.org/officeDocument/2006/relationships" xmlns:p="http://schemas.openxmlformats.org/presentationml/2006/main">
+  <p:cSld>
+    <p:spTree>
+      <p:nvGrpSpPr>
+        <p:cNvPr id="1" name=""/>
+        <p:cNvGrpSpPr/>
+        <p:nvPr/>
+      </p:nvGrpSpPr>
+      <p:grpSpPr>
+        <a:xfrm>
+          <a:off x="0" y="0"/>
+          <a:ext cx="0" cy="0"/>
+          <a:chOff x="0" y="0"/>
+          <a:chExt cx="0" cy="0"/>
+        </a:xfrm>
+      </p:grpSpPr>
+      <p:sp>
+        <p:nvSpPr>
+          <p:cNvPr id="2" name="제목 1">
+            <a:extLst>
+              <a:ext uri="{FF2B5EF4-FFF2-40B4-BE49-F238E27FC236}">
+                <a16:creationId xmlns:a16="http://schemas.microsoft.com/office/drawing/2014/main" id="{DD9F7CD1-FBF3-45FE-AA6A-5CB21CF6D170}"/>
+              </a:ext>
+            </a:extLst>
+          </p:cNvPr>
+          <p:cNvSpPr>
+            <a:spLocks noGrp="1"/>
+          </p:cNvSpPr>
+          <p:nvPr>
+            <p:ph type="title"/>
+          </p:nvPr>
+        </p:nvSpPr>
+        <p:spPr/>
+        <p:txBody>
+          <a:bodyPr/>
+          <a:lstStyle/>
+          <a:p>
+            <a:r>
+              <a:rPr lang="ko-KR" altLang="en-US" dirty="0"/>
+              <a:t>일정</a:t>
+            </a:r>
+          </a:p>
+        </p:txBody>
+      </p:sp>
+      <p:sp>
+        <p:nvSpPr>
+          <p:cNvPr id="5" name="텍스트 개체 틀 4">
+            <a:extLst>
+              <a:ext uri="{FF2B5EF4-FFF2-40B4-BE49-F238E27FC236}">
+                <a16:creationId xmlns:a16="http://schemas.microsoft.com/office/drawing/2014/main" id="{C6206F02-555F-4A78-83E4-289280B259BC}"/>
+              </a:ext>
+            </a:extLst>
+          </p:cNvPr>
+          <p:cNvSpPr>
+            <a:spLocks noGrp="1"/>
+          </p:cNvSpPr>
+          <p:nvPr>
+            <p:ph type="body" idx="1"/>
+          </p:nvPr>
+        </p:nvSpPr>
+        <p:spPr/>
+        <p:txBody>
+          <a:bodyPr/>
+          <a:lstStyle/>
+          <a:p>
+            <a:endParaRPr lang="ko-KR" altLang="en-US"/>
+          </a:p>
+        </p:txBody>
+      </p:sp>
+      <p:sp>
+        <p:nvSpPr>
+          <p:cNvPr id="4" name="슬라이드 번호 개체 틀 3">
+            <a:extLst>
+              <a:ext uri="{FF2B5EF4-FFF2-40B4-BE49-F238E27FC236}">
+                <a16:creationId xmlns:a16="http://schemas.microsoft.com/office/drawing/2014/main" id="{646E525D-DA28-4539-8871-8904DA14B0B4}"/>
+              </a:ext>
+            </a:extLst>
+          </p:cNvPr>
+          <p:cNvSpPr>
+            <a:spLocks noGrp="1"/>
+          </p:cNvSpPr>
+          <p:nvPr>
+            <p:ph type="sldNum" sz="quarter" idx="12"/>
+          </p:nvPr>
+        </p:nvSpPr>
+        <p:spPr/>
+        <p:txBody>
+          <a:bodyPr/>
+          <a:lstStyle/>
+          <a:p>
+            <a:fld id="{D74ECCE6-482B-4E3F-A4EE-5A2B5F793A19}" type="slidenum">
+              <a:rPr lang="ko-KR" altLang="en-US" smtClean="0"/>
+              <a:t>12</a:t>
+            </a:fld>
+            <a:endParaRPr lang="ko-KR" altLang="en-US"/>
+          </a:p>
+        </p:txBody>
+      </p:sp>
+    </p:spTree>
+    <p:extLst>
+      <p:ext uri="{BB962C8B-B14F-4D97-AF65-F5344CB8AC3E}">
+        <p14:creationId xmlns:p14="http://schemas.microsoft.com/office/powerpoint/2010/main" val="1601629160"/>
+      </p:ext>
+    </p:extLst>
+  </p:cSld>
+  <p:clrMapOvr>
+    <a:masterClrMapping/>
+  </p:clrMapOvr>
+</p:sld>
+</file>
+
+<file path=ppt/slides/slide13.xml><?xml version="1.0" encoding="utf-8"?>
+<p:sld xmlns:a="http://schemas.openxmlformats.org/drawingml/2006/main" xmlns:r="http://schemas.openxmlformats.org/officeDocument/2006/relationships" xmlns:p="http://schemas.openxmlformats.org/presentationml/2006/main">
+  <p:cSld>
+    <p:spTree>
+      <p:nvGrpSpPr>
+        <p:cNvPr id="1" name=""/>
+        <p:cNvGrpSpPr/>
+        <p:nvPr/>
+      </p:nvGrpSpPr>
+      <p:grpSpPr>
+        <a:xfrm>
+          <a:off x="0" y="0"/>
+          <a:ext cx="0" cy="0"/>
+          <a:chOff x="0" y="0"/>
+          <a:chExt cx="0" cy="0"/>
+        </a:xfrm>
+      </p:grpSpPr>
+      <p:sp>
+        <p:nvSpPr>
+          <p:cNvPr id="5" name="제목 4">
+            <a:extLst>
+              <a:ext uri="{FF2B5EF4-FFF2-40B4-BE49-F238E27FC236}">
+                <a16:creationId xmlns:a16="http://schemas.microsoft.com/office/drawing/2014/main" id="{0760860C-2517-4D92-951A-6A1C370339E6}"/>
+              </a:ext>
+            </a:extLst>
+          </p:cNvPr>
+          <p:cNvSpPr>
+            <a:spLocks noGrp="1"/>
+          </p:cNvSpPr>
+          <p:nvPr>
+            <p:ph type="title"/>
+          </p:nvPr>
+        </p:nvSpPr>
+        <p:spPr/>
+        <p:txBody>
+          <a:bodyPr>
+            <a:normAutofit fontScale="90000"/>
+          </a:bodyPr>
+          <a:lstStyle/>
+          <a:p>
+            <a:r>
+              <a:rPr lang="ko-KR" altLang="en-US" dirty="0"/>
+              <a:t>일정</a:t>
+            </a:r>
+          </a:p>
+        </p:txBody>
+      </p:sp>
+      <p:sp>
+        <p:nvSpPr>
+          <p:cNvPr id="4" name="슬라이드 번호 개체 틀 3">
+            <a:extLst>
+              <a:ext uri="{FF2B5EF4-FFF2-40B4-BE49-F238E27FC236}">
+                <a16:creationId xmlns:a16="http://schemas.microsoft.com/office/drawing/2014/main" id="{832C4B06-F407-42FF-816F-73ECCD8610C1}"/>
+              </a:ext>
+            </a:extLst>
+          </p:cNvPr>
+          <p:cNvSpPr>
+            <a:spLocks noGrp="1"/>
+          </p:cNvSpPr>
+          <p:nvPr>
+            <p:ph type="sldNum" sz="quarter" idx="12"/>
+          </p:nvPr>
+        </p:nvSpPr>
+        <p:spPr/>
+        <p:txBody>
+          <a:bodyPr/>
+          <a:lstStyle/>
+          <a:p>
+            <a:fld id="{D74ECCE6-482B-4E3F-A4EE-5A2B5F793A19}" type="slidenum">
+              <a:rPr lang="ko-KR" altLang="en-US" smtClean="0"/>
+              <a:t>13</a:t>
+            </a:fld>
+            <a:endParaRPr lang="ko-KR" altLang="en-US"/>
+          </a:p>
+        </p:txBody>
+      </p:sp>
+      <p:sp>
+        <p:nvSpPr>
+          <p:cNvPr id="6" name="텍스트 개체 틀 5">
+            <a:extLst>
+              <a:ext uri="{FF2B5EF4-FFF2-40B4-BE49-F238E27FC236}">
+                <a16:creationId xmlns:a16="http://schemas.microsoft.com/office/drawing/2014/main" id="{56EED388-EC91-4203-860D-2970B0226BC5}"/>
+              </a:ext>
+            </a:extLst>
+          </p:cNvPr>
+          <p:cNvSpPr>
+            <a:spLocks noGrp="1"/>
+          </p:cNvSpPr>
+          <p:nvPr>
+            <p:ph type="body" sz="quarter" idx="13"/>
+          </p:nvPr>
+        </p:nvSpPr>
+        <p:spPr/>
+        <p:txBody>
+          <a:bodyPr/>
+          <a:lstStyle/>
+          <a:p>
+            <a:endParaRPr lang="ko-KR" altLang="en-US"/>
+          </a:p>
+        </p:txBody>
+      </p:sp>
+    </p:spTree>
+    <p:extLst>
+      <p:ext uri="{BB962C8B-B14F-4D97-AF65-F5344CB8AC3E}">
+        <p14:creationId xmlns:p14="http://schemas.microsoft.com/office/powerpoint/2010/main" val="3619935219"/>
+      </p:ext>
+    </p:extLst>
+  </p:cSld>
+  <p:clrMapOvr>
+    <a:masterClrMapping/>
+  </p:clrMapOvr>
+</p:sld>
+</file>
+
+<file path=ppt/slides/slide14.xml><?xml version="1.0" encoding="utf-8"?>
+<p:sld xmlns:a="http://schemas.openxmlformats.org/drawingml/2006/main" xmlns:r="http://schemas.openxmlformats.org/officeDocument/2006/relationships" xmlns:p="http://schemas.openxmlformats.org/presentationml/2006/main">
+  <p:cSld>
+    <p:spTree>
+      <p:nvGrpSpPr>
+        <p:cNvPr id="1" name=""/>
+        <p:cNvGrpSpPr/>
+        <p:nvPr/>
+      </p:nvGrpSpPr>
+      <p:grpSpPr>
+        <a:xfrm>
+          <a:off x="0" y="0"/>
+          <a:ext cx="0" cy="0"/>
+          <a:chOff x="0" y="0"/>
+          <a:chExt cx="0" cy="0"/>
+        </a:xfrm>
+      </p:grpSpPr>
+      <p:sp>
+        <p:nvSpPr>
+          <p:cNvPr id="2" name="제목 1">
+            <a:extLst>
+              <a:ext uri="{FF2B5EF4-FFF2-40B4-BE49-F238E27FC236}">
+                <a16:creationId xmlns:a16="http://schemas.microsoft.com/office/drawing/2014/main" id="{49D47D17-BE2B-4CC8-8B7D-BAC586CAC626}"/>
+              </a:ext>
+            </a:extLst>
+          </p:cNvPr>
+          <p:cNvSpPr>
+            <a:spLocks noGrp="1"/>
+          </p:cNvSpPr>
+          <p:nvPr>
+            <p:ph type="title"/>
+          </p:nvPr>
+        </p:nvSpPr>
+        <p:spPr/>
+        <p:txBody>
+          <a:bodyPr/>
+          <a:lstStyle/>
+          <a:p>
+            <a:r>
+              <a:rPr lang="ko-KR" altLang="en-US" dirty="0"/>
+              <a:t>시연</a:t>
+            </a:r>
+          </a:p>
+        </p:txBody>
+      </p:sp>
+      <p:sp>
+        <p:nvSpPr>
+          <p:cNvPr id="3" name="텍스트 개체 틀 2">
+            <a:extLst>
+              <a:ext uri="{FF2B5EF4-FFF2-40B4-BE49-F238E27FC236}">
+                <a16:creationId xmlns:a16="http://schemas.microsoft.com/office/drawing/2014/main" id="{AB416C76-8ABE-48F8-A598-F09F6A1F311B}"/>
+              </a:ext>
+            </a:extLst>
+          </p:cNvPr>
+          <p:cNvSpPr>
+            <a:spLocks noGrp="1"/>
+          </p:cNvSpPr>
+          <p:nvPr>
+            <p:ph type="body" idx="1"/>
+          </p:nvPr>
+        </p:nvSpPr>
+        <p:spPr/>
+        <p:txBody>
+          <a:bodyPr/>
+          <a:lstStyle/>
+          <a:p>
+            <a:endParaRPr lang="ko-KR" altLang="en-US"/>
+          </a:p>
+        </p:txBody>
+      </p:sp>
+      <p:sp>
+        <p:nvSpPr>
+          <p:cNvPr id="4" name="슬라이드 번호 개체 틀 3">
+            <a:extLst>
+              <a:ext uri="{FF2B5EF4-FFF2-40B4-BE49-F238E27FC236}">
+                <a16:creationId xmlns:a16="http://schemas.microsoft.com/office/drawing/2014/main" id="{974F7345-C186-4EBC-ACD7-22B505F29B8C}"/>
+              </a:ext>
+            </a:extLst>
+          </p:cNvPr>
+          <p:cNvSpPr>
+            <a:spLocks noGrp="1"/>
+          </p:cNvSpPr>
+          <p:nvPr>
+            <p:ph type="sldNum" sz="quarter" idx="12"/>
+          </p:nvPr>
+        </p:nvSpPr>
+        <p:spPr/>
+        <p:txBody>
+          <a:bodyPr/>
+          <a:lstStyle/>
+          <a:p>
+            <a:fld id="{D74ECCE6-482B-4E3F-A4EE-5A2B5F793A19}" type="slidenum">
+              <a:rPr lang="ko-KR" altLang="en-US" smtClean="0"/>
+              <a:t>14</a:t>
+            </a:fld>
+            <a:endParaRPr lang="ko-KR" altLang="en-US"/>
+          </a:p>
+        </p:txBody>
+      </p:sp>
+    </p:spTree>
+    <p:extLst>
+      <p:ext uri="{BB962C8B-B14F-4D97-AF65-F5344CB8AC3E}">
+        <p14:creationId xmlns:p14="http://schemas.microsoft.com/office/powerpoint/2010/main" val="3827647575"/>
+      </p:ext>
+    </p:extLst>
+  </p:cSld>
+  <p:clrMapOvr>
+    <a:masterClrMapping/>
+  </p:clrMapOvr>
+</p:sld>
+</file>
+
+<file path=ppt/slides/slide15.xml><?xml version="1.0" encoding="utf-8"?>
+<p:sld xmlns:a="http://schemas.openxmlformats.org/drawingml/2006/main" xmlns:r="http://schemas.openxmlformats.org/officeDocument/2006/relationships" xmlns:p="http://schemas.openxmlformats.org/presentationml/2006/main">
+  <p:cSld>
+    <p:spTree>
+      <p:nvGrpSpPr>
+        <p:cNvPr id="1" name=""/>
+        <p:cNvGrpSpPr/>
+        <p:nvPr/>
+      </p:nvGrpSpPr>
+      <p:grpSpPr>
+        <a:xfrm>
+          <a:off x="0" y="0"/>
+          <a:ext cx="0" cy="0"/>
+          <a:chOff x="0" y="0"/>
+          <a:chExt cx="0" cy="0"/>
+        </a:xfrm>
+      </p:grpSpPr>
+      <p:sp>
+        <p:nvSpPr>
+          <p:cNvPr id="2" name="제목 1">
+            <a:extLst>
+              <a:ext uri="{FF2B5EF4-FFF2-40B4-BE49-F238E27FC236}">
+                <a16:creationId xmlns:a16="http://schemas.microsoft.com/office/drawing/2014/main" id="{5F865E60-EE87-4130-AFD0-4408F48F6F13}"/>
+              </a:ext>
+            </a:extLst>
+          </p:cNvPr>
+          <p:cNvSpPr>
+            <a:spLocks noGrp="1"/>
+          </p:cNvSpPr>
+          <p:nvPr>
+            <p:ph type="ctrTitle"/>
+          </p:nvPr>
+        </p:nvSpPr>
+        <p:spPr/>
+        <p:txBody>
+          <a:bodyPr/>
+          <a:lstStyle/>
+          <a:p>
+            <a:r>
+              <a:rPr lang="en-US" altLang="ko-KR" dirty="0" err="1"/>
+              <a:t>QnA</a:t>
+            </a:r>
+            <a:endParaRPr lang="ko-KR" altLang="en-US" dirty="0"/>
+          </a:p>
+        </p:txBody>
+      </p:sp>
+      <p:sp>
+        <p:nvSpPr>
+          <p:cNvPr id="5" name="부제목 4">
+            <a:extLst>
+              <a:ext uri="{FF2B5EF4-FFF2-40B4-BE49-F238E27FC236}">
+                <a16:creationId xmlns:a16="http://schemas.microsoft.com/office/drawing/2014/main" id="{CC4FBDDD-B840-46AF-9EC6-01D0C36536B5}"/>
+              </a:ext>
+            </a:extLst>
+          </p:cNvPr>
+          <p:cNvSpPr>
+            <a:spLocks noGrp="1"/>
+          </p:cNvSpPr>
+          <p:nvPr>
+            <p:ph type="subTitle" idx="1"/>
+          </p:nvPr>
+        </p:nvSpPr>
+        <p:spPr/>
+        <p:txBody>
+          <a:bodyPr/>
+          <a:lstStyle/>
+          <a:p>
+            <a:endParaRPr lang="ko-KR" altLang="en-US"/>
+          </a:p>
+        </p:txBody>
+      </p:sp>
+      <p:sp>
+        <p:nvSpPr>
+          <p:cNvPr id="4" name="슬라이드 번호 개체 틀 3">
+            <a:extLst>
+              <a:ext uri="{FF2B5EF4-FFF2-40B4-BE49-F238E27FC236}">
+                <a16:creationId xmlns:a16="http://schemas.microsoft.com/office/drawing/2014/main" id="{F47744C0-1AA0-4A12-924F-F86DBD15EEB6}"/>
+              </a:ext>
+            </a:extLst>
+          </p:cNvPr>
+          <p:cNvSpPr>
+            <a:spLocks noGrp="1"/>
+          </p:cNvSpPr>
+          <p:nvPr>
+            <p:ph type="sldNum" sz="quarter" idx="12"/>
+          </p:nvPr>
+        </p:nvSpPr>
+        <p:spPr/>
+        <p:txBody>
+          <a:bodyPr/>
+          <a:lstStyle/>
+          <a:p>
+            <a:fld id="{D74ECCE6-482B-4E3F-A4EE-5A2B5F793A19}" type="slidenum">
+              <a:rPr lang="ko-KR" altLang="en-US" smtClean="0"/>
+              <a:t>15</a:t>
+            </a:fld>
+            <a:endParaRPr lang="ko-KR" altLang="en-US"/>
+          </a:p>
+        </p:txBody>
+      </p:sp>
+    </p:spTree>
+    <p:extLst>
+      <p:ext uri="{BB962C8B-B14F-4D97-AF65-F5344CB8AC3E}">
+        <p14:creationId xmlns:p14="http://schemas.microsoft.com/office/powerpoint/2010/main" val="3306686152"/>
+      </p:ext>
+    </p:extLst>
+  </p:cSld>
+  <p:clrMapOvr>
+    <a:masterClrMapping/>
+  </p:clrMapOvr>
+</p:sld>
+</file>
+
+<file path=ppt/slides/slide16.xml><?xml version="1.0" encoding="utf-8"?>
+<p:sld xmlns:a="http://schemas.openxmlformats.org/drawingml/2006/main" xmlns:r="http://schemas.openxmlformats.org/officeDocument/2006/relationships" xmlns:p="http://schemas.openxmlformats.org/presentationml/2006/main">
+  <p:cSld>
+    <p:spTree>
+      <p:nvGrpSpPr>
+        <p:cNvPr id="1" name=""/>
+        <p:cNvGrpSpPr/>
+        <p:nvPr/>
+      </p:nvGrpSpPr>
+      <p:grpSpPr>
+        <a:xfrm>
+          <a:off x="0" y="0"/>
+          <a:ext cx="0" cy="0"/>
+          <a:chOff x="0" y="0"/>
+          <a:chExt cx="0" cy="0"/>
+        </a:xfrm>
+      </p:grpSpPr>
+      <p:sp>
+        <p:nvSpPr>
+          <p:cNvPr id="2" name="제목 1">
+            <a:extLst>
+              <a:ext uri="{FF2B5EF4-FFF2-40B4-BE49-F238E27FC236}">
+                <a16:creationId xmlns:a16="http://schemas.microsoft.com/office/drawing/2014/main" id="{5C86C485-EF0A-455D-B1B9-8B1BA21A4C34}"/>
+              </a:ext>
+            </a:extLst>
+          </p:cNvPr>
+          <p:cNvSpPr>
+            <a:spLocks noGrp="1"/>
+          </p:cNvSpPr>
+          <p:nvPr>
+            <p:ph type="ctrTitle"/>
+          </p:nvPr>
+        </p:nvSpPr>
+        <p:spPr/>
+        <p:txBody>
+          <a:bodyPr/>
+          <a:lstStyle/>
+          <a:p>
+            <a:r>
+              <a:rPr lang="ko-KR" altLang="en-US" dirty="0"/>
+              <a:t>감사합니다</a:t>
+            </a:r>
+          </a:p>
+        </p:txBody>
+      </p:sp>
+      <p:sp>
+        <p:nvSpPr>
+          <p:cNvPr id="5" name="부제목 4">
+            <a:extLst>
+              <a:ext uri="{FF2B5EF4-FFF2-40B4-BE49-F238E27FC236}">
+                <a16:creationId xmlns:a16="http://schemas.microsoft.com/office/drawing/2014/main" id="{11AC2380-A42C-4414-9F89-7E6E7C4EB47C}"/>
+              </a:ext>
+            </a:extLst>
+          </p:cNvPr>
+          <p:cNvSpPr>
+            <a:spLocks noGrp="1"/>
+          </p:cNvSpPr>
+          <p:nvPr>
+            <p:ph type="subTitle" idx="1"/>
+          </p:nvPr>
+        </p:nvSpPr>
+        <p:spPr/>
+        <p:txBody>
+          <a:bodyPr/>
+          <a:lstStyle/>
+          <a:p>
+            <a:endParaRPr lang="ko-KR" altLang="en-US"/>
+          </a:p>
+        </p:txBody>
+      </p:sp>
+      <p:sp>
+        <p:nvSpPr>
+          <p:cNvPr id="4" name="슬라이드 번호 개체 틀 3">
+            <a:extLst>
+              <a:ext uri="{FF2B5EF4-FFF2-40B4-BE49-F238E27FC236}">
+                <a16:creationId xmlns:a16="http://schemas.microsoft.com/office/drawing/2014/main" id="{77231C97-BFE7-43C5-820C-FF8BA3E36A98}"/>
+              </a:ext>
+            </a:extLst>
+          </p:cNvPr>
+          <p:cNvSpPr>
+            <a:spLocks noGrp="1"/>
+          </p:cNvSpPr>
+          <p:nvPr>
+            <p:ph type="sldNum" sz="quarter" idx="12"/>
+          </p:nvPr>
+        </p:nvSpPr>
+        <p:spPr/>
+        <p:txBody>
+          <a:bodyPr/>
+          <a:lstStyle/>
+          <a:p>
+            <a:fld id="{D74ECCE6-482B-4E3F-A4EE-5A2B5F793A19}" type="slidenum">
+              <a:rPr lang="ko-KR" altLang="en-US" smtClean="0"/>
+              <a:t>16</a:t>
+            </a:fld>
+            <a:endParaRPr lang="ko-KR" altLang="en-US"/>
+          </a:p>
+        </p:txBody>
+      </p:sp>
+    </p:spTree>
+    <p:extLst>
+      <p:ext uri="{BB962C8B-B14F-4D97-AF65-F5344CB8AC3E}">
+        <p14:creationId xmlns:p14="http://schemas.microsoft.com/office/powerpoint/2010/main" val="3791566108"/>
+      </p:ext>
+    </p:extLst>
+  </p:cSld>
+  <p:clrMapOvr>
+    <a:masterClrMapping/>
+  </p:clrMapOvr>
+</p:sld>
+</file>
+
+<file path=ppt/slides/slide2.xml><?xml version="1.0" encoding="utf-8"?>
+<p:sld xmlns:a="http://schemas.openxmlformats.org/drawingml/2006/main" xmlns:r="http://schemas.openxmlformats.org/officeDocument/2006/relationships" xmlns:p="http://schemas.openxmlformats.org/presentationml/2006/main">
+  <p:cSld>
+    <p:spTree>
+      <p:nvGrpSpPr>
+        <p:cNvPr id="1" name=""/>
+        <p:cNvGrpSpPr/>
+        <p:nvPr/>
+      </p:nvGrpSpPr>
+      <p:grpSpPr>
+        <a:xfrm>
+          <a:off x="0" y="0"/>
+          <a:ext cx="0" cy="0"/>
+          <a:chOff x="0" y="0"/>
+          <a:chExt cx="0" cy="0"/>
+        </a:xfrm>
+      </p:grpSpPr>
+      <p:sp>
+        <p:nvSpPr>
+          <p:cNvPr id="2" name="제목 1">
+            <a:extLst>
+              <a:ext uri="{FF2B5EF4-FFF2-40B4-BE49-F238E27FC236}">
+                <a16:creationId xmlns:a16="http://schemas.microsoft.com/office/drawing/2014/main" id="{9B307B50-AFCE-4EFE-BF30-FE9BE4CCF505}"/>
+              </a:ext>
+            </a:extLst>
+          </p:cNvPr>
+          <p:cNvSpPr>
+            <a:spLocks noGrp="1"/>
+          </p:cNvSpPr>
+          <p:nvPr>
+            <p:ph type="title"/>
+          </p:nvPr>
+        </p:nvSpPr>
+        <p:spPr/>
+        <p:txBody>
+          <a:bodyPr/>
+          <a:lstStyle/>
+          <a:p>
+            <a:r>
+              <a:rPr lang="ko-KR" altLang="en-US" dirty="0"/>
+              <a:t>목차</a:t>
+            </a:r>
+          </a:p>
+        </p:txBody>
+      </p:sp>
+      <p:sp>
+        <p:nvSpPr>
+          <p:cNvPr id="3" name="내용 개체 틀 2">
+            <a:extLst>
+              <a:ext uri="{FF2B5EF4-FFF2-40B4-BE49-F238E27FC236}">
+                <a16:creationId xmlns:a16="http://schemas.microsoft.com/office/drawing/2014/main" id="{7F400C1E-17E0-4C94-B584-0424CA04616C}"/>
+              </a:ext>
+            </a:extLst>
+          </p:cNvPr>
+          <p:cNvSpPr>
+            <a:spLocks noGrp="1"/>
+          </p:cNvSpPr>
+          <p:nvPr>
+            <p:ph idx="1"/>
+          </p:nvPr>
+        </p:nvSpPr>
+        <p:spPr/>
+        <p:txBody>
+          <a:bodyPr/>
+          <a:lstStyle/>
+          <a:p>
+            <a:r>
+              <a:rPr lang="ko-KR" altLang="en-US" dirty="0"/>
+              <a:t>동기</a:t>
+            </a:r>
+            <a:endParaRPr lang="en-US" altLang="ko-KR" dirty="0"/>
+          </a:p>
+          <a:p>
+            <a:r>
+              <a:rPr lang="ko-KR" altLang="en-US" dirty="0"/>
+              <a:t>프로그램 개요</a:t>
+            </a:r>
+            <a:endParaRPr lang="en-US" altLang="ko-KR" dirty="0"/>
+          </a:p>
+          <a:p>
+            <a:r>
+              <a:rPr lang="ko-KR" altLang="en-US" dirty="0"/>
+              <a:t>순서도</a:t>
+            </a:r>
+            <a:r>
+              <a:rPr lang="en-US" altLang="ko-KR" dirty="0"/>
+              <a:t>(?)</a:t>
+            </a:r>
+          </a:p>
+          <a:p>
+            <a:r>
+              <a:rPr lang="ko-KR" altLang="en-US" dirty="0"/>
+              <a:t>일정</a:t>
+            </a:r>
+            <a:endParaRPr lang="en-US" altLang="ko-KR" dirty="0"/>
+          </a:p>
+          <a:p>
+            <a:r>
+              <a:rPr lang="ko-KR" altLang="en-US" dirty="0"/>
+              <a:t>시연</a:t>
+            </a:r>
+            <a:endParaRPr lang="en-US" altLang="ko-KR" dirty="0"/>
+          </a:p>
+          <a:p>
+            <a:endParaRPr lang="en-US" altLang="ko-KR" dirty="0"/>
+          </a:p>
+          <a:p>
+            <a:endParaRPr lang="ko-KR" altLang="en-US" dirty="0"/>
+          </a:p>
+        </p:txBody>
+      </p:sp>
+      <p:sp>
+        <p:nvSpPr>
+          <p:cNvPr id="4" name="슬라이드 번호 개체 틀 3">
+            <a:extLst>
+              <a:ext uri="{FF2B5EF4-FFF2-40B4-BE49-F238E27FC236}">
+                <a16:creationId xmlns:a16="http://schemas.microsoft.com/office/drawing/2014/main" id="{924562C3-AB7C-42E4-B4B5-C299866C7D2A}"/>
+              </a:ext>
+            </a:extLst>
+          </p:cNvPr>
+          <p:cNvSpPr>
+            <a:spLocks noGrp="1"/>
+          </p:cNvSpPr>
+          <p:nvPr>
+            <p:ph type="sldNum" sz="quarter" idx="12"/>
+          </p:nvPr>
+        </p:nvSpPr>
+        <p:spPr/>
+        <p:txBody>
+          <a:bodyPr/>
+          <a:lstStyle/>
+          <a:p>
+            <a:fld id="{D74ECCE6-482B-4E3F-A4EE-5A2B5F793A19}" type="slidenum">
+              <a:rPr lang="ko-KR" altLang="en-US" smtClean="0"/>
+              <a:t>2</a:t>
+            </a:fld>
+            <a:endParaRPr lang="ko-KR" altLang="en-US"/>
+          </a:p>
+        </p:txBody>
+      </p:sp>
+    </p:spTree>
+    <p:extLst>
+      <p:ext uri="{BB962C8B-B14F-4D97-AF65-F5344CB8AC3E}">
+        <p14:creationId xmlns:p14="http://schemas.microsoft.com/office/powerpoint/2010/main" val="589209927"/>
+      </p:ext>
+    </p:extLst>
+  </p:cSld>
+  <p:clrMapOvr>
+    <a:masterClrMapping/>
+  </p:clrMapOvr>
+</p:sld>
+</file>
+
+<file path=ppt/slides/slide3.xml><?xml version="1.0" encoding="utf-8"?>
+<p:sld xmlns:a="http://schemas.openxmlformats.org/drawingml/2006/main" xmlns:r="http://schemas.openxmlformats.org/officeDocument/2006/relationships" xmlns:p="http://schemas.openxmlformats.org/presentationml/2006/main">
+  <p:cSld>
+    <p:spTree>
+      <p:nvGrpSpPr>
+        <p:cNvPr id="1" name=""/>
+        <p:cNvGrpSpPr/>
+        <p:nvPr/>
+      </p:nvGrpSpPr>
+      <p:grpSpPr>
+        <a:xfrm>
+          <a:off x="0" y="0"/>
+          <a:ext cx="0" cy="0"/>
+          <a:chOff x="0" y="0"/>
+          <a:chExt cx="0" cy="0"/>
+        </a:xfrm>
+      </p:grpSpPr>
+      <p:sp>
+        <p:nvSpPr>
+          <p:cNvPr id="2" name="제목 1">
+            <a:extLst>
+              <a:ext uri="{FF2B5EF4-FFF2-40B4-BE49-F238E27FC236}">
+                <a16:creationId xmlns:a16="http://schemas.microsoft.com/office/drawing/2014/main" id="{726EA825-3053-4BB1-A4DD-7E4D23F91AA2}"/>
+              </a:ext>
+            </a:extLst>
+          </p:cNvPr>
+          <p:cNvSpPr>
+            <a:spLocks noGrp="1"/>
+          </p:cNvSpPr>
+          <p:nvPr>
+            <p:ph type="title"/>
+          </p:nvPr>
+        </p:nvSpPr>
+        <p:spPr/>
+        <p:txBody>
+          <a:bodyPr/>
+          <a:lstStyle/>
+          <a:p>
+            <a:r>
+              <a:rPr lang="ko-KR" altLang="en-US" dirty="0"/>
+              <a:t>동기</a:t>
+            </a:r>
+          </a:p>
+        </p:txBody>
+      </p:sp>
+      <p:sp>
+        <p:nvSpPr>
+          <p:cNvPr id="5" name="텍스트 개체 틀 4">
+            <a:extLst>
+              <a:ext uri="{FF2B5EF4-FFF2-40B4-BE49-F238E27FC236}">
+                <a16:creationId xmlns:a16="http://schemas.microsoft.com/office/drawing/2014/main" id="{9371C56F-0EA2-479C-B271-E4ECF656501C}"/>
+              </a:ext>
+            </a:extLst>
+          </p:cNvPr>
+          <p:cNvSpPr>
+            <a:spLocks noGrp="1"/>
+          </p:cNvSpPr>
+          <p:nvPr>
+            <p:ph type="body" idx="1"/>
+          </p:nvPr>
+        </p:nvSpPr>
+        <p:spPr/>
+        <p:txBody>
+          <a:bodyPr/>
+          <a:lstStyle/>
+          <a:p>
+            <a:endParaRPr lang="ko-KR" altLang="en-US"/>
+          </a:p>
+        </p:txBody>
+      </p:sp>
+      <p:sp>
+        <p:nvSpPr>
+          <p:cNvPr id="4" name="슬라이드 번호 개체 틀 3">
+            <a:extLst>
+              <a:ext uri="{FF2B5EF4-FFF2-40B4-BE49-F238E27FC236}">
+                <a16:creationId xmlns:a16="http://schemas.microsoft.com/office/drawing/2014/main" id="{55E3A155-78B4-439F-AF18-2D06E0AD5CB8}"/>
+              </a:ext>
+            </a:extLst>
+          </p:cNvPr>
+          <p:cNvSpPr>
+            <a:spLocks noGrp="1"/>
+          </p:cNvSpPr>
+          <p:nvPr>
+            <p:ph type="sldNum" sz="quarter" idx="12"/>
+          </p:nvPr>
+        </p:nvSpPr>
+        <p:spPr/>
+        <p:txBody>
+          <a:bodyPr/>
+          <a:lstStyle/>
+          <a:p>
+            <a:fld id="{D74ECCE6-482B-4E3F-A4EE-5A2B5F793A19}" type="slidenum">
+              <a:rPr lang="ko-KR" altLang="en-US" smtClean="0"/>
+              <a:t>3</a:t>
+            </a:fld>
+            <a:endParaRPr lang="ko-KR" altLang="en-US"/>
+          </a:p>
+        </p:txBody>
+      </p:sp>
+    </p:spTree>
+    <p:extLst>
+      <p:ext uri="{BB962C8B-B14F-4D97-AF65-F5344CB8AC3E}">
+        <p14:creationId xmlns:p14="http://schemas.microsoft.com/office/powerpoint/2010/main" val="1110084134"/>
+      </p:ext>
+    </p:extLst>
+  </p:cSld>
+  <p:clrMapOvr>
+    <a:masterClrMapping/>
+  </p:clrMapOvr>
+</p:sld>
+</file>
+
+<file path=ppt/slides/slide4.xml><?xml version="1.0" encoding="utf-8"?>
+<p:sld xmlns:a="http://schemas.openxmlformats.org/drawingml/2006/main" xmlns:r="http://schemas.openxmlformats.org/officeDocument/2006/relationships" xmlns:p="http://schemas.openxmlformats.org/presentationml/2006/main">
+  <p:cSld>
+    <p:spTree>
+      <p:nvGrpSpPr>
+        <p:cNvPr id="1" name=""/>
+        <p:cNvGrpSpPr/>
+        <p:nvPr/>
+      </p:nvGrpSpPr>
+      <p:grpSpPr>
+        <a:xfrm>
+          <a:off x="0" y="0"/>
+          <a:ext cx="0" cy="0"/>
+          <a:chOff x="0" y="0"/>
+          <a:chExt cx="0" cy="0"/>
+        </a:xfrm>
+      </p:grpSpPr>
+      <p:sp>
+        <p:nvSpPr>
+          <p:cNvPr id="5" name="제목 4">
+            <a:extLst>
+              <a:ext uri="{FF2B5EF4-FFF2-40B4-BE49-F238E27FC236}">
+                <a16:creationId xmlns:a16="http://schemas.microsoft.com/office/drawing/2014/main" id="{42F40077-90A9-43AE-85B1-66BF6460383D}"/>
+              </a:ext>
+            </a:extLst>
+          </p:cNvPr>
+          <p:cNvSpPr>
+            <a:spLocks noGrp="1"/>
+          </p:cNvSpPr>
+          <p:nvPr>
+            <p:ph type="title"/>
+          </p:nvPr>
+        </p:nvSpPr>
+        <p:spPr/>
+        <p:txBody>
+          <a:bodyPr>
+            <a:normAutofit fontScale="90000"/>
+          </a:bodyPr>
+          <a:lstStyle/>
+          <a:p>
+            <a:r>
+              <a:rPr lang="ko-KR" altLang="en-US" dirty="0"/>
+              <a:t>동기</a:t>
+            </a:r>
+          </a:p>
+        </p:txBody>
+      </p:sp>
+      <p:sp>
+        <p:nvSpPr>
+          <p:cNvPr id="4" name="슬라이드 번호 개체 틀 3">
+            <a:extLst>
+              <a:ext uri="{FF2B5EF4-FFF2-40B4-BE49-F238E27FC236}">
+                <a16:creationId xmlns:a16="http://schemas.microsoft.com/office/drawing/2014/main" id="{0528BB13-2A83-4D15-B800-1DB639DF9713}"/>
+              </a:ext>
+            </a:extLst>
+          </p:cNvPr>
+          <p:cNvSpPr>
+            <a:spLocks noGrp="1"/>
+          </p:cNvSpPr>
+          <p:nvPr>
+            <p:ph type="sldNum" sz="quarter" idx="12"/>
+          </p:nvPr>
+        </p:nvSpPr>
+        <p:spPr/>
+        <p:txBody>
+          <a:bodyPr/>
+          <a:lstStyle/>
+          <a:p>
+            <a:fld id="{D74ECCE6-482B-4E3F-A4EE-5A2B5F793A19}" type="slidenum">
+              <a:rPr lang="ko-KR" altLang="en-US" smtClean="0"/>
+              <a:t>4</a:t>
+            </a:fld>
+            <a:endParaRPr lang="ko-KR" altLang="en-US"/>
+          </a:p>
+        </p:txBody>
+      </p:sp>
+      <p:sp>
+        <p:nvSpPr>
+          <p:cNvPr id="6" name="텍스트 개체 틀 5">
+            <a:extLst>
+              <a:ext uri="{FF2B5EF4-FFF2-40B4-BE49-F238E27FC236}">
+                <a16:creationId xmlns:a16="http://schemas.microsoft.com/office/drawing/2014/main" id="{434A8414-5F70-4176-9C67-F599FEAF37C7}"/>
+              </a:ext>
+            </a:extLst>
+          </p:cNvPr>
+          <p:cNvSpPr>
+            <a:spLocks noGrp="1"/>
+          </p:cNvSpPr>
+          <p:nvPr>
+            <p:ph type="body" sz="quarter" idx="13"/>
+          </p:nvPr>
+        </p:nvSpPr>
+        <p:spPr/>
+        <p:txBody>
+          <a:bodyPr/>
+          <a:lstStyle/>
+          <a:p>
+            <a:endParaRPr lang="ko-KR" altLang="en-US" dirty="0"/>
+          </a:p>
+        </p:txBody>
+      </p:sp>
+    </p:spTree>
+    <p:extLst>
+      <p:ext uri="{BB962C8B-B14F-4D97-AF65-F5344CB8AC3E}">
+        <p14:creationId xmlns:p14="http://schemas.microsoft.com/office/powerpoint/2010/main" val="2820595356"/>
+      </p:ext>
+    </p:extLst>
+  </p:cSld>
+  <p:clrMapOvr>
+    <a:masterClrMapping/>
+  </p:clrMapOvr>
+</p:sld>
+</file>
+
+<file path=ppt/slides/slide5.xml><?xml version="1.0" encoding="utf-8"?>
+<p:sld xmlns:a="http://schemas.openxmlformats.org/drawingml/2006/main" xmlns:r="http://schemas.openxmlformats.org/officeDocument/2006/relationships" xmlns:p="http://schemas.openxmlformats.org/presentationml/2006/main">
+  <p:cSld>
+    <p:spTree>
+      <p:nvGrpSpPr>
+        <p:cNvPr id="1" name=""/>
+        <p:cNvGrpSpPr/>
+        <p:nvPr/>
+      </p:nvGrpSpPr>
+      <p:grpSpPr>
+        <a:xfrm>
+          <a:off x="0" y="0"/>
+          <a:ext cx="0" cy="0"/>
+          <a:chOff x="0" y="0"/>
+          <a:chExt cx="0" cy="0"/>
+        </a:xfrm>
+      </p:grpSpPr>
+      <p:sp>
+        <p:nvSpPr>
+          <p:cNvPr id="2" name="제목 1">
+            <a:extLst>
+              <a:ext uri="{FF2B5EF4-FFF2-40B4-BE49-F238E27FC236}">
+                <a16:creationId xmlns:a16="http://schemas.microsoft.com/office/drawing/2014/main" id="{726EA825-3053-4BB1-A4DD-7E4D23F91AA2}"/>
+              </a:ext>
+            </a:extLst>
+          </p:cNvPr>
+          <p:cNvSpPr>
+            <a:spLocks noGrp="1"/>
+          </p:cNvSpPr>
+          <p:nvPr>
+            <p:ph type="title"/>
+          </p:nvPr>
+        </p:nvSpPr>
+        <p:spPr/>
+        <p:txBody>
+          <a:bodyPr/>
+          <a:lstStyle/>
+          <a:p>
+            <a:r>
+              <a:rPr lang="ko-KR" altLang="en-US" dirty="0"/>
+              <a:t>프로그램 개요</a:t>
+            </a:r>
+          </a:p>
+        </p:txBody>
+      </p:sp>
+      <p:sp>
+        <p:nvSpPr>
+          <p:cNvPr id="5" name="텍스트 개체 틀 4">
+            <a:extLst>
+              <a:ext uri="{FF2B5EF4-FFF2-40B4-BE49-F238E27FC236}">
+                <a16:creationId xmlns:a16="http://schemas.microsoft.com/office/drawing/2014/main" id="{59475BC8-9E84-447B-BB2C-33A73FF61442}"/>
+              </a:ext>
+            </a:extLst>
+          </p:cNvPr>
+          <p:cNvSpPr>
+            <a:spLocks noGrp="1"/>
+          </p:cNvSpPr>
+          <p:nvPr>
+            <p:ph type="body" idx="1"/>
+          </p:nvPr>
+        </p:nvSpPr>
+        <p:spPr/>
+        <p:txBody>
+          <a:bodyPr/>
+          <a:lstStyle/>
+          <a:p>
+            <a:endParaRPr lang="ko-KR" altLang="en-US"/>
+          </a:p>
+        </p:txBody>
+      </p:sp>
+      <p:sp>
+        <p:nvSpPr>
+          <p:cNvPr id="4" name="슬라이드 번호 개체 틀 3">
+            <a:extLst>
+              <a:ext uri="{FF2B5EF4-FFF2-40B4-BE49-F238E27FC236}">
+                <a16:creationId xmlns:a16="http://schemas.microsoft.com/office/drawing/2014/main" id="{55E3A155-78B4-439F-AF18-2D06E0AD5CB8}"/>
+              </a:ext>
+            </a:extLst>
+          </p:cNvPr>
+          <p:cNvSpPr>
+            <a:spLocks noGrp="1"/>
+          </p:cNvSpPr>
+          <p:nvPr>
+            <p:ph type="sldNum" sz="quarter" idx="12"/>
+          </p:nvPr>
+        </p:nvSpPr>
+        <p:spPr/>
+        <p:txBody>
+          <a:bodyPr/>
+          <a:lstStyle/>
+          <a:p>
+            <a:fld id="{D74ECCE6-482B-4E3F-A4EE-5A2B5F793A19}" type="slidenum">
+              <a:rPr lang="ko-KR" altLang="en-US" smtClean="0"/>
+              <a:t>5</a:t>
+            </a:fld>
+            <a:endParaRPr lang="ko-KR" altLang="en-US"/>
+          </a:p>
+        </p:txBody>
+      </p:sp>
+    </p:spTree>
+    <p:extLst>
+      <p:ext uri="{BB962C8B-B14F-4D97-AF65-F5344CB8AC3E}">
+        <p14:creationId xmlns:p14="http://schemas.microsoft.com/office/powerpoint/2010/main" val="777200461"/>
+      </p:ext>
+    </p:extLst>
+  </p:cSld>
+  <p:clrMapOvr>
+    <a:masterClrMapping/>
+  </p:clrMapOvr>
+</p:sld>
+</file>
+
+<file path=ppt/slides/slide6.xml><?xml version="1.0" encoding="utf-8"?>
+<p:sld xmlns:a="http://schemas.openxmlformats.org/drawingml/2006/main" xmlns:r="http://schemas.openxmlformats.org/officeDocument/2006/relationships" xmlns:p="http://schemas.openxmlformats.org/presentationml/2006/main">
+  <p:cSld>
+    <p:spTree>
+      <p:nvGrpSpPr>
+        <p:cNvPr id="1" name=""/>
+        <p:cNvGrpSpPr/>
+        <p:nvPr/>
+      </p:nvGrpSpPr>
+      <p:grpSpPr>
+        <a:xfrm>
+          <a:off x="0" y="0"/>
+          <a:ext cx="0" cy="0"/>
+          <a:chOff x="0" y="0"/>
+          <a:chExt cx="0" cy="0"/>
+        </a:xfrm>
+      </p:grpSpPr>
+      <p:sp>
+        <p:nvSpPr>
+          <p:cNvPr id="2" name="제목 1">
+            <a:extLst>
+              <a:ext uri="{FF2B5EF4-FFF2-40B4-BE49-F238E27FC236}">
+                <a16:creationId xmlns:a16="http://schemas.microsoft.com/office/drawing/2014/main" id="{598A6417-3B36-4277-8644-E0246B6DAA2F}"/>
+              </a:ext>
+            </a:extLst>
+          </p:cNvPr>
+          <p:cNvSpPr>
+            <a:spLocks noGrp="1"/>
+          </p:cNvSpPr>
+          <p:nvPr>
+            <p:ph type="title"/>
+          </p:nvPr>
+        </p:nvSpPr>
+        <p:spPr/>
+        <p:txBody>
+          <a:bodyPr>
+            <a:normAutofit fontScale="90000"/>
+          </a:bodyPr>
+          <a:lstStyle/>
+          <a:p>
+            <a:r>
+              <a:rPr lang="ko-KR" altLang="en-US" dirty="0"/>
+              <a:t>프로그램 개요</a:t>
+            </a:r>
+          </a:p>
+        </p:txBody>
+      </p:sp>
+      <p:sp>
+        <p:nvSpPr>
+          <p:cNvPr id="4" name="슬라이드 번호 개체 틀 3">
+            <a:extLst>
+              <a:ext uri="{FF2B5EF4-FFF2-40B4-BE49-F238E27FC236}">
+                <a16:creationId xmlns:a16="http://schemas.microsoft.com/office/drawing/2014/main" id="{38FDC87F-11A9-4652-95C5-53FE09F401B2}"/>
+              </a:ext>
+            </a:extLst>
+          </p:cNvPr>
+          <p:cNvSpPr>
+            <a:spLocks noGrp="1"/>
+          </p:cNvSpPr>
+          <p:nvPr>
+            <p:ph type="sldNum" sz="quarter" idx="12"/>
+          </p:nvPr>
+        </p:nvSpPr>
+        <p:spPr/>
+        <p:txBody>
+          <a:bodyPr/>
+          <a:lstStyle/>
+          <a:p>
+            <a:fld id="{D74ECCE6-482B-4E3F-A4EE-5A2B5F793A19}" type="slidenum">
+              <a:rPr lang="ko-KR" altLang="en-US" smtClean="0"/>
+              <a:t>6</a:t>
+            </a:fld>
+            <a:endParaRPr lang="ko-KR" altLang="en-US"/>
+          </a:p>
+        </p:txBody>
+      </p:sp>
+      <p:sp>
+        <p:nvSpPr>
+          <p:cNvPr id="3" name="내용 개체 틀 2">
+            <a:extLst>
+              <a:ext uri="{FF2B5EF4-FFF2-40B4-BE49-F238E27FC236}">
+                <a16:creationId xmlns:a16="http://schemas.microsoft.com/office/drawing/2014/main" id="{ABF2E82B-560E-457B-8261-C9AB63C3E27A}"/>
+              </a:ext>
+            </a:extLst>
+          </p:cNvPr>
+          <p:cNvSpPr>
+            <a:spLocks noGrp="1"/>
+          </p:cNvSpPr>
+          <p:nvPr>
+            <p:ph type="body" sz="quarter" idx="13"/>
+          </p:nvPr>
+        </p:nvSpPr>
+        <p:spPr/>
+        <p:txBody>
+          <a:bodyPr>
+            <a:normAutofit/>
+          </a:bodyPr>
+          <a:lstStyle/>
+          <a:p>
+            <a:r>
+              <a:rPr lang="ko-KR" altLang="en-US" dirty="0"/>
+              <a:t>개발환경</a:t>
+            </a:r>
+            <a:endParaRPr lang="en-US" altLang="ko-KR" dirty="0"/>
+          </a:p>
+        </p:txBody>
+      </p:sp>
+      <p:sp>
+        <p:nvSpPr>
+          <p:cNvPr id="5" name="직사각형 4">
+            <a:extLst>
+              <a:ext uri="{FF2B5EF4-FFF2-40B4-BE49-F238E27FC236}">
+                <a16:creationId xmlns:a16="http://schemas.microsoft.com/office/drawing/2014/main" id="{D8022088-43F3-48C8-85FA-3E254A17B535}"/>
+              </a:ext>
+            </a:extLst>
+          </p:cNvPr>
+          <p:cNvSpPr/>
+          <p:nvPr/>
+        </p:nvSpPr>
+        <p:spPr>
+          <a:xfrm>
+            <a:off x="903005" y="1653050"/>
+            <a:ext cx="6096000" cy="646331"/>
+          </a:xfrm>
+          <a:prstGeom prst="rect">
+            <a:avLst/>
+          </a:prstGeom>
+        </p:spPr>
+        <p:txBody>
+          <a:bodyPr>
+            <a:spAutoFit/>
+          </a:bodyPr>
+          <a:lstStyle/>
+          <a:p>
+            <a:r>
+              <a:rPr lang="ko-KR" altLang="en-US" dirty="0"/>
+              <a:t>자바</a:t>
+            </a:r>
+            <a:br>
+              <a:rPr lang="en-US" altLang="ko-KR" dirty="0"/>
+            </a:br>
+            <a:r>
+              <a:rPr lang="ko-KR" altLang="en-US" dirty="0"/>
+              <a:t>이클립스</a:t>
+            </a:r>
+          </a:p>
+        </p:txBody>
+      </p:sp>
+    </p:spTree>
+    <p:extLst>
+      <p:ext uri="{BB962C8B-B14F-4D97-AF65-F5344CB8AC3E}">
+        <p14:creationId xmlns:p14="http://schemas.microsoft.com/office/powerpoint/2010/main" val="2410395274"/>
+      </p:ext>
+    </p:extLst>
+  </p:cSld>
+  <p:clrMapOvr>
+    <a:masterClrMapping/>
+  </p:clrMapOvr>
+</p:sld>
+</file>
+
+<file path=ppt/slides/slide7.xml><?xml version="1.0" encoding="utf-8"?>
+<p:sld xmlns:a="http://schemas.openxmlformats.org/drawingml/2006/main" xmlns:r="http://schemas.openxmlformats.org/officeDocument/2006/relationships" xmlns:p="http://schemas.openxmlformats.org/presentationml/2006/main">
+  <p:cSld>
+    <p:spTree>
+      <p:nvGrpSpPr>
+        <p:cNvPr id="1" name=""/>
+        <p:cNvGrpSpPr/>
+        <p:nvPr/>
+      </p:nvGrpSpPr>
+      <p:grpSpPr>
+        <a:xfrm>
+          <a:off x="0" y="0"/>
+          <a:ext cx="0" cy="0"/>
+          <a:chOff x="0" y="0"/>
+          <a:chExt cx="0" cy="0"/>
+        </a:xfrm>
+      </p:grpSpPr>
+      <p:sp>
+        <p:nvSpPr>
+          <p:cNvPr id="2" name="제목 1">
+            <a:extLst>
+              <a:ext uri="{FF2B5EF4-FFF2-40B4-BE49-F238E27FC236}">
+                <a16:creationId xmlns:a16="http://schemas.microsoft.com/office/drawing/2014/main" id="{7A7984E6-50C5-409C-B450-EDAC56BA783A}"/>
+              </a:ext>
+            </a:extLst>
+          </p:cNvPr>
+          <p:cNvSpPr>
+            <a:spLocks noGrp="1"/>
+          </p:cNvSpPr>
+          <p:nvPr>
+            <p:ph type="title"/>
+          </p:nvPr>
+        </p:nvSpPr>
+        <p:spPr/>
+        <p:txBody>
+          <a:bodyPr>
+            <a:normAutofit fontScale="90000"/>
+          </a:bodyPr>
+          <a:lstStyle/>
+          <a:p>
+            <a:r>
+              <a:rPr lang="ko-KR" altLang="en-US" dirty="0"/>
+              <a:t>프로그램 개요</a:t>
+            </a:r>
+          </a:p>
+        </p:txBody>
+      </p:sp>
+      <p:sp>
+        <p:nvSpPr>
+          <p:cNvPr id="4" name="슬라이드 번호 개체 틀 3">
+            <a:extLst>
+              <a:ext uri="{FF2B5EF4-FFF2-40B4-BE49-F238E27FC236}">
+                <a16:creationId xmlns:a16="http://schemas.microsoft.com/office/drawing/2014/main" id="{10FE4884-37B3-4D6E-A12D-36F3EC4FACCE}"/>
+              </a:ext>
+            </a:extLst>
+          </p:cNvPr>
+          <p:cNvSpPr>
+            <a:spLocks noGrp="1"/>
+          </p:cNvSpPr>
+          <p:nvPr>
+            <p:ph type="sldNum" sz="quarter" idx="12"/>
+          </p:nvPr>
+        </p:nvSpPr>
+        <p:spPr/>
+        <p:txBody>
+          <a:bodyPr/>
+          <a:lstStyle/>
+          <a:p>
+            <a:fld id="{D74ECCE6-482B-4E3F-A4EE-5A2B5F793A19}" type="slidenum">
+              <a:rPr lang="ko-KR" altLang="en-US" smtClean="0"/>
+              <a:t>7</a:t>
+            </a:fld>
+            <a:endParaRPr lang="ko-KR" altLang="en-US"/>
+          </a:p>
+        </p:txBody>
+      </p:sp>
+      <p:sp>
+        <p:nvSpPr>
+          <p:cNvPr id="3" name="내용 개체 틀 2">
+            <a:extLst>
+              <a:ext uri="{FF2B5EF4-FFF2-40B4-BE49-F238E27FC236}">
+                <a16:creationId xmlns:a16="http://schemas.microsoft.com/office/drawing/2014/main" id="{863C020D-B5BB-4513-8E55-4275CA0364BB}"/>
+              </a:ext>
+            </a:extLst>
+          </p:cNvPr>
+          <p:cNvSpPr>
+            <a:spLocks noGrp="1"/>
+          </p:cNvSpPr>
+          <p:nvPr>
+            <p:ph type="body" sz="quarter" idx="13"/>
+          </p:nvPr>
+        </p:nvSpPr>
+        <p:spPr/>
+        <p:txBody>
+          <a:bodyPr/>
+          <a:lstStyle/>
+          <a:p>
+            <a:r>
+              <a:rPr lang="ko-KR" altLang="en-US" dirty="0"/>
+              <a:t>게임 소개</a:t>
+            </a:r>
+            <a:r>
+              <a:rPr lang="en-US" altLang="ko-KR" dirty="0"/>
+              <a:t> – </a:t>
+            </a:r>
+            <a:r>
+              <a:rPr lang="ko-KR" altLang="en-US" dirty="0"/>
+              <a:t>플레이 방법</a:t>
+            </a:r>
+            <a:endParaRPr lang="en-US" altLang="ko-KR" dirty="0"/>
+          </a:p>
+          <a:p>
+            <a:endParaRPr lang="en-US" altLang="ko-KR" dirty="0"/>
+          </a:p>
+        </p:txBody>
+      </p:sp>
+    </p:spTree>
+    <p:extLst>
+      <p:ext uri="{BB962C8B-B14F-4D97-AF65-F5344CB8AC3E}">
+        <p14:creationId xmlns:p14="http://schemas.microsoft.com/office/powerpoint/2010/main" val="1598646997"/>
+      </p:ext>
+    </p:extLst>
+  </p:cSld>
+  <p:clrMapOvr>
+    <a:masterClrMapping/>
+  </p:clrMapOvr>
+</p:sld>
+</file>
+
+<file path=ppt/slides/slide8.xml><?xml version="1.0" encoding="utf-8"?>
+<p:sld xmlns:a="http://schemas.openxmlformats.org/drawingml/2006/main" xmlns:r="http://schemas.openxmlformats.org/officeDocument/2006/relationships" xmlns:p="http://schemas.openxmlformats.org/presentationml/2006/main">
+  <p:cSld>
+    <p:spTree>
+      <p:nvGrpSpPr>
+        <p:cNvPr id="1" name=""/>
+        <p:cNvGrpSpPr/>
+        <p:nvPr/>
+      </p:nvGrpSpPr>
+      <p:grpSpPr>
+        <a:xfrm>
+          <a:off x="0" y="0"/>
+          <a:ext cx="0" cy="0"/>
+          <a:chOff x="0" y="0"/>
+          <a:chExt cx="0" cy="0"/>
+        </a:xfrm>
+      </p:grpSpPr>
+      <p:sp>
+        <p:nvSpPr>
+          <p:cNvPr id="2" name="제목 1">
+            <a:extLst>
+              <a:ext uri="{FF2B5EF4-FFF2-40B4-BE49-F238E27FC236}">
+                <a16:creationId xmlns:a16="http://schemas.microsoft.com/office/drawing/2014/main" id="{7A7984E6-50C5-409C-B450-EDAC56BA783A}"/>
+              </a:ext>
+            </a:extLst>
+          </p:cNvPr>
+          <p:cNvSpPr>
+            <a:spLocks noGrp="1"/>
+          </p:cNvSpPr>
+          <p:nvPr>
+            <p:ph type="title"/>
+          </p:nvPr>
+        </p:nvSpPr>
+        <p:spPr/>
+        <p:txBody>
+          <a:bodyPr>
+            <a:normAutofit fontScale="90000"/>
+          </a:bodyPr>
+          <a:lstStyle/>
+          <a:p>
+            <a:r>
+              <a:rPr lang="ko-KR" altLang="en-US" dirty="0"/>
+              <a:t>프로그램 개요</a:t>
+            </a:r>
+          </a:p>
+        </p:txBody>
+      </p:sp>
+      <p:sp>
+        <p:nvSpPr>
+          <p:cNvPr id="4" name="슬라이드 번호 개체 틀 3">
+            <a:extLst>
+              <a:ext uri="{FF2B5EF4-FFF2-40B4-BE49-F238E27FC236}">
+                <a16:creationId xmlns:a16="http://schemas.microsoft.com/office/drawing/2014/main" id="{10FE4884-37B3-4D6E-A12D-36F3EC4FACCE}"/>
+              </a:ext>
+            </a:extLst>
+          </p:cNvPr>
+          <p:cNvSpPr>
+            <a:spLocks noGrp="1"/>
+          </p:cNvSpPr>
+          <p:nvPr>
+            <p:ph type="sldNum" sz="quarter" idx="12"/>
+          </p:nvPr>
+        </p:nvSpPr>
+        <p:spPr/>
+        <p:txBody>
+          <a:bodyPr/>
+          <a:lstStyle/>
+          <a:p>
+            <a:fld id="{D74ECCE6-482B-4E3F-A4EE-5A2B5F793A19}" type="slidenum">
+              <a:rPr lang="ko-KR" altLang="en-US" smtClean="0"/>
+              <a:t>8</a:t>
+            </a:fld>
+            <a:endParaRPr lang="ko-KR" altLang="en-US"/>
+          </a:p>
+        </p:txBody>
+      </p:sp>
+      <p:sp>
+        <p:nvSpPr>
+          <p:cNvPr id="3" name="내용 개체 틀 2">
+            <a:extLst>
+              <a:ext uri="{FF2B5EF4-FFF2-40B4-BE49-F238E27FC236}">
+                <a16:creationId xmlns:a16="http://schemas.microsoft.com/office/drawing/2014/main" id="{863C020D-B5BB-4513-8E55-4275CA0364BB}"/>
+              </a:ext>
+            </a:extLst>
+          </p:cNvPr>
+          <p:cNvSpPr>
+            <a:spLocks noGrp="1"/>
+          </p:cNvSpPr>
+          <p:nvPr>
+            <p:ph type="body" sz="quarter" idx="13"/>
+          </p:nvPr>
+        </p:nvSpPr>
+        <p:spPr/>
+        <p:txBody>
+          <a:bodyPr/>
+          <a:lstStyle/>
+          <a:p>
+            <a:r>
+              <a:rPr lang="ko-KR" altLang="en-US" dirty="0"/>
+              <a:t>게임 소개</a:t>
+            </a:r>
+            <a:r>
+              <a:rPr lang="en-US" altLang="ko-KR" dirty="0"/>
+              <a:t> – </a:t>
+            </a:r>
+            <a:r>
+              <a:rPr lang="ko-KR" altLang="en-US" dirty="0"/>
+              <a:t>스킬 사용</a:t>
+            </a:r>
+            <a:endParaRPr lang="en-US" altLang="ko-KR" dirty="0"/>
+          </a:p>
+          <a:p>
+            <a:endParaRPr lang="en-US" altLang="ko-KR" dirty="0"/>
+          </a:p>
+        </p:txBody>
+      </p:sp>
+    </p:spTree>
+    <p:extLst>
+      <p:ext uri="{BB962C8B-B14F-4D97-AF65-F5344CB8AC3E}">
+        <p14:creationId xmlns:p14="http://schemas.microsoft.com/office/powerpoint/2010/main" val="414150749"/>
+      </p:ext>
+    </p:extLst>
+  </p:cSld>
+  <p:clrMapOvr>
+    <a:masterClrMapping/>
+  </p:clrMapOvr>
+</p:sld>
+</file>
+
 <file path=ppt/slides/slide9.xml><?xml version="1.0" encoding="utf-8"?>
 <p:sld xmlns:a="http://schemas.openxmlformats.org/drawingml/2006/main" xmlns:r="http://schemas.openxmlformats.org/officeDocument/2006/relationships" xmlns:p="http://schemas.openxmlformats.org/presentationml/2006/main">
   <p:cSld>
@@ -6085,7 +6342,7 @@
           <p:cNvPr id="2" name="제목 1">
             <a:extLst>
               <a:ext uri="{FF2B5EF4-FFF2-40B4-BE49-F238E27FC236}">
-                <a16:creationId xmlns:a16="http://schemas.microsoft.com/office/drawing/2014/main" id="{C7A0B280-F0CD-4164-8680-F811DB928ABA}"/>
+                <a16:creationId xmlns:a16="http://schemas.microsoft.com/office/drawing/2014/main" id="{7A7984E6-50C5-409C-B450-EDAC56BA783A}"/>
               </a:ext>
             </a:extLst>
           </p:cNvPr>
@@ -6115,7 +6372,7 @@
           <p:cNvPr id="4" name="슬라이드 번호 개체 틀 3">
             <a:extLst>
               <a:ext uri="{FF2B5EF4-FFF2-40B4-BE49-F238E27FC236}">
-                <a16:creationId xmlns:a16="http://schemas.microsoft.com/office/drawing/2014/main" id="{5E0697F5-2C89-4895-95F1-AA1640583757}"/>
+                <a16:creationId xmlns:a16="http://schemas.microsoft.com/office/drawing/2014/main" id="{10FE4884-37B3-4D6E-A12D-36F3EC4FACCE}"/>
               </a:ext>
             </a:extLst>
           </p:cNvPr>
@@ -6141,10 +6398,10 @@
       </p:sp>
       <p:sp>
         <p:nvSpPr>
-          <p:cNvPr id="5" name="텍스트 개체 틀 4">
-            <a:extLst>
-              <a:ext uri="{FF2B5EF4-FFF2-40B4-BE49-F238E27FC236}">
-                <a16:creationId xmlns:a16="http://schemas.microsoft.com/office/drawing/2014/main" id="{050A3EDA-FB36-4940-AF46-FD171AE934BC}"/>
+          <p:cNvPr id="3" name="내용 개체 틀 2">
+            <a:extLst>
+              <a:ext uri="{FF2B5EF4-FFF2-40B4-BE49-F238E27FC236}">
+                <a16:creationId xmlns:a16="http://schemas.microsoft.com/office/drawing/2014/main" id="{863C020D-B5BB-4513-8E55-4275CA0364BB}"/>
               </a:ext>
             </a:extLst>
           </p:cNvPr>
@@ -6162,20 +6419,27 @@
           <a:p>
             <a:r>
               <a:rPr lang="ko-KR" altLang="en-US" dirty="0"/>
-              <a:t>순서도</a:t>
+              <a:t>게임 소개</a:t>
             </a:r>
             <a:r>
               <a:rPr lang="en-US" altLang="ko-KR" dirty="0"/>
-              <a:t>(?)</a:t>
-            </a:r>
-            <a:endParaRPr lang="ko-KR" altLang="en-US" dirty="0"/>
+              <a:t> – </a:t>
+            </a:r>
+            <a:r>
+              <a:rPr lang="ko-KR" altLang="en-US" dirty="0"/>
+              <a:t>업그레이드</a:t>
+            </a:r>
+            <a:endParaRPr lang="en-US" altLang="ko-KR" dirty="0"/>
+          </a:p>
+          <a:p>
+            <a:endParaRPr lang="en-US" altLang="ko-KR" dirty="0"/>
           </a:p>
         </p:txBody>
       </p:sp>
     </p:spTree>
     <p:extLst>
       <p:ext uri="{BB962C8B-B14F-4D97-AF65-F5344CB8AC3E}">
-        <p14:creationId xmlns:p14="http://schemas.microsoft.com/office/powerpoint/2010/main" val="3864131948"/>
+        <p14:creationId xmlns:p14="http://schemas.microsoft.com/office/powerpoint/2010/main" val="392900060"/>
       </p:ext>
     </p:extLst>
   </p:cSld>

</xml_diff>

<commit_message>
template add, template applied
</commit_message>
<xml_diff>
--- a/others/presentation.pptx
+++ b/others/presentation.pptx
@@ -212,7 +212,7 @@
           <a:p>
             <a:fld id="{748722A9-7175-4C1F-AD1D-0D433696AC08}" type="datetimeFigureOut">
               <a:rPr lang="ko-KR" altLang="en-US" smtClean="0"/>
-              <a:t>2018-09-07</a:t>
+              <a:t>2018-09-11</a:t>
             </a:fld>
             <a:endParaRPr lang="ko-KR" altLang="en-US"/>
           </a:p>
@@ -496,6 +496,42 @@
           <a:chExt cx="0" cy="0"/>
         </a:xfrm>
       </p:grpSpPr>
+      <p:pic>
+        <p:nvPicPr>
+          <p:cNvPr id="7" name="Picture 2">
+            <a:extLst>
+              <a:ext uri="{FF2B5EF4-FFF2-40B4-BE49-F238E27FC236}">
+                <a16:creationId xmlns:a16="http://schemas.microsoft.com/office/drawing/2014/main" id="{FBD581F7-9172-441E-B808-2721B8F867CA}"/>
+              </a:ext>
+            </a:extLst>
+          </p:cNvPr>
+          <p:cNvPicPr>
+            <a:picLocks noChangeAspect="1"/>
+          </p:cNvPicPr>
+          <p:nvPr userDrawn="1"/>
+        </p:nvPicPr>
+        <p:blipFill>
+          <a:blip r:embed="rId2">
+            <a:extLst>
+              <a:ext uri="{28A0092B-C50C-407E-A947-70E740481C1C}">
+                <a14:useLocalDpi xmlns:a14="http://schemas.microsoft.com/office/drawing/2010/main" val="0"/>
+              </a:ext>
+            </a:extLst>
+          </a:blip>
+          <a:stretch>
+            <a:fillRect/>
+          </a:stretch>
+        </p:blipFill>
+        <p:spPr>
+          <a:xfrm>
+            <a:off x="0" y="71"/>
+            <a:ext cx="12192000" cy="6859715"/>
+          </a:xfrm>
+          <a:prstGeom prst="rect">
+            <a:avLst/>
+          </a:prstGeom>
+        </p:spPr>
+      </p:pic>
       <p:sp>
         <p:nvSpPr>
           <p:cNvPr id="2" name="제목 1">
@@ -522,12 +558,16 @@
           <a:bodyPr anchor="b"/>
           <a:lstStyle>
             <a:lvl1pPr algn="ctr">
-              <a:defRPr sz="6000"/>
+              <a:defRPr sz="6000" b="1">
+                <a:solidFill>
+                  <a:schemeClr val="bg1"/>
+                </a:solidFill>
+              </a:defRPr>
             </a:lvl1pPr>
           </a:lstStyle>
           <a:p>
             <a:r>
-              <a:rPr lang="ko-KR" altLang="en-US"/>
+              <a:rPr lang="ko-KR" altLang="en-US" dirty="0"/>
               <a:t>마스터 제목 스타일 편집</a:t>
             </a:r>
           </a:p>
@@ -560,7 +600,11 @@
           <a:lstStyle>
             <a:lvl1pPr marL="0" indent="0" algn="ctr">
               <a:buNone/>
-              <a:defRPr sz="2400"/>
+              <a:defRPr sz="2400" b="1">
+                <a:solidFill>
+                  <a:schemeClr val="bg1"/>
+                </a:solidFill>
+              </a:defRPr>
             </a:lvl1pPr>
             <a:lvl2pPr marL="457200" indent="0" algn="ctr">
               <a:buNone/>
@@ -597,7 +641,7 @@
           </a:lstStyle>
           <a:p>
             <a:r>
-              <a:rPr lang="ko-KR" altLang="en-US"/>
+              <a:rPr lang="ko-KR" altLang="en-US" dirty="0"/>
               <a:t>클릭하여 마스터 부제목 스타일 편집</a:t>
             </a:r>
           </a:p>
@@ -626,7 +670,7 @@
           <a:p>
             <a:fld id="{3312928E-DF57-4251-8E45-A6EBC9490CA7}" type="datetime1">
               <a:rPr lang="ko-KR" altLang="en-US" smtClean="0"/>
-              <a:t>2018-09-07</a:t>
+              <a:t>2018-09-11</a:t>
             </a:fld>
             <a:endParaRPr lang="ko-KR" altLang="en-US"/>
           </a:p>
@@ -690,412 +734,6 @@
     <p:extLst>
       <p:ext uri="{BB962C8B-B14F-4D97-AF65-F5344CB8AC3E}">
         <p14:creationId xmlns:p14="http://schemas.microsoft.com/office/powerpoint/2010/main" val="3179222272"/>
-      </p:ext>
-    </p:extLst>
-  </p:cSld>
-  <p:clrMapOvr>
-    <a:masterClrMapping/>
-  </p:clrMapOvr>
-</p:sldLayout>
-</file>
-
-<file path=ppt/slideLayouts/slideLayout10.xml><?xml version="1.0" encoding="utf-8"?>
-<p:sldLayout xmlns:a="http://schemas.openxmlformats.org/drawingml/2006/main" xmlns:r="http://schemas.openxmlformats.org/officeDocument/2006/relationships" xmlns:p="http://schemas.openxmlformats.org/presentationml/2006/main" type="vertTx" preserve="1">
-  <p:cSld name="제목 및 세로 텍스트">
-    <p:spTree>
-      <p:nvGrpSpPr>
-        <p:cNvPr id="1" name=""/>
-        <p:cNvGrpSpPr/>
-        <p:nvPr/>
-      </p:nvGrpSpPr>
-      <p:grpSpPr>
-        <a:xfrm>
-          <a:off x="0" y="0"/>
-          <a:ext cx="0" cy="0"/>
-          <a:chOff x="0" y="0"/>
-          <a:chExt cx="0" cy="0"/>
-        </a:xfrm>
-      </p:grpSpPr>
-      <p:sp>
-        <p:nvSpPr>
-          <p:cNvPr id="2" name="제목 1">
-            <a:extLst>
-              <a:ext uri="{FF2B5EF4-FFF2-40B4-BE49-F238E27FC236}">
-                <a16:creationId xmlns:a16="http://schemas.microsoft.com/office/drawing/2014/main" id="{28C07FCA-57CB-491A-8D3E-33F0EA6FDF8F}"/>
-              </a:ext>
-            </a:extLst>
-          </p:cNvPr>
-          <p:cNvSpPr>
-            <a:spLocks noGrp="1"/>
-          </p:cNvSpPr>
-          <p:nvPr>
-            <p:ph type="title"/>
-          </p:nvPr>
-        </p:nvSpPr>
-        <p:spPr/>
-        <p:txBody>
-          <a:bodyPr/>
-          <a:lstStyle/>
-          <a:p>
-            <a:r>
-              <a:rPr lang="ko-KR" altLang="en-US"/>
-              <a:t>마스터 제목 스타일 편집</a:t>
-            </a:r>
-          </a:p>
-        </p:txBody>
-      </p:sp>
-      <p:sp>
-        <p:nvSpPr>
-          <p:cNvPr id="3" name="세로 텍스트 개체 틀 2">
-            <a:extLst>
-              <a:ext uri="{FF2B5EF4-FFF2-40B4-BE49-F238E27FC236}">
-                <a16:creationId xmlns:a16="http://schemas.microsoft.com/office/drawing/2014/main" id="{D5554768-6D5B-49EF-AA7A-868EEC3D7D01}"/>
-              </a:ext>
-            </a:extLst>
-          </p:cNvPr>
-          <p:cNvSpPr>
-            <a:spLocks noGrp="1"/>
-          </p:cNvSpPr>
-          <p:nvPr>
-            <p:ph type="body" orient="vert" idx="1"/>
-          </p:nvPr>
-        </p:nvSpPr>
-        <p:spPr/>
-        <p:txBody>
-          <a:bodyPr vert="eaVert"/>
-          <a:lstStyle/>
-          <a:p>
-            <a:pPr lvl="0"/>
-            <a:r>
-              <a:rPr lang="ko-KR" altLang="en-US"/>
-              <a:t>마스터 텍스트 스타일 편집</a:t>
-            </a:r>
-          </a:p>
-          <a:p>
-            <a:pPr lvl="1"/>
-            <a:r>
-              <a:rPr lang="ko-KR" altLang="en-US"/>
-              <a:t>둘째 수준</a:t>
-            </a:r>
-          </a:p>
-          <a:p>
-            <a:pPr lvl="2"/>
-            <a:r>
-              <a:rPr lang="ko-KR" altLang="en-US"/>
-              <a:t>셋째 수준</a:t>
-            </a:r>
-          </a:p>
-          <a:p>
-            <a:pPr lvl="3"/>
-            <a:r>
-              <a:rPr lang="ko-KR" altLang="en-US"/>
-              <a:t>넷째 수준</a:t>
-            </a:r>
-          </a:p>
-          <a:p>
-            <a:pPr lvl="4"/>
-            <a:r>
-              <a:rPr lang="ko-KR" altLang="en-US"/>
-              <a:t>다섯째 수준</a:t>
-            </a:r>
-          </a:p>
-        </p:txBody>
-      </p:sp>
-      <p:sp>
-        <p:nvSpPr>
-          <p:cNvPr id="4" name="날짜 개체 틀 3">
-            <a:extLst>
-              <a:ext uri="{FF2B5EF4-FFF2-40B4-BE49-F238E27FC236}">
-                <a16:creationId xmlns:a16="http://schemas.microsoft.com/office/drawing/2014/main" id="{90191D40-6AC7-4595-96BA-E31340B0BB19}"/>
-              </a:ext>
-            </a:extLst>
-          </p:cNvPr>
-          <p:cNvSpPr>
-            <a:spLocks noGrp="1"/>
-          </p:cNvSpPr>
-          <p:nvPr>
-            <p:ph type="dt" sz="half" idx="10"/>
-          </p:nvPr>
-        </p:nvSpPr>
-        <p:spPr/>
-        <p:txBody>
-          <a:bodyPr/>
-          <a:lstStyle/>
-          <a:p>
-            <a:fld id="{884145E0-40F1-4061-9536-6511DCCFD790}" type="datetime1">
-              <a:rPr lang="ko-KR" altLang="en-US" smtClean="0"/>
-              <a:t>2018-09-07</a:t>
-            </a:fld>
-            <a:endParaRPr lang="ko-KR" altLang="en-US"/>
-          </a:p>
-        </p:txBody>
-      </p:sp>
-      <p:sp>
-        <p:nvSpPr>
-          <p:cNvPr id="5" name="바닥글 개체 틀 4">
-            <a:extLst>
-              <a:ext uri="{FF2B5EF4-FFF2-40B4-BE49-F238E27FC236}">
-                <a16:creationId xmlns:a16="http://schemas.microsoft.com/office/drawing/2014/main" id="{2AEA11F8-2F6C-46D4-B305-FFED72196286}"/>
-              </a:ext>
-            </a:extLst>
-          </p:cNvPr>
-          <p:cNvSpPr>
-            <a:spLocks noGrp="1"/>
-          </p:cNvSpPr>
-          <p:nvPr>
-            <p:ph type="ftr" sz="quarter" idx="11"/>
-          </p:nvPr>
-        </p:nvSpPr>
-        <p:spPr/>
-        <p:txBody>
-          <a:bodyPr/>
-          <a:lstStyle/>
-          <a:p>
-            <a:endParaRPr lang="ko-KR" altLang="en-US"/>
-          </a:p>
-        </p:txBody>
-      </p:sp>
-      <p:sp>
-        <p:nvSpPr>
-          <p:cNvPr id="6" name="슬라이드 번호 개체 틀 5">
-            <a:extLst>
-              <a:ext uri="{FF2B5EF4-FFF2-40B4-BE49-F238E27FC236}">
-                <a16:creationId xmlns:a16="http://schemas.microsoft.com/office/drawing/2014/main" id="{D57E33E1-40A4-4211-A3C3-BEAA52BBCD01}"/>
-              </a:ext>
-            </a:extLst>
-          </p:cNvPr>
-          <p:cNvSpPr>
-            <a:spLocks noGrp="1"/>
-          </p:cNvSpPr>
-          <p:nvPr>
-            <p:ph type="sldNum" sz="quarter" idx="12"/>
-          </p:nvPr>
-        </p:nvSpPr>
-        <p:spPr/>
-        <p:txBody>
-          <a:bodyPr/>
-          <a:lstStyle/>
-          <a:p>
-            <a:fld id="{D74ECCE6-482B-4E3F-A4EE-5A2B5F793A19}" type="slidenum">
-              <a:rPr lang="ko-KR" altLang="en-US" smtClean="0"/>
-              <a:t>‹#›</a:t>
-            </a:fld>
-            <a:endParaRPr lang="ko-KR" altLang="en-US"/>
-          </a:p>
-        </p:txBody>
-      </p:sp>
-    </p:spTree>
-    <p:extLst>
-      <p:ext uri="{BB962C8B-B14F-4D97-AF65-F5344CB8AC3E}">
-        <p14:creationId xmlns:p14="http://schemas.microsoft.com/office/powerpoint/2010/main" val="1323524667"/>
-      </p:ext>
-    </p:extLst>
-  </p:cSld>
-  <p:clrMapOvr>
-    <a:masterClrMapping/>
-  </p:clrMapOvr>
-</p:sldLayout>
-</file>
-
-<file path=ppt/slideLayouts/slideLayout11.xml><?xml version="1.0" encoding="utf-8"?>
-<p:sldLayout xmlns:a="http://schemas.openxmlformats.org/drawingml/2006/main" xmlns:r="http://schemas.openxmlformats.org/officeDocument/2006/relationships" xmlns:p="http://schemas.openxmlformats.org/presentationml/2006/main" type="vertTitleAndTx" preserve="1">
-  <p:cSld name="세로 제목 및 텍스트">
-    <p:spTree>
-      <p:nvGrpSpPr>
-        <p:cNvPr id="1" name=""/>
-        <p:cNvGrpSpPr/>
-        <p:nvPr/>
-      </p:nvGrpSpPr>
-      <p:grpSpPr>
-        <a:xfrm>
-          <a:off x="0" y="0"/>
-          <a:ext cx="0" cy="0"/>
-          <a:chOff x="0" y="0"/>
-          <a:chExt cx="0" cy="0"/>
-        </a:xfrm>
-      </p:grpSpPr>
-      <p:sp>
-        <p:nvSpPr>
-          <p:cNvPr id="2" name="세로 제목 1">
-            <a:extLst>
-              <a:ext uri="{FF2B5EF4-FFF2-40B4-BE49-F238E27FC236}">
-                <a16:creationId xmlns:a16="http://schemas.microsoft.com/office/drawing/2014/main" id="{2C29EAA5-4B39-4778-BBDA-B4B67E1A9CF6}"/>
-              </a:ext>
-            </a:extLst>
-          </p:cNvPr>
-          <p:cNvSpPr>
-            <a:spLocks noGrp="1"/>
-          </p:cNvSpPr>
-          <p:nvPr>
-            <p:ph type="title" orient="vert"/>
-          </p:nvPr>
-        </p:nvSpPr>
-        <p:spPr>
-          <a:xfrm>
-            <a:off x="8724900" y="365125"/>
-            <a:ext cx="2628900" cy="5811838"/>
-          </a:xfrm>
-        </p:spPr>
-        <p:txBody>
-          <a:bodyPr vert="eaVert"/>
-          <a:lstStyle/>
-          <a:p>
-            <a:r>
-              <a:rPr lang="ko-KR" altLang="en-US"/>
-              <a:t>마스터 제목 스타일 편집</a:t>
-            </a:r>
-          </a:p>
-        </p:txBody>
-      </p:sp>
-      <p:sp>
-        <p:nvSpPr>
-          <p:cNvPr id="3" name="세로 텍스트 개체 틀 2">
-            <a:extLst>
-              <a:ext uri="{FF2B5EF4-FFF2-40B4-BE49-F238E27FC236}">
-                <a16:creationId xmlns:a16="http://schemas.microsoft.com/office/drawing/2014/main" id="{CDBCFBF1-0543-48E6-A61A-2C04C0C86CE6}"/>
-              </a:ext>
-            </a:extLst>
-          </p:cNvPr>
-          <p:cNvSpPr>
-            <a:spLocks noGrp="1"/>
-          </p:cNvSpPr>
-          <p:nvPr>
-            <p:ph type="body" orient="vert" idx="1"/>
-          </p:nvPr>
-        </p:nvSpPr>
-        <p:spPr>
-          <a:xfrm>
-            <a:off x="838200" y="365125"/>
-            <a:ext cx="7734300" cy="5811838"/>
-          </a:xfrm>
-        </p:spPr>
-        <p:txBody>
-          <a:bodyPr vert="eaVert"/>
-          <a:lstStyle/>
-          <a:p>
-            <a:pPr lvl="0"/>
-            <a:r>
-              <a:rPr lang="ko-KR" altLang="en-US"/>
-              <a:t>마스터 텍스트 스타일 편집</a:t>
-            </a:r>
-          </a:p>
-          <a:p>
-            <a:pPr lvl="1"/>
-            <a:r>
-              <a:rPr lang="ko-KR" altLang="en-US"/>
-              <a:t>둘째 수준</a:t>
-            </a:r>
-          </a:p>
-          <a:p>
-            <a:pPr lvl="2"/>
-            <a:r>
-              <a:rPr lang="ko-KR" altLang="en-US"/>
-              <a:t>셋째 수준</a:t>
-            </a:r>
-          </a:p>
-          <a:p>
-            <a:pPr lvl="3"/>
-            <a:r>
-              <a:rPr lang="ko-KR" altLang="en-US"/>
-              <a:t>넷째 수준</a:t>
-            </a:r>
-          </a:p>
-          <a:p>
-            <a:pPr lvl="4"/>
-            <a:r>
-              <a:rPr lang="ko-KR" altLang="en-US"/>
-              <a:t>다섯째 수준</a:t>
-            </a:r>
-          </a:p>
-        </p:txBody>
-      </p:sp>
-      <p:sp>
-        <p:nvSpPr>
-          <p:cNvPr id="4" name="날짜 개체 틀 3">
-            <a:extLst>
-              <a:ext uri="{FF2B5EF4-FFF2-40B4-BE49-F238E27FC236}">
-                <a16:creationId xmlns:a16="http://schemas.microsoft.com/office/drawing/2014/main" id="{E1052B93-8204-4B69-879B-73673351EBDC}"/>
-              </a:ext>
-            </a:extLst>
-          </p:cNvPr>
-          <p:cNvSpPr>
-            <a:spLocks noGrp="1"/>
-          </p:cNvSpPr>
-          <p:nvPr>
-            <p:ph type="dt" sz="half" idx="10"/>
-          </p:nvPr>
-        </p:nvSpPr>
-        <p:spPr/>
-        <p:txBody>
-          <a:bodyPr/>
-          <a:lstStyle/>
-          <a:p>
-            <a:fld id="{8C54FC0F-C5D5-44DC-9E27-25925F7CB53F}" type="datetime1">
-              <a:rPr lang="ko-KR" altLang="en-US" smtClean="0"/>
-              <a:t>2018-09-07</a:t>
-            </a:fld>
-            <a:endParaRPr lang="ko-KR" altLang="en-US"/>
-          </a:p>
-        </p:txBody>
-      </p:sp>
-      <p:sp>
-        <p:nvSpPr>
-          <p:cNvPr id="5" name="바닥글 개체 틀 4">
-            <a:extLst>
-              <a:ext uri="{FF2B5EF4-FFF2-40B4-BE49-F238E27FC236}">
-                <a16:creationId xmlns:a16="http://schemas.microsoft.com/office/drawing/2014/main" id="{B89627BF-7E76-4C34-BA22-B8ACDF743B6D}"/>
-              </a:ext>
-            </a:extLst>
-          </p:cNvPr>
-          <p:cNvSpPr>
-            <a:spLocks noGrp="1"/>
-          </p:cNvSpPr>
-          <p:nvPr>
-            <p:ph type="ftr" sz="quarter" idx="11"/>
-          </p:nvPr>
-        </p:nvSpPr>
-        <p:spPr/>
-        <p:txBody>
-          <a:bodyPr/>
-          <a:lstStyle/>
-          <a:p>
-            <a:endParaRPr lang="ko-KR" altLang="en-US"/>
-          </a:p>
-        </p:txBody>
-      </p:sp>
-      <p:sp>
-        <p:nvSpPr>
-          <p:cNvPr id="6" name="슬라이드 번호 개체 틀 5">
-            <a:extLst>
-              <a:ext uri="{FF2B5EF4-FFF2-40B4-BE49-F238E27FC236}">
-                <a16:creationId xmlns:a16="http://schemas.microsoft.com/office/drawing/2014/main" id="{4E0D0021-AE45-4334-BE51-FEA5A6122E35}"/>
-              </a:ext>
-            </a:extLst>
-          </p:cNvPr>
-          <p:cNvSpPr>
-            <a:spLocks noGrp="1"/>
-          </p:cNvSpPr>
-          <p:nvPr>
-            <p:ph type="sldNum" sz="quarter" idx="12"/>
-          </p:nvPr>
-        </p:nvSpPr>
-        <p:spPr/>
-        <p:txBody>
-          <a:bodyPr/>
-          <a:lstStyle/>
-          <a:p>
-            <a:fld id="{D74ECCE6-482B-4E3F-A4EE-5A2B5F793A19}" type="slidenum">
-              <a:rPr lang="ko-KR" altLang="en-US" smtClean="0"/>
-              <a:t>‹#›</a:t>
-            </a:fld>
-            <a:endParaRPr lang="ko-KR" altLang="en-US"/>
-          </a:p>
-        </p:txBody>
-      </p:sp>
-    </p:spTree>
-    <p:extLst>
-      <p:ext uri="{BB962C8B-B14F-4D97-AF65-F5344CB8AC3E}">
-        <p14:creationId xmlns:p14="http://schemas.microsoft.com/office/powerpoint/2010/main" val="2218173517"/>
       </p:ext>
     </p:extLst>
   </p:cSld>
@@ -1138,13 +776,24 @@
             <p:ph type="title"/>
           </p:nvPr>
         </p:nvSpPr>
-        <p:spPr/>
-        <p:txBody>
-          <a:bodyPr/>
-          <a:lstStyle/>
+        <p:spPr>
+          <a:xfrm>
+            <a:off x="3581400" y="1227139"/>
+            <a:ext cx="5238750" cy="811212"/>
+          </a:xfrm>
+        </p:spPr>
+        <p:txBody>
+          <a:bodyPr>
+            <a:normAutofit/>
+          </a:bodyPr>
+          <a:lstStyle>
+            <a:lvl1pPr>
+              <a:defRPr sz="3000"/>
+            </a:lvl1pPr>
+          </a:lstStyle>
           <a:p>
             <a:r>
-              <a:rPr lang="ko-KR" altLang="en-US"/>
+              <a:rPr lang="ko-KR" altLang="en-US" dirty="0"/>
               <a:t>마스터 제목 스타일 편집</a:t>
             </a:r>
           </a:p>
@@ -1166,42 +815,47 @@
             <p:ph idx="1"/>
           </p:nvPr>
         </p:nvSpPr>
-        <p:spPr/>
+        <p:spPr>
+          <a:xfrm>
+            <a:off x="3581400" y="2370137"/>
+            <a:ext cx="7772400" cy="3573463"/>
+          </a:xfrm>
+        </p:spPr>
         <p:txBody>
           <a:bodyPr/>
           <a:lstStyle/>
           <a:p>
             <a:pPr lvl="0"/>
             <a:r>
-              <a:rPr lang="ko-KR" altLang="en-US"/>
+              <a:rPr lang="ko-KR" altLang="en-US" dirty="0"/>
               <a:t>마스터 텍스트 스타일 편집</a:t>
             </a:r>
           </a:p>
           <a:p>
             <a:pPr lvl="1"/>
             <a:r>
-              <a:rPr lang="ko-KR" altLang="en-US"/>
+              <a:rPr lang="ko-KR" altLang="en-US" dirty="0"/>
               <a:t>둘째 수준</a:t>
             </a:r>
           </a:p>
           <a:p>
             <a:pPr lvl="2"/>
             <a:r>
-              <a:rPr lang="ko-KR" altLang="en-US"/>
+              <a:rPr lang="ko-KR" altLang="en-US" dirty="0"/>
               <a:t>셋째 수준</a:t>
             </a:r>
           </a:p>
           <a:p>
             <a:pPr lvl="3"/>
             <a:r>
-              <a:rPr lang="ko-KR" altLang="en-US"/>
+              <a:rPr lang="ko-KR" altLang="en-US" dirty="0"/>
               <a:t>넷째 수준</a:t>
             </a:r>
           </a:p>
           <a:p>
             <a:pPr lvl="4"/>
             <a:r>
-              <a:rPr lang="ko-KR" altLang="en-US"/>
+              <a:rPr lang="ko-KR" altLang="en-US" dirty="0"/>
               <a:t>다섯째 수준</a:t>
             </a:r>
           </a:p>
@@ -1230,7 +884,7 @@
           <a:p>
             <a:fld id="{2F278E7A-3809-4796-A65B-E6B6D3362AC5}" type="datetime1">
               <a:rPr lang="ko-KR" altLang="en-US" smtClean="0"/>
-              <a:t>2018-09-07</a:t>
+              <a:t>2018-09-11</a:t>
             </a:fld>
             <a:endParaRPr lang="ko-KR" altLang="en-US"/>
           </a:p>
@@ -1338,8 +992,8 @@
         </p:nvSpPr>
         <p:spPr>
           <a:xfrm>
-            <a:off x="831850" y="1709738"/>
-            <a:ext cx="10515600" cy="2852737"/>
+            <a:off x="3581400" y="985838"/>
+            <a:ext cx="7766050" cy="2852737"/>
           </a:xfrm>
         </p:spPr>
         <p:txBody>
@@ -1351,7 +1005,7 @@
           </a:lstStyle>
           <a:p>
             <a:r>
-              <a:rPr lang="ko-KR" altLang="en-US"/>
+              <a:rPr lang="ko-KR" altLang="en-US" dirty="0"/>
               <a:t>마스터 제목 스타일 편집</a:t>
             </a:r>
           </a:p>
@@ -1375,8 +1029,8 @@
         </p:nvSpPr>
         <p:spPr>
           <a:xfrm>
-            <a:off x="831850" y="4589463"/>
-            <a:ext cx="10515600" cy="1500187"/>
+            <a:off x="3581400" y="3865563"/>
+            <a:ext cx="7766050" cy="1500187"/>
           </a:xfrm>
         </p:spPr>
         <p:txBody>
@@ -1505,7 +1159,7 @@
           <a:p>
             <a:fld id="{AEFE7F38-CFA6-4516-B441-8B535521CAE0}" type="datetime1">
               <a:rPr lang="ko-KR" altLang="en-US" smtClean="0"/>
-              <a:t>2018-09-07</a:t>
+              <a:t>2018-09-11</a:t>
             </a:fld>
             <a:endParaRPr lang="ko-KR" altLang="en-US"/>
           </a:p>
@@ -1613,8 +1267,8 @@
         </p:nvSpPr>
         <p:spPr>
           <a:xfrm>
-            <a:off x="0" y="-2345"/>
-            <a:ext cx="10357503" cy="365125"/>
+            <a:off x="3320398" y="0"/>
+            <a:ext cx="3899552" cy="483430"/>
           </a:xfrm>
         </p:spPr>
         <p:txBody>
@@ -1657,7 +1311,7 @@
           <a:p>
             <a:fld id="{C77D5875-A28A-45ED-9BB5-129D406BDAE2}" type="datetime1">
               <a:rPr lang="ko-KR" altLang="en-US" smtClean="0"/>
-              <a:t>2018-09-07</a:t>
+              <a:t>2018-09-11</a:t>
             </a:fld>
             <a:endParaRPr lang="ko-KR" altLang="en-US"/>
           </a:p>
@@ -1735,8 +1389,8 @@
         </p:nvSpPr>
         <p:spPr>
           <a:xfrm>
-            <a:off x="-3175" y="376013"/>
-            <a:ext cx="10357503" cy="1162230"/>
+            <a:off x="3431848" y="772888"/>
+            <a:ext cx="8207702" cy="862237"/>
           </a:xfrm>
         </p:spPr>
         <p:txBody>
@@ -1788,8 +1442,8 @@
 </file>
 
 <file path=ppt/slideLayouts/slideLayout5.xml><?xml version="1.0" encoding="utf-8"?>
-<p:sldLayout xmlns:a="http://schemas.openxmlformats.org/drawingml/2006/main" xmlns:r="http://schemas.openxmlformats.org/officeDocument/2006/relationships" xmlns:p="http://schemas.openxmlformats.org/presentationml/2006/main" type="twoTxTwoObj" preserve="1">
-  <p:cSld name="비교">
+<p:sldLayout xmlns:a="http://schemas.openxmlformats.org/drawingml/2006/main" xmlns:r="http://schemas.openxmlformats.org/officeDocument/2006/relationships" xmlns:p="http://schemas.openxmlformats.org/presentationml/2006/main" preserve="1" userDrawn="1">
+  <p:cSld name="1_콘텐츠 2개">
     <p:spTree>
       <p:nvGrpSpPr>
         <p:cNvPr id="1" name=""/>
@@ -1809,7 +1463,7 @@
           <p:cNvPr id="2" name="제목 1">
             <a:extLst>
               <a:ext uri="{FF2B5EF4-FFF2-40B4-BE49-F238E27FC236}">
-                <a16:creationId xmlns:a16="http://schemas.microsoft.com/office/drawing/2014/main" id="{B978ECAF-3E9F-46BC-A3A6-069914B474AF}"/>
+                <a16:creationId xmlns:a16="http://schemas.microsoft.com/office/drawing/2014/main" id="{4B49778B-24F1-46E7-86F5-12F7A8D35552}"/>
               </a:ext>
             </a:extLst>
           </p:cNvPr>
@@ -1822,16 +1476,22 @@
         </p:nvSpPr>
         <p:spPr>
           <a:xfrm>
-            <a:off x="839788" y="365125"/>
-            <a:ext cx="10515600" cy="1325563"/>
+            <a:off x="3320398" y="0"/>
+            <a:ext cx="3899552" cy="483430"/>
           </a:xfrm>
         </p:spPr>
         <p:txBody>
-          <a:bodyPr/>
-          <a:lstStyle/>
+          <a:bodyPr>
+            <a:normAutofit/>
+          </a:bodyPr>
+          <a:lstStyle>
+            <a:lvl1pPr>
+              <a:defRPr sz="2000"/>
+            </a:lvl1pPr>
+          </a:lstStyle>
           <a:p>
             <a:r>
-              <a:rPr lang="ko-KR" altLang="en-US"/>
+              <a:rPr lang="ko-KR" altLang="en-US" dirty="0"/>
               <a:t>마스터 제목 스타일 편집</a:t>
             </a:r>
           </a:p>
@@ -1839,294 +1499,28 @@
       </p:sp>
       <p:sp>
         <p:nvSpPr>
-          <p:cNvPr id="3" name="텍스트 개체 틀 2">
-            <a:extLst>
-              <a:ext uri="{FF2B5EF4-FFF2-40B4-BE49-F238E27FC236}">
-                <a16:creationId xmlns:a16="http://schemas.microsoft.com/office/drawing/2014/main" id="{E9E543D6-E2B4-4AD1-932F-ACC09B459B57}"/>
-              </a:ext>
-            </a:extLst>
-          </p:cNvPr>
-          <p:cNvSpPr>
-            <a:spLocks noGrp="1"/>
-          </p:cNvSpPr>
-          <p:nvPr>
-            <p:ph type="body" idx="1"/>
-          </p:nvPr>
-        </p:nvSpPr>
-        <p:spPr>
-          <a:xfrm>
-            <a:off x="839788" y="1681163"/>
-            <a:ext cx="5157787" cy="823912"/>
-          </a:xfrm>
-        </p:spPr>
-        <p:txBody>
-          <a:bodyPr anchor="b"/>
-          <a:lstStyle>
-            <a:lvl1pPr marL="0" indent="0">
-              <a:buNone/>
-              <a:defRPr sz="2400" b="1"/>
-            </a:lvl1pPr>
-            <a:lvl2pPr marL="457200" indent="0">
-              <a:buNone/>
-              <a:defRPr sz="2000" b="1"/>
-            </a:lvl2pPr>
-            <a:lvl3pPr marL="914400" indent="0">
-              <a:buNone/>
-              <a:defRPr sz="1800" b="1"/>
-            </a:lvl3pPr>
-            <a:lvl4pPr marL="1371600" indent="0">
-              <a:buNone/>
-              <a:defRPr sz="1600" b="1"/>
-            </a:lvl4pPr>
-            <a:lvl5pPr marL="1828800" indent="0">
-              <a:buNone/>
-              <a:defRPr sz="1600" b="1"/>
-            </a:lvl5pPr>
-            <a:lvl6pPr marL="2286000" indent="0">
-              <a:buNone/>
-              <a:defRPr sz="1600" b="1"/>
-            </a:lvl6pPr>
-            <a:lvl7pPr marL="2743200" indent="0">
-              <a:buNone/>
-              <a:defRPr sz="1600" b="1"/>
-            </a:lvl7pPr>
-            <a:lvl8pPr marL="3200400" indent="0">
-              <a:buNone/>
-              <a:defRPr sz="1600" b="1"/>
-            </a:lvl8pPr>
-            <a:lvl9pPr marL="3657600" indent="0">
-              <a:buNone/>
-              <a:defRPr sz="1600" b="1"/>
-            </a:lvl9pPr>
-          </a:lstStyle>
-          <a:p>
-            <a:pPr lvl="0"/>
-            <a:r>
-              <a:rPr lang="ko-KR" altLang="en-US"/>
-              <a:t>마스터 텍스트 스타일 편집</a:t>
-            </a:r>
-          </a:p>
-        </p:txBody>
-      </p:sp>
-      <p:sp>
-        <p:nvSpPr>
-          <p:cNvPr id="4" name="내용 개체 틀 3">
-            <a:extLst>
-              <a:ext uri="{FF2B5EF4-FFF2-40B4-BE49-F238E27FC236}">
-                <a16:creationId xmlns:a16="http://schemas.microsoft.com/office/drawing/2014/main" id="{21CFEF75-2833-42C8-A0F8-5DC3C7404736}"/>
-              </a:ext>
-            </a:extLst>
-          </p:cNvPr>
-          <p:cNvSpPr>
-            <a:spLocks noGrp="1"/>
-          </p:cNvSpPr>
-          <p:nvPr>
-            <p:ph sz="half" idx="2"/>
-          </p:nvPr>
-        </p:nvSpPr>
-        <p:spPr>
-          <a:xfrm>
-            <a:off x="839788" y="2505075"/>
-            <a:ext cx="5157787" cy="3684588"/>
-          </a:xfrm>
-        </p:spPr>
+          <p:cNvPr id="5" name="날짜 개체 틀 4">
+            <a:extLst>
+              <a:ext uri="{FF2B5EF4-FFF2-40B4-BE49-F238E27FC236}">
+                <a16:creationId xmlns:a16="http://schemas.microsoft.com/office/drawing/2014/main" id="{EC276BDC-6786-4F1A-BC4C-6C7ACB2B0BF2}"/>
+              </a:ext>
+            </a:extLst>
+          </p:cNvPr>
+          <p:cNvSpPr>
+            <a:spLocks noGrp="1"/>
+          </p:cNvSpPr>
+          <p:nvPr>
+            <p:ph type="dt" sz="half" idx="10"/>
+          </p:nvPr>
+        </p:nvSpPr>
+        <p:spPr/>
         <p:txBody>
           <a:bodyPr/>
           <a:lstStyle/>
           <a:p>
-            <a:pPr lvl="0"/>
-            <a:r>
-              <a:rPr lang="ko-KR" altLang="en-US"/>
-              <a:t>마스터 텍스트 스타일 편집</a:t>
-            </a:r>
-          </a:p>
-          <a:p>
-            <a:pPr lvl="1"/>
-            <a:r>
-              <a:rPr lang="ko-KR" altLang="en-US"/>
-              <a:t>둘째 수준</a:t>
-            </a:r>
-          </a:p>
-          <a:p>
-            <a:pPr lvl="2"/>
-            <a:r>
-              <a:rPr lang="ko-KR" altLang="en-US"/>
-              <a:t>셋째 수준</a:t>
-            </a:r>
-          </a:p>
-          <a:p>
-            <a:pPr lvl="3"/>
-            <a:r>
-              <a:rPr lang="ko-KR" altLang="en-US"/>
-              <a:t>넷째 수준</a:t>
-            </a:r>
-          </a:p>
-          <a:p>
-            <a:pPr lvl="4"/>
-            <a:r>
-              <a:rPr lang="ko-KR" altLang="en-US"/>
-              <a:t>다섯째 수준</a:t>
-            </a:r>
-          </a:p>
-        </p:txBody>
-      </p:sp>
-      <p:sp>
-        <p:nvSpPr>
-          <p:cNvPr id="5" name="텍스트 개체 틀 4">
-            <a:extLst>
-              <a:ext uri="{FF2B5EF4-FFF2-40B4-BE49-F238E27FC236}">
-                <a16:creationId xmlns:a16="http://schemas.microsoft.com/office/drawing/2014/main" id="{58C78778-EAD4-4035-94E1-FFBA0BA618C3}"/>
-              </a:ext>
-            </a:extLst>
-          </p:cNvPr>
-          <p:cNvSpPr>
-            <a:spLocks noGrp="1"/>
-          </p:cNvSpPr>
-          <p:nvPr>
-            <p:ph type="body" sz="quarter" idx="3"/>
-          </p:nvPr>
-        </p:nvSpPr>
-        <p:spPr>
-          <a:xfrm>
-            <a:off x="6172200" y="1681163"/>
-            <a:ext cx="5183188" cy="823912"/>
-          </a:xfrm>
-        </p:spPr>
-        <p:txBody>
-          <a:bodyPr anchor="b"/>
-          <a:lstStyle>
-            <a:lvl1pPr marL="0" indent="0">
-              <a:buNone/>
-              <a:defRPr sz="2400" b="1"/>
-            </a:lvl1pPr>
-            <a:lvl2pPr marL="457200" indent="0">
-              <a:buNone/>
-              <a:defRPr sz="2000" b="1"/>
-            </a:lvl2pPr>
-            <a:lvl3pPr marL="914400" indent="0">
-              <a:buNone/>
-              <a:defRPr sz="1800" b="1"/>
-            </a:lvl3pPr>
-            <a:lvl4pPr marL="1371600" indent="0">
-              <a:buNone/>
-              <a:defRPr sz="1600" b="1"/>
-            </a:lvl4pPr>
-            <a:lvl5pPr marL="1828800" indent="0">
-              <a:buNone/>
-              <a:defRPr sz="1600" b="1"/>
-            </a:lvl5pPr>
-            <a:lvl6pPr marL="2286000" indent="0">
-              <a:buNone/>
-              <a:defRPr sz="1600" b="1"/>
-            </a:lvl6pPr>
-            <a:lvl7pPr marL="2743200" indent="0">
-              <a:buNone/>
-              <a:defRPr sz="1600" b="1"/>
-            </a:lvl7pPr>
-            <a:lvl8pPr marL="3200400" indent="0">
-              <a:buNone/>
-              <a:defRPr sz="1600" b="1"/>
-            </a:lvl8pPr>
-            <a:lvl9pPr marL="3657600" indent="0">
-              <a:buNone/>
-              <a:defRPr sz="1600" b="1"/>
-            </a:lvl9pPr>
-          </a:lstStyle>
-          <a:p>
-            <a:pPr lvl="0"/>
-            <a:r>
-              <a:rPr lang="ko-KR" altLang="en-US"/>
-              <a:t>마스터 텍스트 스타일 편집</a:t>
-            </a:r>
-          </a:p>
-        </p:txBody>
-      </p:sp>
-      <p:sp>
-        <p:nvSpPr>
-          <p:cNvPr id="6" name="내용 개체 틀 5">
-            <a:extLst>
-              <a:ext uri="{FF2B5EF4-FFF2-40B4-BE49-F238E27FC236}">
-                <a16:creationId xmlns:a16="http://schemas.microsoft.com/office/drawing/2014/main" id="{11C586F0-04F4-405A-ABE6-D1653DA4FDEC}"/>
-              </a:ext>
-            </a:extLst>
-          </p:cNvPr>
-          <p:cNvSpPr>
-            <a:spLocks noGrp="1"/>
-          </p:cNvSpPr>
-          <p:nvPr>
-            <p:ph sz="quarter" idx="4"/>
-          </p:nvPr>
-        </p:nvSpPr>
-        <p:spPr>
-          <a:xfrm>
-            <a:off x="6172200" y="2505075"/>
-            <a:ext cx="5183188" cy="3684588"/>
-          </a:xfrm>
-        </p:spPr>
-        <p:txBody>
-          <a:bodyPr/>
-          <a:lstStyle/>
-          <a:p>
-            <a:pPr lvl="0"/>
-            <a:r>
-              <a:rPr lang="ko-KR" altLang="en-US"/>
-              <a:t>마스터 텍스트 스타일 편집</a:t>
-            </a:r>
-          </a:p>
-          <a:p>
-            <a:pPr lvl="1"/>
-            <a:r>
-              <a:rPr lang="ko-KR" altLang="en-US"/>
-              <a:t>둘째 수준</a:t>
-            </a:r>
-          </a:p>
-          <a:p>
-            <a:pPr lvl="2"/>
-            <a:r>
-              <a:rPr lang="ko-KR" altLang="en-US"/>
-              <a:t>셋째 수준</a:t>
-            </a:r>
-          </a:p>
-          <a:p>
-            <a:pPr lvl="3"/>
-            <a:r>
-              <a:rPr lang="ko-KR" altLang="en-US"/>
-              <a:t>넷째 수준</a:t>
-            </a:r>
-          </a:p>
-          <a:p>
-            <a:pPr lvl="4"/>
-            <a:r>
-              <a:rPr lang="ko-KR" altLang="en-US"/>
-              <a:t>다섯째 수준</a:t>
-            </a:r>
-          </a:p>
-        </p:txBody>
-      </p:sp>
-      <p:sp>
-        <p:nvSpPr>
-          <p:cNvPr id="7" name="날짜 개체 틀 6">
-            <a:extLst>
-              <a:ext uri="{FF2B5EF4-FFF2-40B4-BE49-F238E27FC236}">
-                <a16:creationId xmlns:a16="http://schemas.microsoft.com/office/drawing/2014/main" id="{EB0DE28D-0FA0-421D-9120-4A0E059598DC}"/>
-              </a:ext>
-            </a:extLst>
-          </p:cNvPr>
-          <p:cNvSpPr>
-            <a:spLocks noGrp="1"/>
-          </p:cNvSpPr>
-          <p:nvPr>
-            <p:ph type="dt" sz="half" idx="10"/>
-          </p:nvPr>
-        </p:nvSpPr>
-        <p:spPr/>
-        <p:txBody>
-          <a:bodyPr/>
-          <a:lstStyle/>
-          <a:p>
-            <a:fld id="{30F38E6E-845E-45DA-BDC2-D3A075B99C02}" type="datetime1">
+            <a:fld id="{C77D5875-A28A-45ED-9BB5-129D406BDAE2}" type="datetime1">
               <a:rPr lang="ko-KR" altLang="en-US" smtClean="0"/>
-              <a:t>2018-09-07</a:t>
+              <a:t>2018-09-11</a:t>
             </a:fld>
             <a:endParaRPr lang="ko-KR" altLang="en-US"/>
           </a:p>
@@ -2134,10 +1528,10 @@
       </p:sp>
       <p:sp>
         <p:nvSpPr>
-          <p:cNvPr id="8" name="바닥글 개체 틀 7">
-            <a:extLst>
-              <a:ext uri="{FF2B5EF4-FFF2-40B4-BE49-F238E27FC236}">
-                <a16:creationId xmlns:a16="http://schemas.microsoft.com/office/drawing/2014/main" id="{EEC9D4E5-3975-4A82-89E2-96A0AAB62CD3}"/>
+          <p:cNvPr id="6" name="바닥글 개체 틀 5">
+            <a:extLst>
+              <a:ext uri="{FF2B5EF4-FFF2-40B4-BE49-F238E27FC236}">
+                <a16:creationId xmlns:a16="http://schemas.microsoft.com/office/drawing/2014/main" id="{19447A9F-1D01-4C1A-896D-BE0DB9C1A877}"/>
               </a:ext>
             </a:extLst>
           </p:cNvPr>
@@ -2159,10 +1553,10 @@
       </p:sp>
       <p:sp>
         <p:nvSpPr>
-          <p:cNvPr id="9" name="슬라이드 번호 개체 틀 8">
-            <a:extLst>
-              <a:ext uri="{FF2B5EF4-FFF2-40B4-BE49-F238E27FC236}">
-                <a16:creationId xmlns:a16="http://schemas.microsoft.com/office/drawing/2014/main" id="{79A71A63-BBD3-43F3-BBDB-1334D5C3D7FA}"/>
+          <p:cNvPr id="7" name="슬라이드 번호 개체 틀 6">
+            <a:extLst>
+              <a:ext uri="{FF2B5EF4-FFF2-40B4-BE49-F238E27FC236}">
+                <a16:creationId xmlns:a16="http://schemas.microsoft.com/office/drawing/2014/main" id="{56E52E0B-47C0-4F2C-B7AF-B8C098FC0ABC}"/>
               </a:ext>
             </a:extLst>
           </p:cNvPr>
@@ -2186,10 +1580,67 @@
           </a:p>
         </p:txBody>
       </p:sp>
+      <p:sp>
+        <p:nvSpPr>
+          <p:cNvPr id="9" name="텍스트 개체 틀 8">
+            <a:extLst>
+              <a:ext uri="{FF2B5EF4-FFF2-40B4-BE49-F238E27FC236}">
+                <a16:creationId xmlns:a16="http://schemas.microsoft.com/office/drawing/2014/main" id="{3B824A9C-F834-4067-BB33-2027F25D89E4}"/>
+              </a:ext>
+            </a:extLst>
+          </p:cNvPr>
+          <p:cNvSpPr>
+            <a:spLocks noGrp="1"/>
+          </p:cNvSpPr>
+          <p:nvPr>
+            <p:ph type="body" sz="quarter" idx="13" hasCustomPrompt="1"/>
+          </p:nvPr>
+        </p:nvSpPr>
+        <p:spPr>
+          <a:xfrm>
+            <a:off x="3431848" y="772888"/>
+            <a:ext cx="8207702" cy="862237"/>
+          </a:xfrm>
+        </p:spPr>
+        <p:txBody>
+          <a:bodyPr>
+            <a:normAutofit/>
+          </a:bodyPr>
+          <a:lstStyle>
+            <a:lvl1pPr marL="0" indent="0">
+              <a:buNone/>
+              <a:defRPr sz="4400"/>
+            </a:lvl1pPr>
+            <a:lvl2pPr marL="457200" indent="0">
+              <a:buNone/>
+              <a:defRPr/>
+            </a:lvl2pPr>
+            <a:lvl3pPr marL="914400" indent="0">
+              <a:buNone/>
+              <a:defRPr/>
+            </a:lvl3pPr>
+            <a:lvl4pPr marL="1371600" indent="0">
+              <a:buNone/>
+              <a:defRPr/>
+            </a:lvl4pPr>
+            <a:lvl5pPr marL="1828800" indent="0">
+              <a:buNone/>
+              <a:defRPr/>
+            </a:lvl5pPr>
+          </a:lstStyle>
+          <a:p>
+            <a:pPr lvl="0"/>
+            <a:r>
+              <a:rPr lang="ko-KR" altLang="en-US" dirty="0"/>
+              <a:t>부제목 스타일 편집</a:t>
+            </a:r>
+          </a:p>
+        </p:txBody>
+      </p:sp>
     </p:spTree>
     <p:extLst>
       <p:ext uri="{BB962C8B-B14F-4D97-AF65-F5344CB8AC3E}">
-        <p14:creationId xmlns:p14="http://schemas.microsoft.com/office/powerpoint/2010/main" val="1528318033"/>
+        <p14:creationId xmlns:p14="http://schemas.microsoft.com/office/powerpoint/2010/main" val="286556971"/>
       </p:ext>
     </p:extLst>
   </p:cSld>
@@ -2200,147 +1651,6 @@
 </file>
 
 <file path=ppt/slideLayouts/slideLayout6.xml><?xml version="1.0" encoding="utf-8"?>
-<p:sldLayout xmlns:a="http://schemas.openxmlformats.org/drawingml/2006/main" xmlns:r="http://schemas.openxmlformats.org/officeDocument/2006/relationships" xmlns:p="http://schemas.openxmlformats.org/presentationml/2006/main" type="titleOnly" preserve="1">
-  <p:cSld name="제목만">
-    <p:spTree>
-      <p:nvGrpSpPr>
-        <p:cNvPr id="1" name=""/>
-        <p:cNvGrpSpPr/>
-        <p:nvPr/>
-      </p:nvGrpSpPr>
-      <p:grpSpPr>
-        <a:xfrm>
-          <a:off x="0" y="0"/>
-          <a:ext cx="0" cy="0"/>
-          <a:chOff x="0" y="0"/>
-          <a:chExt cx="0" cy="0"/>
-        </a:xfrm>
-      </p:grpSpPr>
-      <p:sp>
-        <p:nvSpPr>
-          <p:cNvPr id="2" name="제목 1">
-            <a:extLst>
-              <a:ext uri="{FF2B5EF4-FFF2-40B4-BE49-F238E27FC236}">
-                <a16:creationId xmlns:a16="http://schemas.microsoft.com/office/drawing/2014/main" id="{AB0BDD9D-AF80-4A34-8F59-B4C483EA76AD}"/>
-              </a:ext>
-            </a:extLst>
-          </p:cNvPr>
-          <p:cNvSpPr>
-            <a:spLocks noGrp="1"/>
-          </p:cNvSpPr>
-          <p:nvPr>
-            <p:ph type="title"/>
-          </p:nvPr>
-        </p:nvSpPr>
-        <p:spPr/>
-        <p:txBody>
-          <a:bodyPr/>
-          <a:lstStyle/>
-          <a:p>
-            <a:r>
-              <a:rPr lang="ko-KR" altLang="en-US"/>
-              <a:t>마스터 제목 스타일 편집</a:t>
-            </a:r>
-          </a:p>
-        </p:txBody>
-      </p:sp>
-      <p:sp>
-        <p:nvSpPr>
-          <p:cNvPr id="3" name="날짜 개체 틀 2">
-            <a:extLst>
-              <a:ext uri="{FF2B5EF4-FFF2-40B4-BE49-F238E27FC236}">
-                <a16:creationId xmlns:a16="http://schemas.microsoft.com/office/drawing/2014/main" id="{5B6E6433-963C-4421-87A0-4535DD6AE182}"/>
-              </a:ext>
-            </a:extLst>
-          </p:cNvPr>
-          <p:cNvSpPr>
-            <a:spLocks noGrp="1"/>
-          </p:cNvSpPr>
-          <p:nvPr>
-            <p:ph type="dt" sz="half" idx="10"/>
-          </p:nvPr>
-        </p:nvSpPr>
-        <p:spPr/>
-        <p:txBody>
-          <a:bodyPr/>
-          <a:lstStyle/>
-          <a:p>
-            <a:fld id="{44F15756-517A-4A33-9E96-3B97E4EF865E}" type="datetime1">
-              <a:rPr lang="ko-KR" altLang="en-US" smtClean="0"/>
-              <a:t>2018-09-07</a:t>
-            </a:fld>
-            <a:endParaRPr lang="ko-KR" altLang="en-US"/>
-          </a:p>
-        </p:txBody>
-      </p:sp>
-      <p:sp>
-        <p:nvSpPr>
-          <p:cNvPr id="4" name="바닥글 개체 틀 3">
-            <a:extLst>
-              <a:ext uri="{FF2B5EF4-FFF2-40B4-BE49-F238E27FC236}">
-                <a16:creationId xmlns:a16="http://schemas.microsoft.com/office/drawing/2014/main" id="{34C50E43-B88D-489F-A193-88084E5CEEE7}"/>
-              </a:ext>
-            </a:extLst>
-          </p:cNvPr>
-          <p:cNvSpPr>
-            <a:spLocks noGrp="1"/>
-          </p:cNvSpPr>
-          <p:nvPr>
-            <p:ph type="ftr" sz="quarter" idx="11"/>
-          </p:nvPr>
-        </p:nvSpPr>
-        <p:spPr/>
-        <p:txBody>
-          <a:bodyPr/>
-          <a:lstStyle/>
-          <a:p>
-            <a:endParaRPr lang="ko-KR" altLang="en-US"/>
-          </a:p>
-        </p:txBody>
-      </p:sp>
-      <p:sp>
-        <p:nvSpPr>
-          <p:cNvPr id="5" name="슬라이드 번호 개체 틀 4">
-            <a:extLst>
-              <a:ext uri="{FF2B5EF4-FFF2-40B4-BE49-F238E27FC236}">
-                <a16:creationId xmlns:a16="http://schemas.microsoft.com/office/drawing/2014/main" id="{1A450A42-551F-4C2E-A54D-A96FFF9B51A9}"/>
-              </a:ext>
-            </a:extLst>
-          </p:cNvPr>
-          <p:cNvSpPr>
-            <a:spLocks noGrp="1"/>
-          </p:cNvSpPr>
-          <p:nvPr>
-            <p:ph type="sldNum" sz="quarter" idx="12"/>
-          </p:nvPr>
-        </p:nvSpPr>
-        <p:spPr/>
-        <p:txBody>
-          <a:bodyPr/>
-          <a:lstStyle/>
-          <a:p>
-            <a:fld id="{D74ECCE6-482B-4E3F-A4EE-5A2B5F793A19}" type="slidenum">
-              <a:rPr lang="ko-KR" altLang="en-US" smtClean="0"/>
-              <a:t>‹#›</a:t>
-            </a:fld>
-            <a:endParaRPr lang="ko-KR" altLang="en-US"/>
-          </a:p>
-        </p:txBody>
-      </p:sp>
-    </p:spTree>
-    <p:extLst>
-      <p:ext uri="{BB962C8B-B14F-4D97-AF65-F5344CB8AC3E}">
-        <p14:creationId xmlns:p14="http://schemas.microsoft.com/office/powerpoint/2010/main" val="3419126717"/>
-      </p:ext>
-    </p:extLst>
-  </p:cSld>
-  <p:clrMapOvr>
-    <a:masterClrMapping/>
-  </p:clrMapOvr>
-</p:sldLayout>
-</file>
-
-<file path=ppt/slideLayouts/slideLayout7.xml><?xml version="1.0" encoding="utf-8"?>
 <p:sldLayout xmlns:a="http://schemas.openxmlformats.org/drawingml/2006/main" xmlns:r="http://schemas.openxmlformats.org/officeDocument/2006/relationships" xmlns:p="http://schemas.openxmlformats.org/presentationml/2006/main" type="blank" preserve="1">
   <p:cSld name="빈 화면">
     <p:spTree>
@@ -2380,7 +1690,7 @@
           <a:p>
             <a:fld id="{796BD186-29D7-41DF-855A-948F934547AB}" type="datetime1">
               <a:rPr lang="ko-KR" altLang="en-US" smtClean="0"/>
-              <a:t>2018-09-07</a:t>
+              <a:t>2018-09-11</a:t>
             </a:fld>
             <a:endParaRPr lang="ko-KR" altLang="en-US"/>
           </a:p>
@@ -2444,605 +1754,6 @@
     <p:extLst>
       <p:ext uri="{BB962C8B-B14F-4D97-AF65-F5344CB8AC3E}">
         <p14:creationId xmlns:p14="http://schemas.microsoft.com/office/powerpoint/2010/main" val="2426325696"/>
-      </p:ext>
-    </p:extLst>
-  </p:cSld>
-  <p:clrMapOvr>
-    <a:masterClrMapping/>
-  </p:clrMapOvr>
-</p:sldLayout>
-</file>
-
-<file path=ppt/slideLayouts/slideLayout8.xml><?xml version="1.0" encoding="utf-8"?>
-<p:sldLayout xmlns:a="http://schemas.openxmlformats.org/drawingml/2006/main" xmlns:r="http://schemas.openxmlformats.org/officeDocument/2006/relationships" xmlns:p="http://schemas.openxmlformats.org/presentationml/2006/main" type="objTx" preserve="1">
-  <p:cSld name="캡션 있는 콘텐츠">
-    <p:spTree>
-      <p:nvGrpSpPr>
-        <p:cNvPr id="1" name=""/>
-        <p:cNvGrpSpPr/>
-        <p:nvPr/>
-      </p:nvGrpSpPr>
-      <p:grpSpPr>
-        <a:xfrm>
-          <a:off x="0" y="0"/>
-          <a:ext cx="0" cy="0"/>
-          <a:chOff x="0" y="0"/>
-          <a:chExt cx="0" cy="0"/>
-        </a:xfrm>
-      </p:grpSpPr>
-      <p:sp>
-        <p:nvSpPr>
-          <p:cNvPr id="2" name="제목 1">
-            <a:extLst>
-              <a:ext uri="{FF2B5EF4-FFF2-40B4-BE49-F238E27FC236}">
-                <a16:creationId xmlns:a16="http://schemas.microsoft.com/office/drawing/2014/main" id="{CF20FE2F-EC53-4B0C-B1EE-0FDFAE6197A6}"/>
-              </a:ext>
-            </a:extLst>
-          </p:cNvPr>
-          <p:cNvSpPr>
-            <a:spLocks noGrp="1"/>
-          </p:cNvSpPr>
-          <p:nvPr>
-            <p:ph type="title"/>
-          </p:nvPr>
-        </p:nvSpPr>
-        <p:spPr>
-          <a:xfrm>
-            <a:off x="839788" y="457200"/>
-            <a:ext cx="3932237" cy="1600200"/>
-          </a:xfrm>
-        </p:spPr>
-        <p:txBody>
-          <a:bodyPr anchor="b"/>
-          <a:lstStyle>
-            <a:lvl1pPr>
-              <a:defRPr sz="3200"/>
-            </a:lvl1pPr>
-          </a:lstStyle>
-          <a:p>
-            <a:r>
-              <a:rPr lang="ko-KR" altLang="en-US"/>
-              <a:t>마스터 제목 스타일 편집</a:t>
-            </a:r>
-          </a:p>
-        </p:txBody>
-      </p:sp>
-      <p:sp>
-        <p:nvSpPr>
-          <p:cNvPr id="3" name="내용 개체 틀 2">
-            <a:extLst>
-              <a:ext uri="{FF2B5EF4-FFF2-40B4-BE49-F238E27FC236}">
-                <a16:creationId xmlns:a16="http://schemas.microsoft.com/office/drawing/2014/main" id="{3074CBB6-7C08-4A6D-88E0-72A8F365F26E}"/>
-              </a:ext>
-            </a:extLst>
-          </p:cNvPr>
-          <p:cNvSpPr>
-            <a:spLocks noGrp="1"/>
-          </p:cNvSpPr>
-          <p:nvPr>
-            <p:ph idx="1"/>
-          </p:nvPr>
-        </p:nvSpPr>
-        <p:spPr>
-          <a:xfrm>
-            <a:off x="5183188" y="987425"/>
-            <a:ext cx="6172200" cy="4873625"/>
-          </a:xfrm>
-        </p:spPr>
-        <p:txBody>
-          <a:bodyPr/>
-          <a:lstStyle>
-            <a:lvl1pPr>
-              <a:defRPr sz="3200"/>
-            </a:lvl1pPr>
-            <a:lvl2pPr>
-              <a:defRPr sz="2800"/>
-            </a:lvl2pPr>
-            <a:lvl3pPr>
-              <a:defRPr sz="2400"/>
-            </a:lvl3pPr>
-            <a:lvl4pPr>
-              <a:defRPr sz="2000"/>
-            </a:lvl4pPr>
-            <a:lvl5pPr>
-              <a:defRPr sz="2000"/>
-            </a:lvl5pPr>
-            <a:lvl6pPr>
-              <a:defRPr sz="2000"/>
-            </a:lvl6pPr>
-            <a:lvl7pPr>
-              <a:defRPr sz="2000"/>
-            </a:lvl7pPr>
-            <a:lvl8pPr>
-              <a:defRPr sz="2000"/>
-            </a:lvl8pPr>
-            <a:lvl9pPr>
-              <a:defRPr sz="2000"/>
-            </a:lvl9pPr>
-          </a:lstStyle>
-          <a:p>
-            <a:pPr lvl="0"/>
-            <a:r>
-              <a:rPr lang="ko-KR" altLang="en-US"/>
-              <a:t>마스터 텍스트 스타일 편집</a:t>
-            </a:r>
-          </a:p>
-          <a:p>
-            <a:pPr lvl="1"/>
-            <a:r>
-              <a:rPr lang="ko-KR" altLang="en-US"/>
-              <a:t>둘째 수준</a:t>
-            </a:r>
-          </a:p>
-          <a:p>
-            <a:pPr lvl="2"/>
-            <a:r>
-              <a:rPr lang="ko-KR" altLang="en-US"/>
-              <a:t>셋째 수준</a:t>
-            </a:r>
-          </a:p>
-          <a:p>
-            <a:pPr lvl="3"/>
-            <a:r>
-              <a:rPr lang="ko-KR" altLang="en-US"/>
-              <a:t>넷째 수준</a:t>
-            </a:r>
-          </a:p>
-          <a:p>
-            <a:pPr lvl="4"/>
-            <a:r>
-              <a:rPr lang="ko-KR" altLang="en-US"/>
-              <a:t>다섯째 수준</a:t>
-            </a:r>
-          </a:p>
-        </p:txBody>
-      </p:sp>
-      <p:sp>
-        <p:nvSpPr>
-          <p:cNvPr id="4" name="텍스트 개체 틀 3">
-            <a:extLst>
-              <a:ext uri="{FF2B5EF4-FFF2-40B4-BE49-F238E27FC236}">
-                <a16:creationId xmlns:a16="http://schemas.microsoft.com/office/drawing/2014/main" id="{744DA00F-A126-43C4-A6DD-CA253E677F0F}"/>
-              </a:ext>
-            </a:extLst>
-          </p:cNvPr>
-          <p:cNvSpPr>
-            <a:spLocks noGrp="1"/>
-          </p:cNvSpPr>
-          <p:nvPr>
-            <p:ph type="body" sz="half" idx="2"/>
-          </p:nvPr>
-        </p:nvSpPr>
-        <p:spPr>
-          <a:xfrm>
-            <a:off x="839788" y="2057400"/>
-            <a:ext cx="3932237" cy="3811588"/>
-          </a:xfrm>
-        </p:spPr>
-        <p:txBody>
-          <a:bodyPr/>
-          <a:lstStyle>
-            <a:lvl1pPr marL="0" indent="0">
-              <a:buNone/>
-              <a:defRPr sz="1600"/>
-            </a:lvl1pPr>
-            <a:lvl2pPr marL="457200" indent="0">
-              <a:buNone/>
-              <a:defRPr sz="1400"/>
-            </a:lvl2pPr>
-            <a:lvl3pPr marL="914400" indent="0">
-              <a:buNone/>
-              <a:defRPr sz="1200"/>
-            </a:lvl3pPr>
-            <a:lvl4pPr marL="1371600" indent="0">
-              <a:buNone/>
-              <a:defRPr sz="1000"/>
-            </a:lvl4pPr>
-            <a:lvl5pPr marL="1828800" indent="0">
-              <a:buNone/>
-              <a:defRPr sz="1000"/>
-            </a:lvl5pPr>
-            <a:lvl6pPr marL="2286000" indent="0">
-              <a:buNone/>
-              <a:defRPr sz="1000"/>
-            </a:lvl6pPr>
-            <a:lvl7pPr marL="2743200" indent="0">
-              <a:buNone/>
-              <a:defRPr sz="1000"/>
-            </a:lvl7pPr>
-            <a:lvl8pPr marL="3200400" indent="0">
-              <a:buNone/>
-              <a:defRPr sz="1000"/>
-            </a:lvl8pPr>
-            <a:lvl9pPr marL="3657600" indent="0">
-              <a:buNone/>
-              <a:defRPr sz="1000"/>
-            </a:lvl9pPr>
-          </a:lstStyle>
-          <a:p>
-            <a:pPr lvl="0"/>
-            <a:r>
-              <a:rPr lang="ko-KR" altLang="en-US"/>
-              <a:t>마스터 텍스트 스타일 편집</a:t>
-            </a:r>
-          </a:p>
-        </p:txBody>
-      </p:sp>
-      <p:sp>
-        <p:nvSpPr>
-          <p:cNvPr id="5" name="날짜 개체 틀 4">
-            <a:extLst>
-              <a:ext uri="{FF2B5EF4-FFF2-40B4-BE49-F238E27FC236}">
-                <a16:creationId xmlns:a16="http://schemas.microsoft.com/office/drawing/2014/main" id="{D4325015-B69E-4736-9EEC-1385D7C6AB27}"/>
-              </a:ext>
-            </a:extLst>
-          </p:cNvPr>
-          <p:cNvSpPr>
-            <a:spLocks noGrp="1"/>
-          </p:cNvSpPr>
-          <p:nvPr>
-            <p:ph type="dt" sz="half" idx="10"/>
-          </p:nvPr>
-        </p:nvSpPr>
-        <p:spPr/>
-        <p:txBody>
-          <a:bodyPr/>
-          <a:lstStyle/>
-          <a:p>
-            <a:fld id="{2B3DFF2C-A1E4-447F-B475-0E41AC3CF48C}" type="datetime1">
-              <a:rPr lang="ko-KR" altLang="en-US" smtClean="0"/>
-              <a:t>2018-09-07</a:t>
-            </a:fld>
-            <a:endParaRPr lang="ko-KR" altLang="en-US"/>
-          </a:p>
-        </p:txBody>
-      </p:sp>
-      <p:sp>
-        <p:nvSpPr>
-          <p:cNvPr id="6" name="바닥글 개체 틀 5">
-            <a:extLst>
-              <a:ext uri="{FF2B5EF4-FFF2-40B4-BE49-F238E27FC236}">
-                <a16:creationId xmlns:a16="http://schemas.microsoft.com/office/drawing/2014/main" id="{D5326627-B039-4ADD-8967-81635EE05B5C}"/>
-              </a:ext>
-            </a:extLst>
-          </p:cNvPr>
-          <p:cNvSpPr>
-            <a:spLocks noGrp="1"/>
-          </p:cNvSpPr>
-          <p:nvPr>
-            <p:ph type="ftr" sz="quarter" idx="11"/>
-          </p:nvPr>
-        </p:nvSpPr>
-        <p:spPr/>
-        <p:txBody>
-          <a:bodyPr/>
-          <a:lstStyle/>
-          <a:p>
-            <a:endParaRPr lang="ko-KR" altLang="en-US"/>
-          </a:p>
-        </p:txBody>
-      </p:sp>
-      <p:sp>
-        <p:nvSpPr>
-          <p:cNvPr id="7" name="슬라이드 번호 개체 틀 6">
-            <a:extLst>
-              <a:ext uri="{FF2B5EF4-FFF2-40B4-BE49-F238E27FC236}">
-                <a16:creationId xmlns:a16="http://schemas.microsoft.com/office/drawing/2014/main" id="{C8FAD55E-6C00-4631-B245-2CC52B26132C}"/>
-              </a:ext>
-            </a:extLst>
-          </p:cNvPr>
-          <p:cNvSpPr>
-            <a:spLocks noGrp="1"/>
-          </p:cNvSpPr>
-          <p:nvPr>
-            <p:ph type="sldNum" sz="quarter" idx="12"/>
-          </p:nvPr>
-        </p:nvSpPr>
-        <p:spPr/>
-        <p:txBody>
-          <a:bodyPr/>
-          <a:lstStyle/>
-          <a:p>
-            <a:fld id="{D74ECCE6-482B-4E3F-A4EE-5A2B5F793A19}" type="slidenum">
-              <a:rPr lang="ko-KR" altLang="en-US" smtClean="0"/>
-              <a:t>‹#›</a:t>
-            </a:fld>
-            <a:endParaRPr lang="ko-KR" altLang="en-US"/>
-          </a:p>
-        </p:txBody>
-      </p:sp>
-    </p:spTree>
-    <p:extLst>
-      <p:ext uri="{BB962C8B-B14F-4D97-AF65-F5344CB8AC3E}">
-        <p14:creationId xmlns:p14="http://schemas.microsoft.com/office/powerpoint/2010/main" val="951370904"/>
-      </p:ext>
-    </p:extLst>
-  </p:cSld>
-  <p:clrMapOvr>
-    <a:masterClrMapping/>
-  </p:clrMapOvr>
-</p:sldLayout>
-</file>
-
-<file path=ppt/slideLayouts/slideLayout9.xml><?xml version="1.0" encoding="utf-8"?>
-<p:sldLayout xmlns:a="http://schemas.openxmlformats.org/drawingml/2006/main" xmlns:r="http://schemas.openxmlformats.org/officeDocument/2006/relationships" xmlns:p="http://schemas.openxmlformats.org/presentationml/2006/main" type="picTx" preserve="1">
-  <p:cSld name="캡션 있는 그림">
-    <p:spTree>
-      <p:nvGrpSpPr>
-        <p:cNvPr id="1" name=""/>
-        <p:cNvGrpSpPr/>
-        <p:nvPr/>
-      </p:nvGrpSpPr>
-      <p:grpSpPr>
-        <a:xfrm>
-          <a:off x="0" y="0"/>
-          <a:ext cx="0" cy="0"/>
-          <a:chOff x="0" y="0"/>
-          <a:chExt cx="0" cy="0"/>
-        </a:xfrm>
-      </p:grpSpPr>
-      <p:sp>
-        <p:nvSpPr>
-          <p:cNvPr id="2" name="제목 1">
-            <a:extLst>
-              <a:ext uri="{FF2B5EF4-FFF2-40B4-BE49-F238E27FC236}">
-                <a16:creationId xmlns:a16="http://schemas.microsoft.com/office/drawing/2014/main" id="{7F908C31-7582-44EC-91A7-A204776ADDF6}"/>
-              </a:ext>
-            </a:extLst>
-          </p:cNvPr>
-          <p:cNvSpPr>
-            <a:spLocks noGrp="1"/>
-          </p:cNvSpPr>
-          <p:nvPr>
-            <p:ph type="title"/>
-          </p:nvPr>
-        </p:nvSpPr>
-        <p:spPr>
-          <a:xfrm>
-            <a:off x="839788" y="457200"/>
-            <a:ext cx="3932237" cy="1600200"/>
-          </a:xfrm>
-        </p:spPr>
-        <p:txBody>
-          <a:bodyPr anchor="b"/>
-          <a:lstStyle>
-            <a:lvl1pPr>
-              <a:defRPr sz="3200"/>
-            </a:lvl1pPr>
-          </a:lstStyle>
-          <a:p>
-            <a:r>
-              <a:rPr lang="ko-KR" altLang="en-US"/>
-              <a:t>마스터 제목 스타일 편집</a:t>
-            </a:r>
-          </a:p>
-        </p:txBody>
-      </p:sp>
-      <p:sp>
-        <p:nvSpPr>
-          <p:cNvPr id="3" name="그림 개체 틀 2">
-            <a:extLst>
-              <a:ext uri="{FF2B5EF4-FFF2-40B4-BE49-F238E27FC236}">
-                <a16:creationId xmlns:a16="http://schemas.microsoft.com/office/drawing/2014/main" id="{F835F8BF-67F4-45EC-8815-6722C406AE75}"/>
-              </a:ext>
-            </a:extLst>
-          </p:cNvPr>
-          <p:cNvSpPr>
-            <a:spLocks noGrp="1"/>
-          </p:cNvSpPr>
-          <p:nvPr>
-            <p:ph type="pic" idx="1"/>
-          </p:nvPr>
-        </p:nvSpPr>
-        <p:spPr>
-          <a:xfrm>
-            <a:off x="5183188" y="987425"/>
-            <a:ext cx="6172200" cy="4873625"/>
-          </a:xfrm>
-        </p:spPr>
-        <p:txBody>
-          <a:bodyPr/>
-          <a:lstStyle>
-            <a:lvl1pPr marL="0" indent="0">
-              <a:buNone/>
-              <a:defRPr sz="3200"/>
-            </a:lvl1pPr>
-            <a:lvl2pPr marL="457200" indent="0">
-              <a:buNone/>
-              <a:defRPr sz="2800"/>
-            </a:lvl2pPr>
-            <a:lvl3pPr marL="914400" indent="0">
-              <a:buNone/>
-              <a:defRPr sz="2400"/>
-            </a:lvl3pPr>
-            <a:lvl4pPr marL="1371600" indent="0">
-              <a:buNone/>
-              <a:defRPr sz="2000"/>
-            </a:lvl4pPr>
-            <a:lvl5pPr marL="1828800" indent="0">
-              <a:buNone/>
-              <a:defRPr sz="2000"/>
-            </a:lvl5pPr>
-            <a:lvl6pPr marL="2286000" indent="0">
-              <a:buNone/>
-              <a:defRPr sz="2000"/>
-            </a:lvl6pPr>
-            <a:lvl7pPr marL="2743200" indent="0">
-              <a:buNone/>
-              <a:defRPr sz="2000"/>
-            </a:lvl7pPr>
-            <a:lvl8pPr marL="3200400" indent="0">
-              <a:buNone/>
-              <a:defRPr sz="2000"/>
-            </a:lvl8pPr>
-            <a:lvl9pPr marL="3657600" indent="0">
-              <a:buNone/>
-              <a:defRPr sz="2000"/>
-            </a:lvl9pPr>
-          </a:lstStyle>
-          <a:p>
-            <a:endParaRPr lang="ko-KR" altLang="en-US"/>
-          </a:p>
-        </p:txBody>
-      </p:sp>
-      <p:sp>
-        <p:nvSpPr>
-          <p:cNvPr id="4" name="텍스트 개체 틀 3">
-            <a:extLst>
-              <a:ext uri="{FF2B5EF4-FFF2-40B4-BE49-F238E27FC236}">
-                <a16:creationId xmlns:a16="http://schemas.microsoft.com/office/drawing/2014/main" id="{173BAEA4-9216-4369-B44F-AAEB9593D2E4}"/>
-              </a:ext>
-            </a:extLst>
-          </p:cNvPr>
-          <p:cNvSpPr>
-            <a:spLocks noGrp="1"/>
-          </p:cNvSpPr>
-          <p:nvPr>
-            <p:ph type="body" sz="half" idx="2"/>
-          </p:nvPr>
-        </p:nvSpPr>
-        <p:spPr>
-          <a:xfrm>
-            <a:off x="839788" y="2057400"/>
-            <a:ext cx="3932237" cy="3811588"/>
-          </a:xfrm>
-        </p:spPr>
-        <p:txBody>
-          <a:bodyPr/>
-          <a:lstStyle>
-            <a:lvl1pPr marL="0" indent="0">
-              <a:buNone/>
-              <a:defRPr sz="1600"/>
-            </a:lvl1pPr>
-            <a:lvl2pPr marL="457200" indent="0">
-              <a:buNone/>
-              <a:defRPr sz="1400"/>
-            </a:lvl2pPr>
-            <a:lvl3pPr marL="914400" indent="0">
-              <a:buNone/>
-              <a:defRPr sz="1200"/>
-            </a:lvl3pPr>
-            <a:lvl4pPr marL="1371600" indent="0">
-              <a:buNone/>
-              <a:defRPr sz="1000"/>
-            </a:lvl4pPr>
-            <a:lvl5pPr marL="1828800" indent="0">
-              <a:buNone/>
-              <a:defRPr sz="1000"/>
-            </a:lvl5pPr>
-            <a:lvl6pPr marL="2286000" indent="0">
-              <a:buNone/>
-              <a:defRPr sz="1000"/>
-            </a:lvl6pPr>
-            <a:lvl7pPr marL="2743200" indent="0">
-              <a:buNone/>
-              <a:defRPr sz="1000"/>
-            </a:lvl7pPr>
-            <a:lvl8pPr marL="3200400" indent="0">
-              <a:buNone/>
-              <a:defRPr sz="1000"/>
-            </a:lvl8pPr>
-            <a:lvl9pPr marL="3657600" indent="0">
-              <a:buNone/>
-              <a:defRPr sz="1000"/>
-            </a:lvl9pPr>
-          </a:lstStyle>
-          <a:p>
-            <a:pPr lvl="0"/>
-            <a:r>
-              <a:rPr lang="ko-KR" altLang="en-US"/>
-              <a:t>마스터 텍스트 스타일 편집</a:t>
-            </a:r>
-          </a:p>
-        </p:txBody>
-      </p:sp>
-      <p:sp>
-        <p:nvSpPr>
-          <p:cNvPr id="5" name="날짜 개체 틀 4">
-            <a:extLst>
-              <a:ext uri="{FF2B5EF4-FFF2-40B4-BE49-F238E27FC236}">
-                <a16:creationId xmlns:a16="http://schemas.microsoft.com/office/drawing/2014/main" id="{5DEF202D-3995-44A0-B53B-6057C1AD6821}"/>
-              </a:ext>
-            </a:extLst>
-          </p:cNvPr>
-          <p:cNvSpPr>
-            <a:spLocks noGrp="1"/>
-          </p:cNvSpPr>
-          <p:nvPr>
-            <p:ph type="dt" sz="half" idx="10"/>
-          </p:nvPr>
-        </p:nvSpPr>
-        <p:spPr/>
-        <p:txBody>
-          <a:bodyPr/>
-          <a:lstStyle/>
-          <a:p>
-            <a:fld id="{99924F94-5B5C-4D5B-A453-1BFEC88691B6}" type="datetime1">
-              <a:rPr lang="ko-KR" altLang="en-US" smtClean="0"/>
-              <a:t>2018-09-07</a:t>
-            </a:fld>
-            <a:endParaRPr lang="ko-KR" altLang="en-US"/>
-          </a:p>
-        </p:txBody>
-      </p:sp>
-      <p:sp>
-        <p:nvSpPr>
-          <p:cNvPr id="6" name="바닥글 개체 틀 5">
-            <a:extLst>
-              <a:ext uri="{FF2B5EF4-FFF2-40B4-BE49-F238E27FC236}">
-                <a16:creationId xmlns:a16="http://schemas.microsoft.com/office/drawing/2014/main" id="{83D5CEED-7364-4572-9EC3-78E1B6350968}"/>
-              </a:ext>
-            </a:extLst>
-          </p:cNvPr>
-          <p:cNvSpPr>
-            <a:spLocks noGrp="1"/>
-          </p:cNvSpPr>
-          <p:nvPr>
-            <p:ph type="ftr" sz="quarter" idx="11"/>
-          </p:nvPr>
-        </p:nvSpPr>
-        <p:spPr/>
-        <p:txBody>
-          <a:bodyPr/>
-          <a:lstStyle/>
-          <a:p>
-            <a:endParaRPr lang="ko-KR" altLang="en-US"/>
-          </a:p>
-        </p:txBody>
-      </p:sp>
-      <p:sp>
-        <p:nvSpPr>
-          <p:cNvPr id="7" name="슬라이드 번호 개체 틀 6">
-            <a:extLst>
-              <a:ext uri="{FF2B5EF4-FFF2-40B4-BE49-F238E27FC236}">
-                <a16:creationId xmlns:a16="http://schemas.microsoft.com/office/drawing/2014/main" id="{8DDC3C55-2DDE-4216-9AE4-C6C8C8F2E55B}"/>
-              </a:ext>
-            </a:extLst>
-          </p:cNvPr>
-          <p:cNvSpPr>
-            <a:spLocks noGrp="1"/>
-          </p:cNvSpPr>
-          <p:nvPr>
-            <p:ph type="sldNum" sz="quarter" idx="12"/>
-          </p:nvPr>
-        </p:nvSpPr>
-        <p:spPr/>
-        <p:txBody>
-          <a:bodyPr/>
-          <a:lstStyle/>
-          <a:p>
-            <a:fld id="{D74ECCE6-482B-4E3F-A4EE-5A2B5F793A19}" type="slidenum">
-              <a:rPr lang="ko-KR" altLang="en-US" smtClean="0"/>
-              <a:t>‹#›</a:t>
-            </a:fld>
-            <a:endParaRPr lang="ko-KR" altLang="en-US"/>
-          </a:p>
-        </p:txBody>
-      </p:sp>
-    </p:spTree>
-    <p:extLst>
-      <p:ext uri="{BB962C8B-B14F-4D97-AF65-F5344CB8AC3E}">
-        <p14:creationId xmlns:p14="http://schemas.microsoft.com/office/powerpoint/2010/main" val="187387836"/>
       </p:ext>
     </p:extLst>
   </p:cSld>
@@ -3074,6 +1785,119 @@
           <a:chExt cx="0" cy="0"/>
         </a:xfrm>
       </p:grpSpPr>
+      <p:grpSp>
+        <p:nvGrpSpPr>
+          <p:cNvPr id="7" name="Group 4">
+            <a:extLst>
+              <a:ext uri="{FF2B5EF4-FFF2-40B4-BE49-F238E27FC236}">
+                <a16:creationId xmlns:a16="http://schemas.microsoft.com/office/drawing/2014/main" id="{BF338AAF-EF26-441C-BD4A-2962865D0D39}"/>
+              </a:ext>
+            </a:extLst>
+          </p:cNvPr>
+          <p:cNvGrpSpPr/>
+          <p:nvPr userDrawn="1"/>
+        </p:nvGrpSpPr>
+        <p:grpSpPr>
+          <a:xfrm>
+            <a:off x="0" y="71"/>
+            <a:ext cx="12192000" cy="6857929"/>
+            <a:chOff x="0" y="71"/>
+            <a:chExt cx="24377650" cy="13715930"/>
+          </a:xfrm>
+        </p:grpSpPr>
+        <p:pic>
+          <p:nvPicPr>
+            <p:cNvPr id="8" name="Picture 7">
+              <a:extLst>
+                <a:ext uri="{FF2B5EF4-FFF2-40B4-BE49-F238E27FC236}">
+                  <a16:creationId xmlns:a16="http://schemas.microsoft.com/office/drawing/2014/main" id="{6106D66A-0DC4-4DC7-9057-399765A58547}"/>
+                </a:ext>
+              </a:extLst>
+            </p:cNvPr>
+            <p:cNvPicPr>
+              <a:picLocks noChangeAspect="1"/>
+            </p:cNvPicPr>
+            <p:nvPr/>
+          </p:nvPicPr>
+          <p:blipFill>
+            <a:blip r:embed="rId8">
+              <a:extLst>
+                <a:ext uri="{28A0092B-C50C-407E-A947-70E740481C1C}">
+                  <a14:useLocalDpi xmlns:a14="http://schemas.microsoft.com/office/drawing/2010/main" val="0"/>
+                </a:ext>
+              </a:extLst>
+            </a:blip>
+            <a:stretch>
+              <a:fillRect/>
+            </a:stretch>
+          </p:blipFill>
+          <p:spPr>
+            <a:xfrm>
+              <a:off x="0" y="71"/>
+              <a:ext cx="24377650" cy="13715857"/>
+            </a:xfrm>
+            <a:prstGeom prst="rect">
+              <a:avLst/>
+            </a:prstGeom>
+          </p:spPr>
+        </p:pic>
+        <p:sp>
+          <p:nvSpPr>
+            <p:cNvPr id="9" name="Rectangle 2">
+              <a:extLst>
+                <a:ext uri="{FF2B5EF4-FFF2-40B4-BE49-F238E27FC236}">
+                  <a16:creationId xmlns:a16="http://schemas.microsoft.com/office/drawing/2014/main" id="{0EE56C2C-F305-4B4E-8202-B29FEE654ACC}"/>
+                </a:ext>
+              </a:extLst>
+            </p:cNvPr>
+            <p:cNvSpPr/>
+            <p:nvPr/>
+          </p:nvSpPr>
+          <p:spPr>
+            <a:xfrm>
+              <a:off x="6644640" y="71"/>
+              <a:ext cx="17733010" cy="13715930"/>
+            </a:xfrm>
+            <a:prstGeom prst="rect">
+              <a:avLst/>
+            </a:prstGeom>
+            <a:solidFill>
+              <a:schemeClr val="bg1"/>
+            </a:solidFill>
+            <a:ln>
+              <a:noFill/>
+            </a:ln>
+          </p:spPr>
+          <p:style>
+            <a:lnRef idx="2">
+              <a:schemeClr val="accent1">
+                <a:shade val="50000"/>
+              </a:schemeClr>
+            </a:lnRef>
+            <a:fillRef idx="1">
+              <a:schemeClr val="accent1"/>
+            </a:fillRef>
+            <a:effectRef idx="0">
+              <a:schemeClr val="accent1"/>
+            </a:effectRef>
+            <a:fontRef idx="minor">
+              <a:schemeClr val="lt1"/>
+            </a:fontRef>
+          </p:style>
+          <p:txBody>
+            <a:bodyPr rtlCol="0" anchor="ctr"/>
+            <a:lstStyle/>
+            <a:p>
+              <a:pPr algn="ctr"/>
+              <a:endParaRPr lang="en-US" b="0" dirty="0">
+                <a:latin typeface="배달의민족 한나는 열한살" panose="020B0600000101010101" pitchFamily="50" charset="-127"/>
+                <a:ea typeface="배달의민족 한나는 열한살" panose="020B0600000101010101" pitchFamily="50" charset="-127"/>
+                <a:cs typeface="함초롬돋움" panose="020B0804000101010101" pitchFamily="50" charset="-127"/>
+              </a:endParaRPr>
+            </a:p>
+          </p:txBody>
+        </p:sp>
+      </p:grpSp>
       <p:sp>
         <p:nvSpPr>
           <p:cNvPr id="2" name="제목 개체 틀 1">
@@ -3106,7 +1930,7 @@
           <a:lstStyle/>
           <a:p>
             <a:r>
-              <a:rPr lang="ko-KR" altLang="en-US"/>
+              <a:rPr lang="ko-KR" altLang="en-US" dirty="0"/>
               <a:t>마스터 제목 스타일 편집</a:t>
             </a:r>
           </a:p>
@@ -3208,19 +2032,23 @@
           <a:bodyPr vert="horz" lIns="91440" tIns="45720" rIns="91440" bIns="45720" rtlCol="0" anchor="ctr"/>
           <a:lstStyle>
             <a:lvl1pPr algn="l">
-              <a:defRPr sz="1200">
+              <a:defRPr sz="1200" b="0">
                 <a:solidFill>
                   <a:schemeClr val="tx1">
                     <a:tint val="75000"/>
                   </a:schemeClr>
                 </a:solidFill>
+                <a:latin typeface="배달의민족 한나는 열한살" panose="020B0600000101010101" pitchFamily="50" charset="-127"/>
+                <a:ea typeface="배달의민족 한나는 열한살" panose="020B0600000101010101" pitchFamily="50" charset="-127"/>
+                <a:cs typeface="함초롬돋움" panose="020B0804000101010101" pitchFamily="50" charset="-127"/>
               </a:defRPr>
             </a:lvl1pPr>
           </a:lstStyle>
           <a:p>
             <a:fld id="{EEFAC28C-B568-4600-B580-1FAD0DDC0394}" type="datetime1">
               <a:rPr lang="ko-KR" altLang="en-US" smtClean="0"/>
-              <a:t>2018-09-07</a:t>
+              <a:pPr/>
+              <a:t>2018-09-11</a:t>
             </a:fld>
             <a:endParaRPr lang="ko-KR" altLang="en-US"/>
           </a:p>
@@ -3255,12 +2083,15 @@
           <a:bodyPr vert="horz" lIns="91440" tIns="45720" rIns="91440" bIns="45720" rtlCol="0" anchor="ctr"/>
           <a:lstStyle>
             <a:lvl1pPr algn="ctr">
-              <a:defRPr sz="1200">
+              <a:defRPr sz="1200" b="0">
                 <a:solidFill>
                   <a:schemeClr val="tx1">
                     <a:tint val="75000"/>
                   </a:schemeClr>
                 </a:solidFill>
+                <a:latin typeface="배달의민족 한나는 열한살" panose="020B0600000101010101" pitchFamily="50" charset="-127"/>
+                <a:ea typeface="배달의민족 한나는 열한살" panose="020B0600000101010101" pitchFamily="50" charset="-127"/>
+                <a:cs typeface="함초롬돋움" panose="020B0804000101010101" pitchFamily="50" charset="-127"/>
               </a:defRPr>
             </a:lvl1pPr>
           </a:lstStyle>
@@ -3298,18 +2129,21 @@
           <a:bodyPr vert="horz" lIns="91440" tIns="45720" rIns="91440" bIns="45720" rtlCol="0" anchor="ctr"/>
           <a:lstStyle>
             <a:lvl1pPr algn="r">
-              <a:defRPr sz="1200">
+              <a:defRPr sz="1200" b="0">
                 <a:solidFill>
                   <a:schemeClr val="tx1">
                     <a:tint val="75000"/>
                   </a:schemeClr>
                 </a:solidFill>
+                <a:latin typeface="배달의민족 한나는 열한살" panose="020B0600000101010101" pitchFamily="50" charset="-127"/>
+                <a:ea typeface="배달의민족 한나는 열한살" panose="020B0600000101010101" pitchFamily="50" charset="-127"/>
+                <a:cs typeface="함초롬돋움" panose="020B0804000101010101" pitchFamily="50" charset="-127"/>
               </a:defRPr>
             </a:lvl1pPr>
           </a:lstStyle>
           <a:p>
             <a:r>
-              <a:rPr lang="en-US" altLang="ko-KR" dirty="0"/>
+              <a:rPr lang="en-US" altLang="ko-KR"/>
               <a:t>p.</a:t>
             </a:r>
             <a:fld id="{D74ECCE6-482B-4E3F-A4EE-5A2B5F793A19}" type="slidenum">
@@ -3334,13 +2168,8 @@
     <p:sldLayoutId id="2147483650" r:id="rId2"/>
     <p:sldLayoutId id="2147483651" r:id="rId3"/>
     <p:sldLayoutId id="2147483652" r:id="rId4"/>
-    <p:sldLayoutId id="2147483653" r:id="rId5"/>
-    <p:sldLayoutId id="2147483654" r:id="rId6"/>
-    <p:sldLayoutId id="2147483655" r:id="rId7"/>
-    <p:sldLayoutId id="2147483656" r:id="rId8"/>
-    <p:sldLayoutId id="2147483657" r:id="rId9"/>
-    <p:sldLayoutId id="2147483658" r:id="rId10"/>
-    <p:sldLayoutId id="2147483659" r:id="rId11"/>
+    <p:sldLayoutId id="2147483660" r:id="rId5"/>
+    <p:sldLayoutId id="2147483655" r:id="rId6"/>
   </p:sldLayoutIdLst>
   <p:hf hdr="0" ftr="0" dt="0"/>
   <p:txStyles>
@@ -3353,13 +2182,13 @@
           <a:spcPct val="0"/>
         </a:spcBef>
         <a:buNone/>
-        <a:defRPr sz="4400" kern="1200">
+        <a:defRPr sz="4400" b="0" kern="1200">
           <a:solidFill>
             <a:schemeClr val="tx1"/>
           </a:solidFill>
-          <a:latin typeface="+mj-lt"/>
-          <a:ea typeface="+mj-ea"/>
-          <a:cs typeface="+mj-cs"/>
+          <a:latin typeface="배달의민족 한나는 열한살" panose="020B0600000101010101" pitchFamily="50" charset="-127"/>
+          <a:ea typeface="배달의민족 한나는 열한살" panose="020B0600000101010101" pitchFamily="50" charset="-127"/>
+          <a:cs typeface="함초롬돋움" panose="020B0804000101010101" pitchFamily="50" charset="-127"/>
         </a:defRPr>
       </a:lvl1pPr>
     </p:titleStyle>
@@ -3373,13 +2202,13 @@
         </a:spcBef>
         <a:buFont typeface="Arial" panose="020B0604020202020204" pitchFamily="34" charset="0"/>
         <a:buChar char="•"/>
-        <a:defRPr sz="2800" kern="1200">
+        <a:defRPr sz="2800" b="0" kern="1200">
           <a:solidFill>
             <a:schemeClr val="tx1"/>
           </a:solidFill>
-          <a:latin typeface="+mn-lt"/>
-          <a:ea typeface="+mn-ea"/>
-          <a:cs typeface="+mn-cs"/>
+          <a:latin typeface="배달의민족 한나는 열한살" panose="020B0600000101010101" pitchFamily="50" charset="-127"/>
+          <a:ea typeface="배달의민족 한나는 열한살" panose="020B0600000101010101" pitchFamily="50" charset="-127"/>
+          <a:cs typeface="함초롬돋움" panose="020B0804000101010101" pitchFamily="50" charset="-127"/>
         </a:defRPr>
       </a:lvl1pPr>
       <a:lvl2pPr marL="685800" indent="-228600" algn="l" defTabSz="914400" rtl="0" eaLnBrk="1" latinLnBrk="1" hangingPunct="1">
@@ -3391,13 +2220,13 @@
         </a:spcBef>
         <a:buFont typeface="Arial" panose="020B0604020202020204" pitchFamily="34" charset="0"/>
         <a:buChar char="•"/>
-        <a:defRPr sz="2400" kern="1200">
+        <a:defRPr sz="2400" b="0" kern="1200">
           <a:solidFill>
             <a:schemeClr val="tx1"/>
           </a:solidFill>
-          <a:latin typeface="+mn-lt"/>
-          <a:ea typeface="+mn-ea"/>
-          <a:cs typeface="+mn-cs"/>
+          <a:latin typeface="배달의민족 한나는 열한살" panose="020B0600000101010101" pitchFamily="50" charset="-127"/>
+          <a:ea typeface="배달의민족 한나는 열한살" panose="020B0600000101010101" pitchFamily="50" charset="-127"/>
+          <a:cs typeface="함초롬돋움" panose="020B0804000101010101" pitchFamily="50" charset="-127"/>
         </a:defRPr>
       </a:lvl2pPr>
       <a:lvl3pPr marL="1143000" indent="-228600" algn="l" defTabSz="914400" rtl="0" eaLnBrk="1" latinLnBrk="1" hangingPunct="1">
@@ -3409,13 +2238,13 @@
         </a:spcBef>
         <a:buFont typeface="Arial" panose="020B0604020202020204" pitchFamily="34" charset="0"/>
         <a:buChar char="•"/>
-        <a:defRPr sz="2000" kern="1200">
+        <a:defRPr sz="2000" b="0" kern="1200">
           <a:solidFill>
             <a:schemeClr val="tx1"/>
           </a:solidFill>
-          <a:latin typeface="+mn-lt"/>
-          <a:ea typeface="+mn-ea"/>
-          <a:cs typeface="+mn-cs"/>
+          <a:latin typeface="배달의민족 한나는 열한살" panose="020B0600000101010101" pitchFamily="50" charset="-127"/>
+          <a:ea typeface="배달의민족 한나는 열한살" panose="020B0600000101010101" pitchFamily="50" charset="-127"/>
+          <a:cs typeface="함초롬돋움" panose="020B0804000101010101" pitchFamily="50" charset="-127"/>
         </a:defRPr>
       </a:lvl3pPr>
       <a:lvl4pPr marL="1600200" indent="-228600" algn="l" defTabSz="914400" rtl="0" eaLnBrk="1" latinLnBrk="1" hangingPunct="1">
@@ -3427,13 +2256,13 @@
         </a:spcBef>
         <a:buFont typeface="Arial" panose="020B0604020202020204" pitchFamily="34" charset="0"/>
         <a:buChar char="•"/>
-        <a:defRPr sz="1800" kern="1200">
+        <a:defRPr sz="1800" b="0" kern="1200">
           <a:solidFill>
             <a:schemeClr val="tx1"/>
           </a:solidFill>
-          <a:latin typeface="+mn-lt"/>
-          <a:ea typeface="+mn-ea"/>
-          <a:cs typeface="+mn-cs"/>
+          <a:latin typeface="배달의민족 한나는 열한살" panose="020B0600000101010101" pitchFamily="50" charset="-127"/>
+          <a:ea typeface="배달의민족 한나는 열한살" panose="020B0600000101010101" pitchFamily="50" charset="-127"/>
+          <a:cs typeface="함초롬돋움" panose="020B0804000101010101" pitchFamily="50" charset="-127"/>
         </a:defRPr>
       </a:lvl4pPr>
       <a:lvl5pPr marL="2057400" indent="-228600" algn="l" defTabSz="914400" rtl="0" eaLnBrk="1" latinLnBrk="1" hangingPunct="1">
@@ -3445,13 +2274,13 @@
         </a:spcBef>
         <a:buFont typeface="Arial" panose="020B0604020202020204" pitchFamily="34" charset="0"/>
         <a:buChar char="•"/>
-        <a:defRPr sz="1800" kern="1200">
+        <a:defRPr sz="1800" b="0" kern="1200">
           <a:solidFill>
             <a:schemeClr val="tx1"/>
           </a:solidFill>
-          <a:latin typeface="+mn-lt"/>
-          <a:ea typeface="+mn-ea"/>
-          <a:cs typeface="+mn-cs"/>
+          <a:latin typeface="배달의민족 한나는 열한살" panose="020B0600000101010101" pitchFamily="50" charset="-127"/>
+          <a:ea typeface="배달의민족 한나는 열한살" panose="020B0600000101010101" pitchFamily="50" charset="-127"/>
+          <a:cs typeface="함초롬돋움" panose="020B0804000101010101" pitchFamily="50" charset="-127"/>
         </a:defRPr>
       </a:lvl5pPr>
       <a:lvl6pPr marL="2514600" indent="-228600" algn="l" defTabSz="914400" rtl="0" eaLnBrk="1" latinLnBrk="1" hangingPunct="1">
@@ -3754,6 +2583,18 @@
   <p:clrMapOvr>
     <a:masterClrMapping/>
   </p:clrMapOvr>
+  <mc:AlternateContent xmlns:mc="http://schemas.openxmlformats.org/markup-compatibility/2006">
+    <mc:Choice xmlns:p159="http://schemas.microsoft.com/office/powerpoint/2015/09/main" Requires="p159">
+      <p:transition>
+        <p159:morph option="byObject"/>
+      </p:transition>
+    </mc:Choice>
+    <mc:Fallback>
+      <p:transition>
+        <p:fade/>
+      </p:transition>
+    </mc:Fallback>
+  </mc:AlternateContent>
 </p:sld>
 </file>
 
@@ -3776,97 +2617,10 @@
       </p:grpSpPr>
       <p:sp>
         <p:nvSpPr>
-          <p:cNvPr id="2" name="제목 1">
-            <a:extLst>
-              <a:ext uri="{FF2B5EF4-FFF2-40B4-BE49-F238E27FC236}">
-                <a16:creationId xmlns:a16="http://schemas.microsoft.com/office/drawing/2014/main" id="{33EE91B0-5BCC-4566-9903-3AC5761D5596}"/>
-              </a:ext>
-            </a:extLst>
-          </p:cNvPr>
-          <p:cNvSpPr>
-            <a:spLocks noGrp="1"/>
-          </p:cNvSpPr>
-          <p:nvPr>
-            <p:ph type="title"/>
-          </p:nvPr>
-        </p:nvSpPr>
-        <p:spPr/>
-        <p:txBody>
-          <a:bodyPr>
-            <a:normAutofit fontScale="90000"/>
-          </a:bodyPr>
-          <a:lstStyle/>
-          <a:p>
-            <a:r>
-              <a:rPr lang="ko-KR" altLang="en-US" dirty="0"/>
-              <a:t>프로그램 개요</a:t>
-            </a:r>
-          </a:p>
-        </p:txBody>
-      </p:sp>
-      <p:sp>
-        <p:nvSpPr>
-          <p:cNvPr id="4" name="슬라이드 번호 개체 틀 3">
-            <a:extLst>
-              <a:ext uri="{FF2B5EF4-FFF2-40B4-BE49-F238E27FC236}">
-                <a16:creationId xmlns:a16="http://schemas.microsoft.com/office/drawing/2014/main" id="{DD254026-3AAF-4AB5-8CA9-4C98AD7E75CB}"/>
-              </a:ext>
-            </a:extLst>
-          </p:cNvPr>
-          <p:cNvSpPr>
-            <a:spLocks noGrp="1"/>
-          </p:cNvSpPr>
-          <p:nvPr>
-            <p:ph type="sldNum" sz="quarter" idx="12"/>
-          </p:nvPr>
-        </p:nvSpPr>
-        <p:spPr/>
-        <p:txBody>
-          <a:bodyPr/>
-          <a:lstStyle/>
-          <a:p>
-            <a:fld id="{D74ECCE6-482B-4E3F-A4EE-5A2B5F793A19}" type="slidenum">
-              <a:rPr lang="ko-KR" altLang="en-US" smtClean="0"/>
-              <a:t>10</a:t>
-            </a:fld>
-            <a:endParaRPr lang="ko-KR" altLang="en-US"/>
-          </a:p>
-        </p:txBody>
-      </p:sp>
-      <p:sp>
-        <p:nvSpPr>
-          <p:cNvPr id="3" name="텍스트 개체 틀 2">
-            <a:extLst>
-              <a:ext uri="{FF2B5EF4-FFF2-40B4-BE49-F238E27FC236}">
-                <a16:creationId xmlns:a16="http://schemas.microsoft.com/office/drawing/2014/main" id="{3D0D9B99-E60A-4E7C-B3AD-2C3C55715C11}"/>
-              </a:ext>
-            </a:extLst>
-          </p:cNvPr>
-          <p:cNvSpPr>
-            <a:spLocks noGrp="1"/>
-          </p:cNvSpPr>
-          <p:nvPr>
-            <p:ph type="body" sz="quarter" idx="13"/>
-          </p:nvPr>
-        </p:nvSpPr>
-        <p:spPr/>
-        <p:txBody>
-          <a:bodyPr/>
-          <a:lstStyle/>
-          <a:p>
-            <a:r>
-              <a:rPr lang="ko-KR" altLang="en-US" dirty="0"/>
-              <a:t>구조도</a:t>
-            </a:r>
-          </a:p>
-        </p:txBody>
-      </p:sp>
-      <p:sp>
-        <p:nvSpPr>
-          <p:cNvPr id="5" name="직사각형 4">
-            <a:extLst>
-              <a:ext uri="{FF2B5EF4-FFF2-40B4-BE49-F238E27FC236}">
-                <a16:creationId xmlns:a16="http://schemas.microsoft.com/office/drawing/2014/main" id="{7B6DF58F-7006-4AC7-8BC6-18B7DDAA2DD1}"/>
+          <p:cNvPr id="14" name="직사각형 13">
+            <a:extLst>
+              <a:ext uri="{FF2B5EF4-FFF2-40B4-BE49-F238E27FC236}">
+                <a16:creationId xmlns:a16="http://schemas.microsoft.com/office/drawing/2014/main" id="{A4B87CBF-E10C-44A5-8729-47DDC743A724}"/>
               </a:ext>
             </a:extLst>
           </p:cNvPr>
@@ -3875,8 +2629,8 @@
         </p:nvSpPr>
         <p:spPr>
           <a:xfrm>
-            <a:off x="999859" y="1469877"/>
-            <a:ext cx="7839342" cy="5022998"/>
+            <a:off x="0" y="0"/>
+            <a:ext cx="3320398" cy="6858000"/>
           </a:xfrm>
           <a:prstGeom prst="rect">
             <a:avLst/>
@@ -3884,15 +2638,9 @@
           <a:solidFill>
             <a:schemeClr val="bg1"/>
           </a:solidFill>
-          <a:effectLst>
-            <a:outerShdw blurRad="50800" dist="50800" dir="2700000" algn="ctr" rotWithShape="0">
-              <a:schemeClr val="tx1">
-                <a:lumMod val="85000"/>
-                <a:lumOff val="15000"/>
-                <a:alpha val="56000"/>
-              </a:schemeClr>
-            </a:outerShdw>
-          </a:effectLst>
+          <a:ln>
+            <a:noFill/>
+          </a:ln>
         </p:spPr>
         <p:style>
           <a:lnRef idx="2">
@@ -3911,502 +2659,107 @@
           </a:fontRef>
         </p:style>
         <p:txBody>
-          <a:bodyPr lIns="360000" tIns="360000" rtlCol="0" anchor="t" anchorCtr="0"/>
-          <a:lstStyle/>
-          <a:p>
-            <a:r>
-              <a:rPr lang="en-US" altLang="ko-KR" dirty="0">
-                <a:solidFill>
-                  <a:schemeClr val="tx1"/>
-                </a:solidFill>
-              </a:rPr>
-              <a:t>Window</a:t>
-            </a:r>
-            <a:endParaRPr lang="ko-KR" altLang="en-US" dirty="0">
-              <a:solidFill>
-                <a:schemeClr val="tx1"/>
-              </a:solidFill>
-            </a:endParaRPr>
-          </a:p>
-        </p:txBody>
-      </p:sp>
-      <p:sp>
-        <p:nvSpPr>
-          <p:cNvPr id="6" name="직사각형 5">
-            <a:extLst>
-              <a:ext uri="{FF2B5EF4-FFF2-40B4-BE49-F238E27FC236}">
-                <a16:creationId xmlns:a16="http://schemas.microsoft.com/office/drawing/2014/main" id="{15404CDC-4BBD-4DCD-907C-3726DF4D7A58}"/>
-              </a:ext>
-            </a:extLst>
-          </p:cNvPr>
-          <p:cNvSpPr/>
-          <p:nvPr/>
+          <a:bodyPr rtlCol="0" anchor="ctr"/>
+          <a:lstStyle/>
+          <a:p>
+            <a:pPr algn="ctr"/>
+            <a:endParaRPr lang="ko-KR" altLang="en-US"/>
+          </a:p>
+        </p:txBody>
+      </p:sp>
+      <p:sp>
+        <p:nvSpPr>
+          <p:cNvPr id="2" name="제목 1">
+            <a:extLst>
+              <a:ext uri="{FF2B5EF4-FFF2-40B4-BE49-F238E27FC236}">
+                <a16:creationId xmlns:a16="http://schemas.microsoft.com/office/drawing/2014/main" id="{33EE91B0-5BCC-4566-9903-3AC5761D5596}"/>
+              </a:ext>
+            </a:extLst>
+          </p:cNvPr>
+          <p:cNvSpPr>
+            <a:spLocks noGrp="1"/>
+          </p:cNvSpPr>
+          <p:nvPr>
+            <p:ph type="title"/>
+          </p:nvPr>
         </p:nvSpPr>
         <p:spPr>
           <a:xfrm>
-            <a:off x="1352846" y="2522368"/>
-            <a:ext cx="2340000" cy="720000"/>
+            <a:off x="3320398" y="0"/>
+            <a:ext cx="1619737" cy="483430"/>
           </a:xfrm>
-          <a:prstGeom prst="rect">
-            <a:avLst/>
-          </a:prstGeom>
-          <a:solidFill>
-            <a:schemeClr val="bg1"/>
-          </a:solidFill>
-          <a:effectLst>
-            <a:outerShdw blurRad="50800" dist="50800" dir="2700000" algn="ctr" rotWithShape="0">
-              <a:schemeClr val="tx1">
-                <a:lumMod val="85000"/>
-                <a:lumOff val="15000"/>
-                <a:alpha val="56000"/>
-              </a:schemeClr>
-            </a:outerShdw>
-          </a:effectLst>
         </p:spPr>
-        <p:style>
-          <a:lnRef idx="2">
-            <a:schemeClr val="accent1">
-              <a:shade val="50000"/>
-            </a:schemeClr>
-          </a:lnRef>
-          <a:fillRef idx="1">
-            <a:schemeClr val="accent1"/>
-          </a:fillRef>
-          <a:effectRef idx="0">
-            <a:schemeClr val="accent1"/>
-          </a:effectRef>
-          <a:fontRef idx="minor">
-            <a:schemeClr val="lt1"/>
-          </a:fontRef>
-        </p:style>
-        <p:txBody>
-          <a:bodyPr rtlCol="0" anchor="ctr" anchorCtr="0"/>
-          <a:lstStyle/>
-          <a:p>
-            <a:pPr algn="ctr"/>
+        <p:txBody>
+          <a:bodyPr>
+            <a:normAutofit/>
+          </a:bodyPr>
+          <a:lstStyle/>
+          <a:p>
             <a:r>
-              <a:rPr lang="en-US" altLang="ko-KR" dirty="0" err="1">
-                <a:solidFill>
-                  <a:schemeClr val="tx1"/>
-                </a:solidFill>
-              </a:rPr>
-              <a:t>LevelMeter</a:t>
+              <a:rPr lang="ko-KR" altLang="en-US" dirty="0"/>
+              <a:t>프로그램 개요</a:t>
             </a:r>
-            <a:endParaRPr lang="en-US" altLang="ko-KR" dirty="0">
-              <a:solidFill>
-                <a:schemeClr val="tx1"/>
-              </a:solidFill>
-            </a:endParaRPr>
-          </a:p>
-        </p:txBody>
-      </p:sp>
-      <p:sp>
-        <p:nvSpPr>
-          <p:cNvPr id="7" name="직사각형 6">
-            <a:extLst>
-              <a:ext uri="{FF2B5EF4-FFF2-40B4-BE49-F238E27FC236}">
-                <a16:creationId xmlns:a16="http://schemas.microsoft.com/office/drawing/2014/main" id="{C0EC3C80-6A31-436D-B554-D18497EFB793}"/>
-              </a:ext>
-            </a:extLst>
-          </p:cNvPr>
-          <p:cNvSpPr/>
-          <p:nvPr/>
+          </a:p>
+        </p:txBody>
+      </p:sp>
+      <p:sp>
+        <p:nvSpPr>
+          <p:cNvPr id="4" name="슬라이드 번호 개체 틀 3">
+            <a:extLst>
+              <a:ext uri="{FF2B5EF4-FFF2-40B4-BE49-F238E27FC236}">
+                <a16:creationId xmlns:a16="http://schemas.microsoft.com/office/drawing/2014/main" id="{DD254026-3AAF-4AB5-8CA9-4C98AD7E75CB}"/>
+              </a:ext>
+            </a:extLst>
+          </p:cNvPr>
+          <p:cNvSpPr>
+            <a:spLocks noGrp="1"/>
+          </p:cNvSpPr>
+          <p:nvPr>
+            <p:ph type="sldNum" sz="quarter" idx="12"/>
+          </p:nvPr>
+        </p:nvSpPr>
+        <p:spPr/>
+        <p:txBody>
+          <a:bodyPr/>
+          <a:lstStyle/>
+          <a:p>
+            <a:fld id="{D74ECCE6-482B-4E3F-A4EE-5A2B5F793A19}" type="slidenum">
+              <a:rPr lang="ko-KR" altLang="en-US" smtClean="0"/>
+              <a:t>10</a:t>
+            </a:fld>
+            <a:endParaRPr lang="ko-KR" altLang="en-US"/>
+          </a:p>
+        </p:txBody>
+      </p:sp>
+      <p:sp>
+        <p:nvSpPr>
+          <p:cNvPr id="3" name="텍스트 개체 틀 2">
+            <a:extLst>
+              <a:ext uri="{FF2B5EF4-FFF2-40B4-BE49-F238E27FC236}">
+                <a16:creationId xmlns:a16="http://schemas.microsoft.com/office/drawing/2014/main" id="{3D0D9B99-E60A-4E7C-B3AD-2C3C55715C11}"/>
+              </a:ext>
+            </a:extLst>
+          </p:cNvPr>
+          <p:cNvSpPr>
+            <a:spLocks noGrp="1"/>
+          </p:cNvSpPr>
+          <p:nvPr>
+            <p:ph type="body" sz="quarter" idx="13"/>
+          </p:nvPr>
         </p:nvSpPr>
         <p:spPr>
           <a:xfrm>
-            <a:off x="4561032" y="2088368"/>
-            <a:ext cx="2168923" cy="1001712"/>
+            <a:off x="3431848" y="772888"/>
+            <a:ext cx="2168923" cy="862237"/>
           </a:xfrm>
-          <a:prstGeom prst="rect">
-            <a:avLst/>
-          </a:prstGeom>
-          <a:solidFill>
-            <a:schemeClr val="bg1"/>
-          </a:solidFill>
-          <a:effectLst>
-            <a:outerShdw blurRad="50800" dist="50800" dir="2700000" algn="ctr" rotWithShape="0">
-              <a:schemeClr val="tx1">
-                <a:lumMod val="85000"/>
-                <a:lumOff val="15000"/>
-                <a:alpha val="56000"/>
-              </a:schemeClr>
-            </a:outerShdw>
-          </a:effectLst>
         </p:spPr>
-        <p:style>
-          <a:lnRef idx="2">
-            <a:schemeClr val="accent1">
-              <a:shade val="50000"/>
-            </a:schemeClr>
-          </a:lnRef>
-          <a:fillRef idx="1">
-            <a:schemeClr val="accent1"/>
-          </a:fillRef>
-          <a:effectRef idx="0">
-            <a:schemeClr val="accent1"/>
-          </a:effectRef>
-          <a:fontRef idx="minor">
-            <a:schemeClr val="lt1"/>
-          </a:fontRef>
-        </p:style>
-        <p:txBody>
-          <a:bodyPr rtlCol="0" anchor="ctr" anchorCtr="0"/>
-          <a:lstStyle/>
-          <a:p>
-            <a:pPr algn="ctr"/>
+        <p:txBody>
+          <a:bodyPr/>
+          <a:lstStyle/>
+          <a:p>
             <a:r>
-              <a:rPr lang="en-US" altLang="ko-KR" dirty="0">
-                <a:solidFill>
-                  <a:schemeClr val="tx1"/>
-                </a:solidFill>
-              </a:rPr>
-              <a:t>Title Pane</a:t>
-            </a:r>
-          </a:p>
-        </p:txBody>
-      </p:sp>
-      <p:sp>
-        <p:nvSpPr>
-          <p:cNvPr id="8" name="직사각형 7">
-            <a:extLst>
-              <a:ext uri="{FF2B5EF4-FFF2-40B4-BE49-F238E27FC236}">
-                <a16:creationId xmlns:a16="http://schemas.microsoft.com/office/drawing/2014/main" id="{66A09CDC-8683-4B4A-803C-BCBD67B6D963}"/>
-              </a:ext>
-            </a:extLst>
-          </p:cNvPr>
-          <p:cNvSpPr/>
-          <p:nvPr/>
-        </p:nvSpPr>
-        <p:spPr>
-          <a:xfrm>
-            <a:off x="7802880" y="1822365"/>
-            <a:ext cx="707167" cy="4435792"/>
-          </a:xfrm>
-          <a:prstGeom prst="rect">
-            <a:avLst/>
-          </a:prstGeom>
-          <a:solidFill>
-            <a:schemeClr val="bg1"/>
-          </a:solidFill>
-          <a:effectLst>
-            <a:outerShdw blurRad="50800" dist="50800" dir="2700000" algn="ctr" rotWithShape="0">
-              <a:schemeClr val="tx1">
-                <a:lumMod val="85000"/>
-                <a:lumOff val="15000"/>
-                <a:alpha val="56000"/>
-              </a:schemeClr>
-            </a:outerShdw>
-          </a:effectLst>
-        </p:spPr>
-        <p:style>
-          <a:lnRef idx="2">
-            <a:schemeClr val="accent1">
-              <a:shade val="50000"/>
-            </a:schemeClr>
-          </a:lnRef>
-          <a:fillRef idx="1">
-            <a:schemeClr val="accent1"/>
-          </a:fillRef>
-          <a:effectRef idx="0">
-            <a:schemeClr val="accent1"/>
-          </a:effectRef>
-          <a:fontRef idx="minor">
-            <a:schemeClr val="lt1"/>
-          </a:fontRef>
-        </p:style>
-        <p:txBody>
-          <a:bodyPr vert="eaVert" rtlCol="0" anchor="ctr" anchorCtr="0"/>
-          <a:lstStyle/>
-          <a:p>
-            <a:pPr algn="ctr"/>
-            <a:r>
-              <a:rPr lang="en-US" altLang="ko-KR" dirty="0">
-                <a:solidFill>
-                  <a:schemeClr val="tx1"/>
-                </a:solidFill>
-              </a:rPr>
-              <a:t>Save Manager</a:t>
-            </a:r>
-          </a:p>
-        </p:txBody>
-      </p:sp>
-      <p:sp>
-        <p:nvSpPr>
-          <p:cNvPr id="9" name="직사각형 8">
-            <a:extLst>
-              <a:ext uri="{FF2B5EF4-FFF2-40B4-BE49-F238E27FC236}">
-                <a16:creationId xmlns:a16="http://schemas.microsoft.com/office/drawing/2014/main" id="{613A8E4D-FC34-4714-A2CF-07DA4FF88A49}"/>
-              </a:ext>
-            </a:extLst>
-          </p:cNvPr>
-          <p:cNvSpPr/>
-          <p:nvPr/>
-        </p:nvSpPr>
-        <p:spPr>
-          <a:xfrm>
-            <a:off x="9982200" y="1822365"/>
-            <a:ext cx="1731805" cy="4435792"/>
-          </a:xfrm>
-          <a:prstGeom prst="rect">
-            <a:avLst/>
-          </a:prstGeom>
-          <a:solidFill>
-            <a:schemeClr val="bg1"/>
-          </a:solidFill>
-          <a:effectLst>
-            <a:outerShdw blurRad="50800" dist="50800" dir="2700000" algn="ctr" rotWithShape="0">
-              <a:schemeClr val="tx1">
-                <a:lumMod val="85000"/>
-                <a:lumOff val="15000"/>
-                <a:alpha val="56000"/>
-              </a:schemeClr>
-            </a:outerShdw>
-          </a:effectLst>
-        </p:spPr>
-        <p:style>
-          <a:lnRef idx="2">
-            <a:schemeClr val="accent1">
-              <a:shade val="50000"/>
-            </a:schemeClr>
-          </a:lnRef>
-          <a:fillRef idx="1">
-            <a:schemeClr val="accent1"/>
-          </a:fillRef>
-          <a:effectRef idx="0">
-            <a:schemeClr val="accent1"/>
-          </a:effectRef>
-          <a:fontRef idx="minor">
-            <a:schemeClr val="lt1"/>
-          </a:fontRef>
-        </p:style>
-        <p:txBody>
-          <a:bodyPr vert="eaVert" rtlCol="0" anchor="ctr" anchorCtr="0"/>
-          <a:lstStyle/>
-          <a:p>
-            <a:pPr algn="ctr"/>
-            <a:r>
-              <a:rPr lang="en-US" altLang="ko-KR" dirty="0">
-                <a:solidFill>
-                  <a:schemeClr val="tx1"/>
-                </a:solidFill>
-              </a:rPr>
-              <a:t>External</a:t>
-            </a:r>
-            <a:r>
-              <a:rPr lang="ko-KR" altLang="en-US" dirty="0">
-                <a:solidFill>
-                  <a:schemeClr val="tx1"/>
-                </a:solidFill>
-              </a:rPr>
-              <a:t> </a:t>
-            </a:r>
-            <a:r>
-              <a:rPr lang="en-US" altLang="ko-KR" dirty="0">
-                <a:solidFill>
-                  <a:schemeClr val="tx1"/>
-                </a:solidFill>
-              </a:rPr>
-              <a:t>File System</a:t>
-            </a:r>
-          </a:p>
-        </p:txBody>
-      </p:sp>
-      <p:sp>
-        <p:nvSpPr>
-          <p:cNvPr id="10" name="직사각형 9">
-            <a:extLst>
-              <a:ext uri="{FF2B5EF4-FFF2-40B4-BE49-F238E27FC236}">
-                <a16:creationId xmlns:a16="http://schemas.microsoft.com/office/drawing/2014/main" id="{C7A4BB39-766A-4EDE-886E-1460BE09200C}"/>
-              </a:ext>
-            </a:extLst>
-          </p:cNvPr>
-          <p:cNvSpPr/>
-          <p:nvPr/>
-        </p:nvSpPr>
-        <p:spPr>
-          <a:xfrm>
-            <a:off x="1352846" y="4520320"/>
-            <a:ext cx="2340000" cy="720000"/>
-          </a:xfrm>
-          <a:prstGeom prst="rect">
-            <a:avLst/>
-          </a:prstGeom>
-          <a:solidFill>
-            <a:schemeClr val="bg1"/>
-          </a:solidFill>
-          <a:effectLst>
-            <a:outerShdw blurRad="50800" dist="50800" dir="2700000" algn="ctr" rotWithShape="0">
-              <a:schemeClr val="tx1">
-                <a:lumMod val="85000"/>
-                <a:lumOff val="15000"/>
-                <a:alpha val="56000"/>
-              </a:schemeClr>
-            </a:outerShdw>
-          </a:effectLst>
-        </p:spPr>
-        <p:style>
-          <a:lnRef idx="2">
-            <a:schemeClr val="accent1">
-              <a:shade val="50000"/>
-            </a:schemeClr>
-          </a:lnRef>
-          <a:fillRef idx="1">
-            <a:schemeClr val="accent1"/>
-          </a:fillRef>
-          <a:effectRef idx="0">
-            <a:schemeClr val="accent1"/>
-          </a:effectRef>
-          <a:fontRef idx="minor">
-            <a:schemeClr val="lt1"/>
-          </a:fontRef>
-        </p:style>
-        <p:txBody>
-          <a:bodyPr rtlCol="0" anchor="ctr" anchorCtr="0"/>
-          <a:lstStyle/>
-          <a:p>
-            <a:pPr algn="ctr"/>
-            <a:r>
-              <a:rPr lang="en-US" altLang="ko-KR" dirty="0" err="1">
-                <a:solidFill>
-                  <a:schemeClr val="tx1"/>
-                </a:solidFill>
-              </a:rPr>
-              <a:t>SoundHandler</a:t>
-            </a:r>
-            <a:endParaRPr lang="en-US" altLang="ko-KR" dirty="0">
-              <a:solidFill>
-                <a:schemeClr val="tx1"/>
-              </a:solidFill>
-            </a:endParaRPr>
-          </a:p>
-        </p:txBody>
-      </p:sp>
-      <p:sp>
-        <p:nvSpPr>
-          <p:cNvPr id="11" name="직사각형 10">
-            <a:extLst>
-              <a:ext uri="{FF2B5EF4-FFF2-40B4-BE49-F238E27FC236}">
-                <a16:creationId xmlns:a16="http://schemas.microsoft.com/office/drawing/2014/main" id="{3E85935A-6949-46A0-8B71-0640A83B46D3}"/>
-              </a:ext>
-            </a:extLst>
-          </p:cNvPr>
-          <p:cNvSpPr/>
-          <p:nvPr/>
-        </p:nvSpPr>
-        <p:spPr>
-          <a:xfrm>
-            <a:off x="4561032" y="3370083"/>
-            <a:ext cx="2168923" cy="1001712"/>
-          </a:xfrm>
-          <a:prstGeom prst="rect">
-            <a:avLst/>
-          </a:prstGeom>
-          <a:solidFill>
-            <a:schemeClr val="bg1"/>
-          </a:solidFill>
-          <a:effectLst>
-            <a:outerShdw blurRad="50800" dist="50800" dir="2700000" algn="ctr" rotWithShape="0">
-              <a:schemeClr val="tx1">
-                <a:lumMod val="85000"/>
-                <a:lumOff val="15000"/>
-                <a:alpha val="56000"/>
-              </a:schemeClr>
-            </a:outerShdw>
-          </a:effectLst>
-        </p:spPr>
-        <p:style>
-          <a:lnRef idx="2">
-            <a:schemeClr val="accent1">
-              <a:shade val="50000"/>
-            </a:schemeClr>
-          </a:lnRef>
-          <a:fillRef idx="1">
-            <a:schemeClr val="accent1"/>
-          </a:fillRef>
-          <a:effectRef idx="0">
-            <a:schemeClr val="accent1"/>
-          </a:effectRef>
-          <a:fontRef idx="minor">
-            <a:schemeClr val="lt1"/>
-          </a:fontRef>
-        </p:style>
-        <p:txBody>
-          <a:bodyPr rtlCol="0" anchor="ctr" anchorCtr="0"/>
-          <a:lstStyle/>
-          <a:p>
-            <a:pPr algn="ctr"/>
-            <a:r>
-              <a:rPr lang="en-US" altLang="ko-KR" dirty="0">
-                <a:solidFill>
-                  <a:schemeClr val="tx1"/>
-                </a:solidFill>
-              </a:rPr>
-              <a:t>Game Pane</a:t>
-            </a:r>
-          </a:p>
-        </p:txBody>
-      </p:sp>
-      <p:sp>
-        <p:nvSpPr>
-          <p:cNvPr id="12" name="직사각형 11">
-            <a:extLst>
-              <a:ext uri="{FF2B5EF4-FFF2-40B4-BE49-F238E27FC236}">
-                <a16:creationId xmlns:a16="http://schemas.microsoft.com/office/drawing/2014/main" id="{05104E5A-A462-4AE3-9D26-C01F247341EC}"/>
-              </a:ext>
-            </a:extLst>
-          </p:cNvPr>
-          <p:cNvSpPr/>
-          <p:nvPr/>
-        </p:nvSpPr>
-        <p:spPr>
-          <a:xfrm>
-            <a:off x="4561032" y="4681051"/>
-            <a:ext cx="2168923" cy="1001712"/>
-          </a:xfrm>
-          <a:prstGeom prst="rect">
-            <a:avLst/>
-          </a:prstGeom>
-          <a:solidFill>
-            <a:schemeClr val="bg1"/>
-          </a:solidFill>
-          <a:effectLst>
-            <a:outerShdw blurRad="50800" dist="50800" dir="2700000" algn="ctr" rotWithShape="0">
-              <a:schemeClr val="tx1">
-                <a:lumMod val="85000"/>
-                <a:lumOff val="15000"/>
-                <a:alpha val="56000"/>
-              </a:schemeClr>
-            </a:outerShdw>
-          </a:effectLst>
-        </p:spPr>
-        <p:style>
-          <a:lnRef idx="2">
-            <a:schemeClr val="accent1">
-              <a:shade val="50000"/>
-            </a:schemeClr>
-          </a:lnRef>
-          <a:fillRef idx="1">
-            <a:schemeClr val="accent1"/>
-          </a:fillRef>
-          <a:effectRef idx="0">
-            <a:schemeClr val="accent1"/>
-          </a:effectRef>
-          <a:fontRef idx="minor">
-            <a:schemeClr val="lt1"/>
-          </a:fontRef>
-        </p:style>
-        <p:txBody>
-          <a:bodyPr rtlCol="0" anchor="ctr" anchorCtr="0"/>
-          <a:lstStyle/>
-          <a:p>
-            <a:pPr algn="ctr"/>
-            <a:r>
-              <a:rPr lang="en-US" altLang="ko-KR" dirty="0">
-                <a:solidFill>
-                  <a:schemeClr val="tx1"/>
-                </a:solidFill>
-              </a:rPr>
-              <a:t>Upgrade Pane</a:t>
+              <a:rPr lang="ko-KR" altLang="en-US" dirty="0"/>
+              <a:t>구조도</a:t>
             </a:r>
           </a:p>
         </p:txBody>
@@ -4492,226 +2845,894 @@
           </a:fontRef>
         </p:style>
       </p:cxnSp>
-      <p:cxnSp>
-        <p:nvCxnSpPr>
-          <p:cNvPr id="24" name="연결선: 꺾임 23">
-            <a:extLst>
-              <a:ext uri="{FF2B5EF4-FFF2-40B4-BE49-F238E27FC236}">
-                <a16:creationId xmlns:a16="http://schemas.microsoft.com/office/drawing/2014/main" id="{07438148-4A02-4F61-8315-8DB90685CDF8}"/>
-              </a:ext>
-            </a:extLst>
-          </p:cNvPr>
-          <p:cNvCxnSpPr>
-            <a:cxnSpLocks/>
-            <a:stCxn id="6" idx="2"/>
-            <a:endCxn id="10" idx="0"/>
-          </p:cNvCxnSpPr>
+      <p:grpSp>
+        <p:nvGrpSpPr>
+          <p:cNvPr id="13" name="그룹 12">
+            <a:extLst>
+              <a:ext uri="{FF2B5EF4-FFF2-40B4-BE49-F238E27FC236}">
+                <a16:creationId xmlns:a16="http://schemas.microsoft.com/office/drawing/2014/main" id="{ECEAB2B2-FB61-42EF-B3DB-EE37D55B57EF}"/>
+              </a:ext>
+            </a:extLst>
+          </p:cNvPr>
+          <p:cNvGrpSpPr/>
           <p:nvPr/>
-        </p:nvCxnSpPr>
-        <p:spPr>
-          <a:xfrm rot="5400000">
-            <a:off x="1883870" y="3881344"/>
-            <a:ext cx="1277952" cy="12700"/>
+        </p:nvGrpSpPr>
+        <p:grpSpPr>
+          <a:xfrm>
+            <a:off x="999859" y="1469877"/>
+            <a:ext cx="10714146" cy="5022998"/>
+            <a:chOff x="999859" y="1469877"/>
+            <a:chExt cx="10714146" cy="5022998"/>
           </a:xfrm>
-          <a:prstGeom prst="bentConnector3">
-            <a:avLst>
-              <a:gd name="adj1" fmla="val 709"/>
-            </a:avLst>
-          </a:prstGeom>
-          <a:ln w="19050">
-            <a:tailEnd type="triangle" w="lg" len="med"/>
-          </a:ln>
-        </p:spPr>
-        <p:style>
-          <a:lnRef idx="1">
-            <a:schemeClr val="accent1"/>
-          </a:lnRef>
-          <a:fillRef idx="0">
-            <a:schemeClr val="accent1"/>
-          </a:fillRef>
-          <a:effectRef idx="0">
-            <a:schemeClr val="accent1"/>
-          </a:effectRef>
-          <a:fontRef idx="minor">
-            <a:schemeClr val="tx1"/>
-          </a:fontRef>
-        </p:style>
-      </p:cxnSp>
-      <p:cxnSp>
-        <p:nvCxnSpPr>
-          <p:cNvPr id="29" name="연결선: 꺾임 28">
-            <a:extLst>
-              <a:ext uri="{FF2B5EF4-FFF2-40B4-BE49-F238E27FC236}">
-                <a16:creationId xmlns:a16="http://schemas.microsoft.com/office/drawing/2014/main" id="{79B05AE2-1980-4487-A939-B5EC3FDC18FA}"/>
-              </a:ext>
-            </a:extLst>
-          </p:cNvPr>
-          <p:cNvCxnSpPr>
-            <a:cxnSpLocks/>
-            <a:stCxn id="10" idx="3"/>
-            <a:endCxn id="11" idx="1"/>
-          </p:cNvCxnSpPr>
-          <p:nvPr/>
-        </p:nvCxnSpPr>
-        <p:spPr>
-          <a:xfrm flipV="1">
-            <a:off x="3692846" y="3870939"/>
-            <a:ext cx="868186" cy="1009381"/>
-          </a:xfrm>
-          <a:prstGeom prst="bentConnector3">
-            <a:avLst/>
-          </a:prstGeom>
-          <a:ln w="19050">
-            <a:tailEnd type="triangle" w="lg" len="med"/>
-          </a:ln>
-        </p:spPr>
-        <p:style>
-          <a:lnRef idx="1">
-            <a:schemeClr val="accent1"/>
-          </a:lnRef>
-          <a:fillRef idx="0">
-            <a:schemeClr val="accent1"/>
-          </a:fillRef>
-          <a:effectRef idx="0">
-            <a:schemeClr val="accent1"/>
-          </a:effectRef>
-          <a:fontRef idx="minor">
-            <a:schemeClr val="tx1"/>
-          </a:fontRef>
-        </p:style>
-      </p:cxnSp>
-      <p:cxnSp>
-        <p:nvCxnSpPr>
-          <p:cNvPr id="33" name="연결선: 꺾임 32">
-            <a:extLst>
-              <a:ext uri="{FF2B5EF4-FFF2-40B4-BE49-F238E27FC236}">
-                <a16:creationId xmlns:a16="http://schemas.microsoft.com/office/drawing/2014/main" id="{7EA173C4-4C8E-4E26-AA70-DE8F73E36EDB}"/>
-              </a:ext>
-            </a:extLst>
-          </p:cNvPr>
-          <p:cNvCxnSpPr>
-            <a:cxnSpLocks/>
-            <a:stCxn id="11" idx="3"/>
-            <a:endCxn id="8" idx="1"/>
-          </p:cNvCxnSpPr>
-          <p:nvPr/>
-        </p:nvCxnSpPr>
-        <p:spPr>
-          <a:xfrm>
-            <a:off x="6729955" y="3870939"/>
-            <a:ext cx="1072925" cy="169322"/>
-          </a:xfrm>
-          <a:prstGeom prst="bentConnector3">
-            <a:avLst/>
-          </a:prstGeom>
-          <a:ln w="19050">
-            <a:tailEnd type="triangle" w="lg" len="med"/>
-          </a:ln>
-        </p:spPr>
-        <p:style>
-          <a:lnRef idx="1">
-            <a:schemeClr val="accent1"/>
-          </a:lnRef>
-          <a:fillRef idx="0">
-            <a:schemeClr val="accent1"/>
-          </a:fillRef>
-          <a:effectRef idx="0">
-            <a:schemeClr val="accent1"/>
-          </a:effectRef>
-          <a:fontRef idx="minor">
-            <a:schemeClr val="tx1"/>
-          </a:fontRef>
-        </p:style>
-      </p:cxnSp>
-      <p:cxnSp>
-        <p:nvCxnSpPr>
-          <p:cNvPr id="36" name="연결선: 꺾임 35">
-            <a:extLst>
-              <a:ext uri="{FF2B5EF4-FFF2-40B4-BE49-F238E27FC236}">
-                <a16:creationId xmlns:a16="http://schemas.microsoft.com/office/drawing/2014/main" id="{8568A19B-9260-45CB-94D0-648001584A13}"/>
-              </a:ext>
-            </a:extLst>
-          </p:cNvPr>
-          <p:cNvCxnSpPr>
-            <a:cxnSpLocks/>
-            <a:stCxn id="8" idx="3"/>
-            <a:endCxn id="9" idx="1"/>
-          </p:cNvCxnSpPr>
-          <p:nvPr/>
-        </p:nvCxnSpPr>
-        <p:spPr>
-          <a:xfrm>
-            <a:off x="8510047" y="4040261"/>
-            <a:ext cx="1472153" cy="12700"/>
-          </a:xfrm>
-          <a:prstGeom prst="bentConnector3">
-            <a:avLst>
-              <a:gd name="adj1" fmla="val 96930"/>
-            </a:avLst>
-          </a:prstGeom>
-          <a:ln w="19050">
-            <a:headEnd type="triangle" w="lg" len="med"/>
-            <a:tailEnd type="triangle" w="lg" len="med"/>
-          </a:ln>
-        </p:spPr>
-        <p:style>
-          <a:lnRef idx="1">
-            <a:schemeClr val="accent1"/>
-          </a:lnRef>
-          <a:fillRef idx="0">
-            <a:schemeClr val="accent1"/>
-          </a:fillRef>
-          <a:effectRef idx="0">
-            <a:schemeClr val="accent1"/>
-          </a:effectRef>
-          <a:fontRef idx="minor">
-            <a:schemeClr val="tx1"/>
-          </a:fontRef>
-        </p:style>
-      </p:cxnSp>
-      <p:cxnSp>
-        <p:nvCxnSpPr>
-          <p:cNvPr id="37" name="연결선: 꺾임 36">
-            <a:extLst>
-              <a:ext uri="{FF2B5EF4-FFF2-40B4-BE49-F238E27FC236}">
-                <a16:creationId xmlns:a16="http://schemas.microsoft.com/office/drawing/2014/main" id="{755DE121-4E92-44A8-9E0D-A640847E26EF}"/>
-              </a:ext>
-            </a:extLst>
-          </p:cNvPr>
-          <p:cNvCxnSpPr>
-            <a:cxnSpLocks/>
-            <a:stCxn id="12" idx="3"/>
-          </p:cNvCxnSpPr>
-          <p:nvPr/>
-        </p:nvCxnSpPr>
-        <p:spPr>
-          <a:xfrm flipV="1">
-            <a:off x="6729955" y="4616952"/>
-            <a:ext cx="1098445" cy="564955"/>
-          </a:xfrm>
-          <a:prstGeom prst="bentConnector3">
-            <a:avLst/>
-          </a:prstGeom>
-          <a:ln w="19050">
-            <a:headEnd type="triangle" w="lg" len="med"/>
-            <a:tailEnd type="triangle" w="lg" len="med"/>
-          </a:ln>
-        </p:spPr>
-        <p:style>
-          <a:lnRef idx="1">
-            <a:schemeClr val="accent1"/>
-          </a:lnRef>
-          <a:fillRef idx="0">
-            <a:schemeClr val="accent1"/>
-          </a:fillRef>
-          <a:effectRef idx="0">
-            <a:schemeClr val="accent1"/>
-          </a:effectRef>
-          <a:fontRef idx="minor">
-            <a:schemeClr val="tx1"/>
-          </a:fontRef>
-        </p:style>
-      </p:cxnSp>
+        </p:grpSpPr>
+        <p:sp>
+          <p:nvSpPr>
+            <p:cNvPr id="5" name="직사각형 4">
+              <a:extLst>
+                <a:ext uri="{FF2B5EF4-FFF2-40B4-BE49-F238E27FC236}">
+                  <a16:creationId xmlns:a16="http://schemas.microsoft.com/office/drawing/2014/main" id="{7B6DF58F-7006-4AC7-8BC6-18B7DDAA2DD1}"/>
+                </a:ext>
+              </a:extLst>
+            </p:cNvPr>
+            <p:cNvSpPr/>
+            <p:nvPr/>
+          </p:nvSpPr>
+          <p:spPr>
+            <a:xfrm>
+              <a:off x="999859" y="1469877"/>
+              <a:ext cx="7839342" cy="5022998"/>
+            </a:xfrm>
+            <a:prstGeom prst="rect">
+              <a:avLst/>
+            </a:prstGeom>
+            <a:solidFill>
+              <a:srgbClr val="73ED93">
+                <a:alpha val="35686"/>
+              </a:srgbClr>
+            </a:solidFill>
+            <a:ln>
+              <a:solidFill>
+                <a:schemeClr val="accent6">
+                  <a:lumMod val="50000"/>
+                </a:schemeClr>
+              </a:solidFill>
+            </a:ln>
+            <a:effectLst>
+              <a:outerShdw blurRad="50800" dist="50800" dir="2700000" algn="ctr" rotWithShape="0">
+                <a:schemeClr val="tx1">
+                  <a:lumMod val="85000"/>
+                  <a:lumOff val="15000"/>
+                  <a:alpha val="56000"/>
+                </a:schemeClr>
+              </a:outerShdw>
+            </a:effectLst>
+          </p:spPr>
+          <p:style>
+            <a:lnRef idx="2">
+              <a:schemeClr val="accent1">
+                <a:shade val="50000"/>
+              </a:schemeClr>
+            </a:lnRef>
+            <a:fillRef idx="1">
+              <a:schemeClr val="accent1"/>
+            </a:fillRef>
+            <a:effectRef idx="0">
+              <a:schemeClr val="accent1"/>
+            </a:effectRef>
+            <a:fontRef idx="minor">
+              <a:schemeClr val="lt1"/>
+            </a:fontRef>
+          </p:style>
+          <p:txBody>
+            <a:bodyPr lIns="360000" tIns="360000" rtlCol="0" anchor="t" anchorCtr="0"/>
+            <a:lstStyle/>
+            <a:p>
+              <a:r>
+                <a:rPr lang="en-US" altLang="ko-KR" dirty="0">
+                  <a:solidFill>
+                    <a:schemeClr val="tx1"/>
+                  </a:solidFill>
+                </a:rPr>
+                <a:t>Window</a:t>
+              </a:r>
+              <a:endParaRPr lang="ko-KR" altLang="en-US" dirty="0">
+                <a:solidFill>
+                  <a:schemeClr val="tx1"/>
+                </a:solidFill>
+              </a:endParaRPr>
+            </a:p>
+          </p:txBody>
+        </p:sp>
+        <p:sp>
+          <p:nvSpPr>
+            <p:cNvPr id="6" name="직사각형 5">
+              <a:extLst>
+                <a:ext uri="{FF2B5EF4-FFF2-40B4-BE49-F238E27FC236}">
+                  <a16:creationId xmlns:a16="http://schemas.microsoft.com/office/drawing/2014/main" id="{15404CDC-4BBD-4DCD-907C-3726DF4D7A58}"/>
+                </a:ext>
+              </a:extLst>
+            </p:cNvPr>
+            <p:cNvSpPr/>
+            <p:nvPr/>
+          </p:nvSpPr>
+          <p:spPr>
+            <a:xfrm>
+              <a:off x="1352846" y="2522368"/>
+              <a:ext cx="2340000" cy="720000"/>
+            </a:xfrm>
+            <a:prstGeom prst="rect">
+              <a:avLst/>
+            </a:prstGeom>
+            <a:solidFill>
+              <a:srgbClr val="73ED93">
+                <a:alpha val="35686"/>
+              </a:srgbClr>
+            </a:solidFill>
+            <a:ln>
+              <a:solidFill>
+                <a:schemeClr val="accent6">
+                  <a:lumMod val="50000"/>
+                </a:schemeClr>
+              </a:solidFill>
+            </a:ln>
+            <a:effectLst>
+              <a:outerShdw blurRad="50800" dist="50800" dir="2700000" algn="ctr" rotWithShape="0">
+                <a:schemeClr val="tx1">
+                  <a:lumMod val="85000"/>
+                  <a:lumOff val="15000"/>
+                  <a:alpha val="56000"/>
+                </a:schemeClr>
+              </a:outerShdw>
+            </a:effectLst>
+          </p:spPr>
+          <p:style>
+            <a:lnRef idx="2">
+              <a:schemeClr val="accent1">
+                <a:shade val="50000"/>
+              </a:schemeClr>
+            </a:lnRef>
+            <a:fillRef idx="1">
+              <a:schemeClr val="accent1"/>
+            </a:fillRef>
+            <a:effectRef idx="0">
+              <a:schemeClr val="accent1"/>
+            </a:effectRef>
+            <a:fontRef idx="minor">
+              <a:schemeClr val="lt1"/>
+            </a:fontRef>
+          </p:style>
+          <p:txBody>
+            <a:bodyPr rtlCol="0" anchor="ctr" anchorCtr="0"/>
+            <a:lstStyle/>
+            <a:p>
+              <a:pPr algn="ctr"/>
+              <a:r>
+                <a:rPr lang="en-US" altLang="ko-KR" dirty="0" err="1">
+                  <a:solidFill>
+                    <a:schemeClr val="tx1"/>
+                  </a:solidFill>
+                </a:rPr>
+                <a:t>LevelMeter</a:t>
+              </a:r>
+              <a:endParaRPr lang="en-US" altLang="ko-KR" dirty="0">
+                <a:solidFill>
+                  <a:schemeClr val="tx1"/>
+                </a:solidFill>
+              </a:endParaRPr>
+            </a:p>
+          </p:txBody>
+        </p:sp>
+        <p:sp>
+          <p:nvSpPr>
+            <p:cNvPr id="7" name="직사각형 6">
+              <a:extLst>
+                <a:ext uri="{FF2B5EF4-FFF2-40B4-BE49-F238E27FC236}">
+                  <a16:creationId xmlns:a16="http://schemas.microsoft.com/office/drawing/2014/main" id="{C0EC3C80-6A31-436D-B554-D18497EFB793}"/>
+                </a:ext>
+              </a:extLst>
+            </p:cNvPr>
+            <p:cNvSpPr/>
+            <p:nvPr/>
+          </p:nvSpPr>
+          <p:spPr>
+            <a:xfrm>
+              <a:off x="4561032" y="2088368"/>
+              <a:ext cx="2168923" cy="1001712"/>
+            </a:xfrm>
+            <a:prstGeom prst="rect">
+              <a:avLst/>
+            </a:prstGeom>
+            <a:solidFill>
+              <a:srgbClr val="73ED93">
+                <a:alpha val="35686"/>
+              </a:srgbClr>
+            </a:solidFill>
+            <a:ln>
+              <a:solidFill>
+                <a:schemeClr val="accent6">
+                  <a:lumMod val="50000"/>
+                </a:schemeClr>
+              </a:solidFill>
+            </a:ln>
+            <a:effectLst>
+              <a:outerShdw blurRad="50800" dist="50800" dir="2700000" algn="ctr" rotWithShape="0">
+                <a:schemeClr val="tx1">
+                  <a:lumMod val="85000"/>
+                  <a:lumOff val="15000"/>
+                  <a:alpha val="56000"/>
+                </a:schemeClr>
+              </a:outerShdw>
+            </a:effectLst>
+          </p:spPr>
+          <p:style>
+            <a:lnRef idx="2">
+              <a:schemeClr val="accent1">
+                <a:shade val="50000"/>
+              </a:schemeClr>
+            </a:lnRef>
+            <a:fillRef idx="1">
+              <a:schemeClr val="accent1"/>
+            </a:fillRef>
+            <a:effectRef idx="0">
+              <a:schemeClr val="accent1"/>
+            </a:effectRef>
+            <a:fontRef idx="minor">
+              <a:schemeClr val="lt1"/>
+            </a:fontRef>
+          </p:style>
+          <p:txBody>
+            <a:bodyPr rtlCol="0" anchor="ctr" anchorCtr="0"/>
+            <a:lstStyle/>
+            <a:p>
+              <a:pPr algn="ctr"/>
+              <a:r>
+                <a:rPr lang="en-US" altLang="ko-KR" dirty="0">
+                  <a:solidFill>
+                    <a:schemeClr val="tx1"/>
+                  </a:solidFill>
+                </a:rPr>
+                <a:t>Title Pane</a:t>
+              </a:r>
+            </a:p>
+          </p:txBody>
+        </p:sp>
+        <p:sp>
+          <p:nvSpPr>
+            <p:cNvPr id="8" name="직사각형 7">
+              <a:extLst>
+                <a:ext uri="{FF2B5EF4-FFF2-40B4-BE49-F238E27FC236}">
+                  <a16:creationId xmlns:a16="http://schemas.microsoft.com/office/drawing/2014/main" id="{66A09CDC-8683-4B4A-803C-BCBD67B6D963}"/>
+                </a:ext>
+              </a:extLst>
+            </p:cNvPr>
+            <p:cNvSpPr/>
+            <p:nvPr/>
+          </p:nvSpPr>
+          <p:spPr>
+            <a:xfrm>
+              <a:off x="7802880" y="1822365"/>
+              <a:ext cx="707167" cy="4435792"/>
+            </a:xfrm>
+            <a:prstGeom prst="rect">
+              <a:avLst/>
+            </a:prstGeom>
+            <a:solidFill>
+              <a:srgbClr val="73ED93">
+                <a:alpha val="35686"/>
+              </a:srgbClr>
+            </a:solidFill>
+            <a:ln>
+              <a:solidFill>
+                <a:schemeClr val="accent6">
+                  <a:lumMod val="50000"/>
+                </a:schemeClr>
+              </a:solidFill>
+            </a:ln>
+            <a:effectLst>
+              <a:outerShdw blurRad="50800" dist="50800" dir="2700000" algn="ctr" rotWithShape="0">
+                <a:schemeClr val="tx1">
+                  <a:lumMod val="85000"/>
+                  <a:lumOff val="15000"/>
+                  <a:alpha val="56000"/>
+                </a:schemeClr>
+              </a:outerShdw>
+            </a:effectLst>
+          </p:spPr>
+          <p:style>
+            <a:lnRef idx="2">
+              <a:schemeClr val="accent1">
+                <a:shade val="50000"/>
+              </a:schemeClr>
+            </a:lnRef>
+            <a:fillRef idx="1">
+              <a:schemeClr val="accent1"/>
+            </a:fillRef>
+            <a:effectRef idx="0">
+              <a:schemeClr val="accent1"/>
+            </a:effectRef>
+            <a:fontRef idx="minor">
+              <a:schemeClr val="lt1"/>
+            </a:fontRef>
+          </p:style>
+          <p:txBody>
+            <a:bodyPr vert="eaVert" rtlCol="0" anchor="ctr" anchorCtr="0"/>
+            <a:lstStyle/>
+            <a:p>
+              <a:pPr algn="ctr"/>
+              <a:r>
+                <a:rPr lang="en-US" altLang="ko-KR" dirty="0">
+                  <a:solidFill>
+                    <a:schemeClr val="tx1"/>
+                  </a:solidFill>
+                </a:rPr>
+                <a:t>Save Manager</a:t>
+              </a:r>
+            </a:p>
+          </p:txBody>
+        </p:sp>
+        <p:sp>
+          <p:nvSpPr>
+            <p:cNvPr id="9" name="직사각형 8">
+              <a:extLst>
+                <a:ext uri="{FF2B5EF4-FFF2-40B4-BE49-F238E27FC236}">
+                  <a16:creationId xmlns:a16="http://schemas.microsoft.com/office/drawing/2014/main" id="{613A8E4D-FC34-4714-A2CF-07DA4FF88A49}"/>
+                </a:ext>
+              </a:extLst>
+            </p:cNvPr>
+            <p:cNvSpPr/>
+            <p:nvPr/>
+          </p:nvSpPr>
+          <p:spPr>
+            <a:xfrm>
+              <a:off x="9982200" y="1822365"/>
+              <a:ext cx="1731805" cy="4435792"/>
+            </a:xfrm>
+            <a:prstGeom prst="rect">
+              <a:avLst/>
+            </a:prstGeom>
+            <a:solidFill>
+              <a:srgbClr val="73ED93">
+                <a:alpha val="35686"/>
+              </a:srgbClr>
+            </a:solidFill>
+            <a:ln>
+              <a:solidFill>
+                <a:schemeClr val="accent6">
+                  <a:lumMod val="50000"/>
+                </a:schemeClr>
+              </a:solidFill>
+            </a:ln>
+            <a:effectLst>
+              <a:outerShdw blurRad="50800" dist="50800" dir="2700000" algn="ctr" rotWithShape="0">
+                <a:schemeClr val="tx1">
+                  <a:lumMod val="85000"/>
+                  <a:lumOff val="15000"/>
+                  <a:alpha val="56000"/>
+                </a:schemeClr>
+              </a:outerShdw>
+            </a:effectLst>
+          </p:spPr>
+          <p:style>
+            <a:lnRef idx="2">
+              <a:schemeClr val="accent1">
+                <a:shade val="50000"/>
+              </a:schemeClr>
+            </a:lnRef>
+            <a:fillRef idx="1">
+              <a:schemeClr val="accent1"/>
+            </a:fillRef>
+            <a:effectRef idx="0">
+              <a:schemeClr val="accent1"/>
+            </a:effectRef>
+            <a:fontRef idx="minor">
+              <a:schemeClr val="lt1"/>
+            </a:fontRef>
+          </p:style>
+          <p:txBody>
+            <a:bodyPr vert="eaVert" rtlCol="0" anchor="ctr" anchorCtr="0"/>
+            <a:lstStyle/>
+            <a:p>
+              <a:pPr algn="ctr"/>
+              <a:r>
+                <a:rPr lang="en-US" altLang="ko-KR" dirty="0">
+                  <a:solidFill>
+                    <a:schemeClr val="tx1"/>
+                  </a:solidFill>
+                </a:rPr>
+                <a:t>External</a:t>
+              </a:r>
+              <a:r>
+                <a:rPr lang="ko-KR" altLang="en-US" dirty="0">
+                  <a:solidFill>
+                    <a:schemeClr val="tx1"/>
+                  </a:solidFill>
+                </a:rPr>
+                <a:t> </a:t>
+              </a:r>
+              <a:r>
+                <a:rPr lang="en-US" altLang="ko-KR" dirty="0">
+                  <a:solidFill>
+                    <a:schemeClr val="tx1"/>
+                  </a:solidFill>
+                </a:rPr>
+                <a:t>File System</a:t>
+              </a:r>
+            </a:p>
+          </p:txBody>
+        </p:sp>
+        <p:sp>
+          <p:nvSpPr>
+            <p:cNvPr id="10" name="직사각형 9">
+              <a:extLst>
+                <a:ext uri="{FF2B5EF4-FFF2-40B4-BE49-F238E27FC236}">
+                  <a16:creationId xmlns:a16="http://schemas.microsoft.com/office/drawing/2014/main" id="{C7A4BB39-766A-4EDE-886E-1460BE09200C}"/>
+                </a:ext>
+              </a:extLst>
+            </p:cNvPr>
+            <p:cNvSpPr/>
+            <p:nvPr/>
+          </p:nvSpPr>
+          <p:spPr>
+            <a:xfrm>
+              <a:off x="1352846" y="4520320"/>
+              <a:ext cx="2340000" cy="720000"/>
+            </a:xfrm>
+            <a:prstGeom prst="rect">
+              <a:avLst/>
+            </a:prstGeom>
+            <a:solidFill>
+              <a:srgbClr val="73ED93">
+                <a:alpha val="35686"/>
+              </a:srgbClr>
+            </a:solidFill>
+            <a:ln>
+              <a:solidFill>
+                <a:schemeClr val="accent6">
+                  <a:lumMod val="50000"/>
+                </a:schemeClr>
+              </a:solidFill>
+            </a:ln>
+            <a:effectLst>
+              <a:outerShdw blurRad="50800" dist="50800" dir="2700000" algn="ctr" rotWithShape="0">
+                <a:schemeClr val="tx1">
+                  <a:lumMod val="85000"/>
+                  <a:lumOff val="15000"/>
+                  <a:alpha val="56000"/>
+                </a:schemeClr>
+              </a:outerShdw>
+            </a:effectLst>
+          </p:spPr>
+          <p:style>
+            <a:lnRef idx="2">
+              <a:schemeClr val="accent1">
+                <a:shade val="50000"/>
+              </a:schemeClr>
+            </a:lnRef>
+            <a:fillRef idx="1">
+              <a:schemeClr val="accent1"/>
+            </a:fillRef>
+            <a:effectRef idx="0">
+              <a:schemeClr val="accent1"/>
+            </a:effectRef>
+            <a:fontRef idx="minor">
+              <a:schemeClr val="lt1"/>
+            </a:fontRef>
+          </p:style>
+          <p:txBody>
+            <a:bodyPr rtlCol="0" anchor="ctr" anchorCtr="0"/>
+            <a:lstStyle/>
+            <a:p>
+              <a:pPr algn="ctr"/>
+              <a:r>
+                <a:rPr lang="en-US" altLang="ko-KR" dirty="0" err="1">
+                  <a:solidFill>
+                    <a:schemeClr val="tx1"/>
+                  </a:solidFill>
+                </a:rPr>
+                <a:t>SoundHandler</a:t>
+              </a:r>
+              <a:endParaRPr lang="en-US" altLang="ko-KR" dirty="0">
+                <a:solidFill>
+                  <a:schemeClr val="tx1"/>
+                </a:solidFill>
+              </a:endParaRPr>
+            </a:p>
+          </p:txBody>
+        </p:sp>
+        <p:sp>
+          <p:nvSpPr>
+            <p:cNvPr id="11" name="직사각형 10">
+              <a:extLst>
+                <a:ext uri="{FF2B5EF4-FFF2-40B4-BE49-F238E27FC236}">
+                  <a16:creationId xmlns:a16="http://schemas.microsoft.com/office/drawing/2014/main" id="{3E85935A-6949-46A0-8B71-0640A83B46D3}"/>
+                </a:ext>
+              </a:extLst>
+            </p:cNvPr>
+            <p:cNvSpPr/>
+            <p:nvPr/>
+          </p:nvSpPr>
+          <p:spPr>
+            <a:xfrm>
+              <a:off x="4561032" y="3370083"/>
+              <a:ext cx="2168923" cy="1001712"/>
+            </a:xfrm>
+            <a:prstGeom prst="rect">
+              <a:avLst/>
+            </a:prstGeom>
+            <a:solidFill>
+              <a:srgbClr val="73ED93">
+                <a:alpha val="35686"/>
+              </a:srgbClr>
+            </a:solidFill>
+            <a:ln>
+              <a:solidFill>
+                <a:schemeClr val="accent6">
+                  <a:lumMod val="50000"/>
+                </a:schemeClr>
+              </a:solidFill>
+            </a:ln>
+            <a:effectLst>
+              <a:outerShdw blurRad="50800" dist="50800" dir="2700000" algn="ctr" rotWithShape="0">
+                <a:schemeClr val="tx1">
+                  <a:lumMod val="85000"/>
+                  <a:lumOff val="15000"/>
+                  <a:alpha val="56000"/>
+                </a:schemeClr>
+              </a:outerShdw>
+            </a:effectLst>
+          </p:spPr>
+          <p:style>
+            <a:lnRef idx="2">
+              <a:schemeClr val="accent1">
+                <a:shade val="50000"/>
+              </a:schemeClr>
+            </a:lnRef>
+            <a:fillRef idx="1">
+              <a:schemeClr val="accent1"/>
+            </a:fillRef>
+            <a:effectRef idx="0">
+              <a:schemeClr val="accent1"/>
+            </a:effectRef>
+            <a:fontRef idx="minor">
+              <a:schemeClr val="lt1"/>
+            </a:fontRef>
+          </p:style>
+          <p:txBody>
+            <a:bodyPr rtlCol="0" anchor="ctr" anchorCtr="0"/>
+            <a:lstStyle/>
+            <a:p>
+              <a:pPr algn="ctr"/>
+              <a:r>
+                <a:rPr lang="en-US" altLang="ko-KR" dirty="0">
+                  <a:solidFill>
+                    <a:schemeClr val="tx1"/>
+                  </a:solidFill>
+                </a:rPr>
+                <a:t>Game Pane</a:t>
+              </a:r>
+            </a:p>
+          </p:txBody>
+        </p:sp>
+        <p:sp>
+          <p:nvSpPr>
+            <p:cNvPr id="12" name="직사각형 11">
+              <a:extLst>
+                <a:ext uri="{FF2B5EF4-FFF2-40B4-BE49-F238E27FC236}">
+                  <a16:creationId xmlns:a16="http://schemas.microsoft.com/office/drawing/2014/main" id="{05104E5A-A462-4AE3-9D26-C01F247341EC}"/>
+                </a:ext>
+              </a:extLst>
+            </p:cNvPr>
+            <p:cNvSpPr/>
+            <p:nvPr/>
+          </p:nvSpPr>
+          <p:spPr>
+            <a:xfrm>
+              <a:off x="4561032" y="4681051"/>
+              <a:ext cx="2168923" cy="1001712"/>
+            </a:xfrm>
+            <a:prstGeom prst="rect">
+              <a:avLst/>
+            </a:prstGeom>
+            <a:solidFill>
+              <a:srgbClr val="73ED93">
+                <a:alpha val="35686"/>
+              </a:srgbClr>
+            </a:solidFill>
+            <a:ln>
+              <a:solidFill>
+                <a:schemeClr val="accent6">
+                  <a:lumMod val="50000"/>
+                </a:schemeClr>
+              </a:solidFill>
+            </a:ln>
+            <a:effectLst>
+              <a:outerShdw blurRad="50800" dist="50800" dir="2700000" algn="ctr" rotWithShape="0">
+                <a:schemeClr val="tx1">
+                  <a:lumMod val="85000"/>
+                  <a:lumOff val="15000"/>
+                  <a:alpha val="56000"/>
+                </a:schemeClr>
+              </a:outerShdw>
+            </a:effectLst>
+          </p:spPr>
+          <p:style>
+            <a:lnRef idx="2">
+              <a:schemeClr val="accent1">
+                <a:shade val="50000"/>
+              </a:schemeClr>
+            </a:lnRef>
+            <a:fillRef idx="1">
+              <a:schemeClr val="accent1"/>
+            </a:fillRef>
+            <a:effectRef idx="0">
+              <a:schemeClr val="accent1"/>
+            </a:effectRef>
+            <a:fontRef idx="minor">
+              <a:schemeClr val="lt1"/>
+            </a:fontRef>
+          </p:style>
+          <p:txBody>
+            <a:bodyPr rtlCol="0" anchor="ctr" anchorCtr="0"/>
+            <a:lstStyle/>
+            <a:p>
+              <a:pPr algn="ctr"/>
+              <a:r>
+                <a:rPr lang="en-US" altLang="ko-KR" dirty="0">
+                  <a:solidFill>
+                    <a:schemeClr val="tx1"/>
+                  </a:solidFill>
+                </a:rPr>
+                <a:t>Upgrade Pane</a:t>
+              </a:r>
+            </a:p>
+          </p:txBody>
+        </p:sp>
+        <p:cxnSp>
+          <p:nvCxnSpPr>
+            <p:cNvPr id="24" name="연결선: 꺾임 23">
+              <a:extLst>
+                <a:ext uri="{FF2B5EF4-FFF2-40B4-BE49-F238E27FC236}">
+                  <a16:creationId xmlns:a16="http://schemas.microsoft.com/office/drawing/2014/main" id="{07438148-4A02-4F61-8315-8DB90685CDF8}"/>
+                </a:ext>
+              </a:extLst>
+            </p:cNvPr>
+            <p:cNvCxnSpPr>
+              <a:cxnSpLocks/>
+              <a:stCxn id="6" idx="2"/>
+              <a:endCxn id="10" idx="0"/>
+            </p:cNvCxnSpPr>
+            <p:nvPr/>
+          </p:nvCxnSpPr>
+          <p:spPr>
+            <a:xfrm rot="5400000">
+              <a:off x="1883870" y="3881344"/>
+              <a:ext cx="1277952" cy="12700"/>
+            </a:xfrm>
+            <a:prstGeom prst="bentConnector3">
+              <a:avLst>
+                <a:gd name="adj1" fmla="val 709"/>
+              </a:avLst>
+            </a:prstGeom>
+            <a:ln w="19050">
+              <a:solidFill>
+                <a:schemeClr val="accent6">
+                  <a:lumMod val="50000"/>
+                </a:schemeClr>
+              </a:solidFill>
+              <a:tailEnd type="triangle" w="lg" len="med"/>
+            </a:ln>
+          </p:spPr>
+          <p:style>
+            <a:lnRef idx="1">
+              <a:schemeClr val="accent1"/>
+            </a:lnRef>
+            <a:fillRef idx="0">
+              <a:schemeClr val="accent1"/>
+            </a:fillRef>
+            <a:effectRef idx="0">
+              <a:schemeClr val="accent1"/>
+            </a:effectRef>
+            <a:fontRef idx="minor">
+              <a:schemeClr val="tx1"/>
+            </a:fontRef>
+          </p:style>
+        </p:cxnSp>
+        <p:cxnSp>
+          <p:nvCxnSpPr>
+            <p:cNvPr id="29" name="연결선: 꺾임 28">
+              <a:extLst>
+                <a:ext uri="{FF2B5EF4-FFF2-40B4-BE49-F238E27FC236}">
+                  <a16:creationId xmlns:a16="http://schemas.microsoft.com/office/drawing/2014/main" id="{79B05AE2-1980-4487-A939-B5EC3FDC18FA}"/>
+                </a:ext>
+              </a:extLst>
+            </p:cNvPr>
+            <p:cNvCxnSpPr>
+              <a:cxnSpLocks/>
+              <a:stCxn id="10" idx="3"/>
+              <a:endCxn id="11" idx="1"/>
+            </p:cNvCxnSpPr>
+            <p:nvPr/>
+          </p:nvCxnSpPr>
+          <p:spPr>
+            <a:xfrm flipV="1">
+              <a:off x="3692846" y="3870939"/>
+              <a:ext cx="868186" cy="1009381"/>
+            </a:xfrm>
+            <a:prstGeom prst="bentConnector3">
+              <a:avLst/>
+            </a:prstGeom>
+            <a:ln w="19050">
+              <a:solidFill>
+                <a:schemeClr val="accent6">
+                  <a:lumMod val="50000"/>
+                </a:schemeClr>
+              </a:solidFill>
+              <a:tailEnd type="triangle" w="lg" len="med"/>
+            </a:ln>
+          </p:spPr>
+          <p:style>
+            <a:lnRef idx="1">
+              <a:schemeClr val="accent1"/>
+            </a:lnRef>
+            <a:fillRef idx="0">
+              <a:schemeClr val="accent1"/>
+            </a:fillRef>
+            <a:effectRef idx="0">
+              <a:schemeClr val="accent1"/>
+            </a:effectRef>
+            <a:fontRef idx="minor">
+              <a:schemeClr val="tx1"/>
+            </a:fontRef>
+          </p:style>
+        </p:cxnSp>
+        <p:cxnSp>
+          <p:nvCxnSpPr>
+            <p:cNvPr id="33" name="연결선: 꺾임 32">
+              <a:extLst>
+                <a:ext uri="{FF2B5EF4-FFF2-40B4-BE49-F238E27FC236}">
+                  <a16:creationId xmlns:a16="http://schemas.microsoft.com/office/drawing/2014/main" id="{7EA173C4-4C8E-4E26-AA70-DE8F73E36EDB}"/>
+                </a:ext>
+              </a:extLst>
+            </p:cNvPr>
+            <p:cNvCxnSpPr>
+              <a:cxnSpLocks/>
+              <a:stCxn id="11" idx="3"/>
+              <a:endCxn id="8" idx="1"/>
+            </p:cNvCxnSpPr>
+            <p:nvPr/>
+          </p:nvCxnSpPr>
+          <p:spPr>
+            <a:xfrm>
+              <a:off x="6729955" y="3870939"/>
+              <a:ext cx="1072925" cy="169322"/>
+            </a:xfrm>
+            <a:prstGeom prst="bentConnector3">
+              <a:avLst/>
+            </a:prstGeom>
+            <a:ln w="19050">
+              <a:solidFill>
+                <a:schemeClr val="accent6">
+                  <a:lumMod val="50000"/>
+                </a:schemeClr>
+              </a:solidFill>
+              <a:tailEnd type="triangle" w="lg" len="med"/>
+            </a:ln>
+          </p:spPr>
+          <p:style>
+            <a:lnRef idx="1">
+              <a:schemeClr val="accent1"/>
+            </a:lnRef>
+            <a:fillRef idx="0">
+              <a:schemeClr val="accent1"/>
+            </a:fillRef>
+            <a:effectRef idx="0">
+              <a:schemeClr val="accent1"/>
+            </a:effectRef>
+            <a:fontRef idx="minor">
+              <a:schemeClr val="tx1"/>
+            </a:fontRef>
+          </p:style>
+        </p:cxnSp>
+        <p:cxnSp>
+          <p:nvCxnSpPr>
+            <p:cNvPr id="36" name="연결선: 꺾임 35">
+              <a:extLst>
+                <a:ext uri="{FF2B5EF4-FFF2-40B4-BE49-F238E27FC236}">
+                  <a16:creationId xmlns:a16="http://schemas.microsoft.com/office/drawing/2014/main" id="{8568A19B-9260-45CB-94D0-648001584A13}"/>
+                </a:ext>
+              </a:extLst>
+            </p:cNvPr>
+            <p:cNvCxnSpPr>
+              <a:cxnSpLocks/>
+              <a:stCxn id="8" idx="3"/>
+              <a:endCxn id="9" idx="1"/>
+            </p:cNvCxnSpPr>
+            <p:nvPr/>
+          </p:nvCxnSpPr>
+          <p:spPr>
+            <a:xfrm>
+              <a:off x="8510047" y="4040261"/>
+              <a:ext cx="1472153" cy="12700"/>
+            </a:xfrm>
+            <a:prstGeom prst="bentConnector3">
+              <a:avLst>
+                <a:gd name="adj1" fmla="val 96930"/>
+              </a:avLst>
+            </a:prstGeom>
+            <a:ln w="19050">
+              <a:solidFill>
+                <a:schemeClr val="accent6">
+                  <a:lumMod val="50000"/>
+                </a:schemeClr>
+              </a:solidFill>
+              <a:headEnd type="triangle" w="lg" len="med"/>
+              <a:tailEnd type="triangle" w="lg" len="med"/>
+            </a:ln>
+          </p:spPr>
+          <p:style>
+            <a:lnRef idx="1">
+              <a:schemeClr val="accent1"/>
+            </a:lnRef>
+            <a:fillRef idx="0">
+              <a:schemeClr val="accent1"/>
+            </a:fillRef>
+            <a:effectRef idx="0">
+              <a:schemeClr val="accent1"/>
+            </a:effectRef>
+            <a:fontRef idx="minor">
+              <a:schemeClr val="tx1"/>
+            </a:fontRef>
+          </p:style>
+        </p:cxnSp>
+        <p:cxnSp>
+          <p:nvCxnSpPr>
+            <p:cNvPr id="37" name="연결선: 꺾임 36">
+              <a:extLst>
+                <a:ext uri="{FF2B5EF4-FFF2-40B4-BE49-F238E27FC236}">
+                  <a16:creationId xmlns:a16="http://schemas.microsoft.com/office/drawing/2014/main" id="{755DE121-4E92-44A8-9E0D-A640847E26EF}"/>
+                </a:ext>
+              </a:extLst>
+            </p:cNvPr>
+            <p:cNvCxnSpPr>
+              <a:cxnSpLocks/>
+              <a:stCxn id="12" idx="3"/>
+            </p:cNvCxnSpPr>
+            <p:nvPr/>
+          </p:nvCxnSpPr>
+          <p:spPr>
+            <a:xfrm flipV="1">
+              <a:off x="6729955" y="4616952"/>
+              <a:ext cx="1098445" cy="564955"/>
+            </a:xfrm>
+            <a:prstGeom prst="bentConnector3">
+              <a:avLst/>
+            </a:prstGeom>
+            <a:ln w="19050">
+              <a:solidFill>
+                <a:schemeClr val="accent6">
+                  <a:lumMod val="50000"/>
+                </a:schemeClr>
+              </a:solidFill>
+              <a:headEnd type="triangle" w="lg" len="med"/>
+              <a:tailEnd type="triangle" w="lg" len="med"/>
+            </a:ln>
+          </p:spPr>
+          <p:style>
+            <a:lnRef idx="1">
+              <a:schemeClr val="accent1"/>
+            </a:lnRef>
+            <a:fillRef idx="0">
+              <a:schemeClr val="accent1"/>
+            </a:fillRef>
+            <a:effectRef idx="0">
+              <a:schemeClr val="accent1"/>
+            </a:effectRef>
+            <a:fontRef idx="minor">
+              <a:schemeClr val="tx1"/>
+            </a:fontRef>
+          </p:style>
+        </p:cxnSp>
+      </p:grpSp>
     </p:spTree>
     <p:extLst>
       <p:ext uri="{BB962C8B-B14F-4D97-AF65-F5344CB8AC3E}">
@@ -4722,6 +3743,224 @@
   <p:clrMapOvr>
     <a:masterClrMapping/>
   </p:clrMapOvr>
+  <mc:AlternateContent xmlns:mc="http://schemas.openxmlformats.org/markup-compatibility/2006">
+    <mc:Choice xmlns:p159="http://schemas.microsoft.com/office/powerpoint/2015/09/main" Requires="p159">
+      <p:transition>
+        <p159:morph option="byObject"/>
+      </p:transition>
+    </mc:Choice>
+    <mc:Fallback>
+      <p:transition>
+        <p:fade/>
+      </p:transition>
+    </mc:Fallback>
+  </mc:AlternateContent>
+  <p:timing>
+    <p:tnLst>
+      <p:par>
+        <p:cTn id="1" dur="indefinite" restart="never" nodeType="tmRoot">
+          <p:childTnLst>
+            <p:seq concurrent="1" nextAc="seek">
+              <p:cTn id="2" dur="indefinite" nodeType="mainSeq">
+                <p:childTnLst>
+                  <p:par>
+                    <p:cTn id="3" fill="hold">
+                      <p:stCondLst>
+                        <p:cond delay="indefinite"/>
+                        <p:cond evt="onBegin" delay="0">
+                          <p:tn val="2"/>
+                        </p:cond>
+                      </p:stCondLst>
+                      <p:childTnLst>
+                        <p:par>
+                          <p:cTn id="4" fill="hold">
+                            <p:stCondLst>
+                              <p:cond delay="0"/>
+                            </p:stCondLst>
+                            <p:childTnLst>
+                              <p:par>
+                                <p:cTn id="5" presetID="12" presetClass="entr" presetSubtype="2" fill="hold" grpId="0" nodeType="withEffect">
+                                  <p:stCondLst>
+                                    <p:cond delay="0"/>
+                                  </p:stCondLst>
+                                  <p:childTnLst>
+                                    <p:set>
+                                      <p:cBhvr>
+                                        <p:cTn id="6" dur="1" fill="hold">
+                                          <p:stCondLst>
+                                            <p:cond delay="0"/>
+                                          </p:stCondLst>
+                                        </p:cTn>
+                                        <p:tgtEl>
+                                          <p:spTgt spid="14"/>
+                                        </p:tgtEl>
+                                        <p:attrNameLst>
+                                          <p:attrName>style.visibility</p:attrName>
+                                        </p:attrNameLst>
+                                      </p:cBhvr>
+                                      <p:to>
+                                        <p:strVal val="visible"/>
+                                      </p:to>
+                                    </p:set>
+                                    <p:anim calcmode="lin" valueType="num">
+                                      <p:cBhvr additive="base">
+                                        <p:cTn id="7" dur="500"/>
+                                        <p:tgtEl>
+                                          <p:spTgt spid="14"/>
+                                        </p:tgtEl>
+                                        <p:attrNameLst>
+                                          <p:attrName>ppt_x</p:attrName>
+                                        </p:attrNameLst>
+                                      </p:cBhvr>
+                                      <p:tavLst>
+                                        <p:tav tm="0">
+                                          <p:val>
+                                            <p:strVal val="#ppt_x+#ppt_w*1.125000"/>
+                                          </p:val>
+                                        </p:tav>
+                                        <p:tav tm="100000">
+                                          <p:val>
+                                            <p:strVal val="#ppt_x"/>
+                                          </p:val>
+                                        </p:tav>
+                                      </p:tavLst>
+                                    </p:anim>
+                                    <p:animEffect transition="in" filter="wipe(left)">
+                                      <p:cBhvr>
+                                        <p:cTn id="8" dur="500"/>
+                                        <p:tgtEl>
+                                          <p:spTgt spid="14"/>
+                                        </p:tgtEl>
+                                      </p:cBhvr>
+                                    </p:animEffect>
+                                  </p:childTnLst>
+                                </p:cTn>
+                              </p:par>
+                              <p:par>
+                                <p:cTn id="9" presetID="42" presetClass="path" presetSubtype="0" accel="50000" decel="50000" fill="hold" grpId="0" nodeType="withEffect">
+                                  <p:stCondLst>
+                                    <p:cond delay="0"/>
+                                  </p:stCondLst>
+                                  <p:childTnLst>
+                                    <p:animMotion origin="layout" path="M -2.08333E-6 4.81481E-6 L -0.27239 -0.00348 " pathEditMode="relative" rAng="0" ptsTypes="AA">
+                                      <p:cBhvr>
+                                        <p:cTn id="10" dur="750" fill="hold"/>
+                                        <p:tgtEl>
+                                          <p:spTgt spid="2"/>
+                                        </p:tgtEl>
+                                        <p:attrNameLst>
+                                          <p:attrName>ppt_x</p:attrName>
+                                          <p:attrName>ppt_y</p:attrName>
+                                        </p:attrNameLst>
+                                      </p:cBhvr>
+                                      <p:rCtr x="-13620" y="-185"/>
+                                    </p:animMotion>
+                                  </p:childTnLst>
+                                </p:cTn>
+                              </p:par>
+                              <p:par>
+                                <p:cTn id="11" presetID="42" presetClass="path" presetSubtype="0" accel="50000" decel="50000" fill="hold" grpId="0" nodeType="withEffect">
+                                  <p:stCondLst>
+                                    <p:cond delay="0"/>
+                                  </p:stCondLst>
+                                  <p:childTnLst>
+                                    <p:animMotion origin="layout" path="M 3.125E-6 -3.33333E-6 L -0.26472 -0.00347 " pathEditMode="relative" rAng="0" ptsTypes="AA">
+                                      <p:cBhvr>
+                                        <p:cTn id="12" dur="750" fill="hold"/>
+                                        <p:tgtEl>
+                                          <p:spTgt spid="3">
+                                            <p:txEl>
+                                              <p:pRg st="0" end="0"/>
+                                            </p:txEl>
+                                          </p:spTgt>
+                                        </p:tgtEl>
+                                        <p:attrNameLst>
+                                          <p:attrName>ppt_x</p:attrName>
+                                          <p:attrName>ppt_y</p:attrName>
+                                        </p:attrNameLst>
+                                      </p:cBhvr>
+                                      <p:rCtr x="-13242" y="-185"/>
+                                    </p:animMotion>
+                                  </p:childTnLst>
+                                </p:cTn>
+                              </p:par>
+                            </p:childTnLst>
+                          </p:cTn>
+                        </p:par>
+                        <p:par>
+                          <p:cTn id="13" fill="hold">
+                            <p:stCondLst>
+                              <p:cond delay="750"/>
+                            </p:stCondLst>
+                            <p:childTnLst>
+                              <p:par>
+                                <p:cTn id="14" presetID="10" presetClass="entr" presetSubtype="0" fill="hold" nodeType="afterEffect">
+                                  <p:stCondLst>
+                                    <p:cond delay="0"/>
+                                  </p:stCondLst>
+                                  <p:childTnLst>
+                                    <p:set>
+                                      <p:cBhvr>
+                                        <p:cTn id="15" dur="1" fill="hold">
+                                          <p:stCondLst>
+                                            <p:cond delay="0"/>
+                                          </p:stCondLst>
+                                        </p:cTn>
+                                        <p:tgtEl>
+                                          <p:spTgt spid="13"/>
+                                        </p:tgtEl>
+                                        <p:attrNameLst>
+                                          <p:attrName>style.visibility</p:attrName>
+                                        </p:attrNameLst>
+                                      </p:cBhvr>
+                                      <p:to>
+                                        <p:strVal val="visible"/>
+                                      </p:to>
+                                    </p:set>
+                                    <p:animEffect transition="in" filter="fade">
+                                      <p:cBhvr>
+                                        <p:cTn id="16" dur="500"/>
+                                        <p:tgtEl>
+                                          <p:spTgt spid="13"/>
+                                        </p:tgtEl>
+                                      </p:cBhvr>
+                                    </p:animEffect>
+                                  </p:childTnLst>
+                                </p:cTn>
+                              </p:par>
+                            </p:childTnLst>
+                          </p:cTn>
+                        </p:par>
+                      </p:childTnLst>
+                    </p:cTn>
+                  </p:par>
+                </p:childTnLst>
+              </p:cTn>
+              <p:prevCondLst>
+                <p:cond evt="onPrev" delay="0">
+                  <p:tgtEl>
+                    <p:sldTgt/>
+                  </p:tgtEl>
+                </p:cond>
+              </p:prevCondLst>
+              <p:nextCondLst>
+                <p:cond evt="onNext" delay="0">
+                  <p:tgtEl>
+                    <p:sldTgt/>
+                  </p:tgtEl>
+                </p:cond>
+              </p:nextCondLst>
+            </p:seq>
+          </p:childTnLst>
+        </p:cTn>
+      </p:par>
+    </p:tnLst>
+    <p:bldLst>
+      <p:bldP spid="14" grpId="0" animBg="1"/>
+      <p:bldP spid="2" grpId="0"/>
+      <p:bldP spid="3" grpId="0" build="p"/>
+    </p:bldLst>
+  </p:timing>
 </p:sld>
 </file>
 
@@ -4761,7 +4000,7 @@
         <p:spPr/>
         <p:txBody>
           <a:bodyPr>
-            <a:normAutofit fontScale="90000"/>
+            <a:normAutofit/>
           </a:bodyPr>
           <a:lstStyle/>
           <a:p>
@@ -4844,6 +4083,18 @@
   <p:clrMapOvr>
     <a:masterClrMapping/>
   </p:clrMapOvr>
+  <mc:AlternateContent xmlns:mc="http://schemas.openxmlformats.org/markup-compatibility/2006">
+    <mc:Choice xmlns:p159="http://schemas.microsoft.com/office/powerpoint/2015/09/main" Requires="p159">
+      <p:transition>
+        <p159:morph option="byObject"/>
+      </p:transition>
+    </mc:Choice>
+    <mc:Fallback>
+      <p:transition>
+        <p:fade/>
+      </p:transition>
+    </mc:Fallback>
+  </mc:AlternateContent>
 </p:sld>
 </file>
 
@@ -4956,6 +4207,18 @@
   <p:clrMapOvr>
     <a:masterClrMapping/>
   </p:clrMapOvr>
+  <mc:AlternateContent xmlns:mc="http://schemas.openxmlformats.org/markup-compatibility/2006">
+    <mc:Choice xmlns:p159="http://schemas.microsoft.com/office/powerpoint/2015/09/main" Requires="p159">
+      <p:transition>
+        <p159:morph option="byObject"/>
+      </p:transition>
+    </mc:Choice>
+    <mc:Fallback>
+      <p:transition>
+        <p:fade/>
+      </p:transition>
+    </mc:Fallback>
+  </mc:AlternateContent>
 </p:sld>
 </file>
 
@@ -4995,7 +4258,7 @@
         <p:spPr/>
         <p:txBody>
           <a:bodyPr>
-            <a:normAutofit fontScale="90000"/>
+            <a:normAutofit/>
           </a:bodyPr>
           <a:lstStyle/>
           <a:p>
@@ -5070,6 +4333,18 @@
   <p:clrMapOvr>
     <a:masterClrMapping/>
   </p:clrMapOvr>
+  <mc:AlternateContent xmlns:mc="http://schemas.openxmlformats.org/markup-compatibility/2006">
+    <mc:Choice xmlns:p159="http://schemas.microsoft.com/office/powerpoint/2015/09/main" Requires="p159">
+      <p:transition>
+        <p159:morph option="byObject"/>
+      </p:transition>
+    </mc:Choice>
+    <mc:Fallback>
+      <p:transition>
+        <p:fade/>
+      </p:transition>
+    </mc:Fallback>
+  </mc:AlternateContent>
 </p:sld>
 </file>
 
@@ -5182,6 +4457,18 @@
   <p:clrMapOvr>
     <a:masterClrMapping/>
   </p:clrMapOvr>
+  <mc:AlternateContent xmlns:mc="http://schemas.openxmlformats.org/markup-compatibility/2006">
+    <mc:Choice xmlns:p159="http://schemas.microsoft.com/office/powerpoint/2015/09/main" Requires="p159">
+      <p:transition>
+        <p159:morph option="byObject"/>
+      </p:transition>
+    </mc:Choice>
+    <mc:Fallback>
+      <p:transition>
+        <p:fade/>
+      </p:transition>
+    </mc:Fallback>
+  </mc:AlternateContent>
 </p:sld>
 </file>
 
@@ -5295,6 +4582,18 @@
   <p:clrMapOvr>
     <a:masterClrMapping/>
   </p:clrMapOvr>
+  <mc:AlternateContent xmlns:mc="http://schemas.openxmlformats.org/markup-compatibility/2006">
+    <mc:Choice xmlns:p159="http://schemas.microsoft.com/office/powerpoint/2015/09/main" Requires="p159">
+      <p:transition>
+        <p159:morph option="byObject"/>
+      </p:transition>
+    </mc:Choice>
+    <mc:Fallback>
+      <p:transition>
+        <p:fade/>
+      </p:transition>
+    </mc:Fallback>
+  </mc:AlternateContent>
 </p:sld>
 </file>
 
@@ -5407,6 +4706,18 @@
   <p:clrMapOvr>
     <a:masterClrMapping/>
   </p:clrMapOvr>
+  <mc:AlternateContent xmlns:mc="http://schemas.openxmlformats.org/markup-compatibility/2006">
+    <mc:Choice xmlns:p159="http://schemas.microsoft.com/office/powerpoint/2015/09/main" Requires="p159">
+      <p:transition>
+        <p159:morph option="byObject"/>
+      </p:transition>
+    </mc:Choice>
+    <mc:Fallback>
+      <p:transition>
+        <p:fade/>
+      </p:transition>
+    </mc:Fallback>
+  </mc:AlternateContent>
 </p:sld>
 </file>
 
@@ -5560,6 +4871,18 @@
   <p:clrMapOvr>
     <a:masterClrMapping/>
   </p:clrMapOvr>
+  <mc:AlternateContent xmlns:mc="http://schemas.openxmlformats.org/markup-compatibility/2006">
+    <mc:Choice xmlns:p159="http://schemas.microsoft.com/office/powerpoint/2015/09/main" Requires="p159">
+      <p:transition>
+        <p159:morph option="byObject"/>
+      </p:transition>
+    </mc:Choice>
+    <mc:Fallback>
+      <p:transition>
+        <p:fade/>
+      </p:transition>
+    </mc:Fallback>
+  </mc:AlternateContent>
 </p:sld>
 </file>
 
@@ -5672,6 +4995,18 @@
   <p:clrMapOvr>
     <a:masterClrMapping/>
   </p:clrMapOvr>
+  <mc:AlternateContent xmlns:mc="http://schemas.openxmlformats.org/markup-compatibility/2006">
+    <mc:Choice xmlns:p159="http://schemas.microsoft.com/office/powerpoint/2015/09/main" Requires="p159">
+      <p:transition>
+        <p159:morph option="byObject"/>
+      </p:transition>
+    </mc:Choice>
+    <mc:Fallback>
+      <p:transition>
+        <p:fade/>
+      </p:transition>
+    </mc:Fallback>
+  </mc:AlternateContent>
 </p:sld>
 </file>
 
@@ -5711,7 +5046,7 @@
         <p:spPr/>
         <p:txBody>
           <a:bodyPr>
-            <a:normAutofit fontScale="90000"/>
+            <a:normAutofit/>
           </a:bodyPr>
           <a:lstStyle/>
           <a:p>
@@ -5786,6 +5121,18 @@
   <p:clrMapOvr>
     <a:masterClrMapping/>
   </p:clrMapOvr>
+  <mc:AlternateContent xmlns:mc="http://schemas.openxmlformats.org/markup-compatibility/2006">
+    <mc:Choice xmlns:p159="http://schemas.microsoft.com/office/powerpoint/2015/09/main" Requires="p159">
+      <p:transition>
+        <p159:morph option="byObject"/>
+      </p:transition>
+    </mc:Choice>
+    <mc:Fallback>
+      <p:transition>
+        <p:fade/>
+      </p:transition>
+    </mc:Fallback>
+  </mc:AlternateContent>
 </p:sld>
 </file>
 
@@ -5898,6 +5245,18 @@
   <p:clrMapOvr>
     <a:masterClrMapping/>
   </p:clrMapOvr>
+  <mc:AlternateContent xmlns:mc="http://schemas.openxmlformats.org/markup-compatibility/2006">
+    <mc:Choice xmlns:p159="http://schemas.microsoft.com/office/powerpoint/2015/09/main" Requires="p159">
+      <p:transition>
+        <p159:morph option="byObject"/>
+      </p:transition>
+    </mc:Choice>
+    <mc:Fallback>
+      <p:transition>
+        <p:fade/>
+      </p:transition>
+    </mc:Fallback>
+  </mc:AlternateContent>
 </p:sld>
 </file>
 
@@ -5937,7 +5296,7 @@
         <p:spPr/>
         <p:txBody>
           <a:bodyPr>
-            <a:normAutofit fontScale="90000"/>
+            <a:normAutofit/>
           </a:bodyPr>
           <a:lstStyle/>
           <a:p>
@@ -6008,47 +5367,78 @@
           </a:p>
         </p:txBody>
       </p:sp>
-      <p:sp>
-        <p:nvSpPr>
-          <p:cNvPr id="5" name="직사각형 4">
-            <a:extLst>
-              <a:ext uri="{FF2B5EF4-FFF2-40B4-BE49-F238E27FC236}">
-                <a16:creationId xmlns:a16="http://schemas.microsoft.com/office/drawing/2014/main" id="{D8022088-43F3-48C8-85FA-3E254A17B535}"/>
-              </a:ext>
-            </a:extLst>
-          </p:cNvPr>
-          <p:cNvSpPr/>
+      <p:pic>
+        <p:nvPicPr>
+          <p:cNvPr id="7" name="그림 6">
+            <a:extLst>
+              <a:ext uri="{FF2B5EF4-FFF2-40B4-BE49-F238E27FC236}">
+                <a16:creationId xmlns:a16="http://schemas.microsoft.com/office/drawing/2014/main" id="{430BAE27-F3F4-4179-BAFA-2516D9F6920A}"/>
+              </a:ext>
+            </a:extLst>
+          </p:cNvPr>
+          <p:cNvPicPr>
+            <a:picLocks noChangeAspect="1"/>
+          </p:cNvPicPr>
           <p:nvPr/>
-        </p:nvSpPr>
+        </p:nvPicPr>
+        <p:blipFill>
+          <a:blip r:embed="rId2">
+            <a:extLst>
+              <a:ext uri="{28A0092B-C50C-407E-A947-70E740481C1C}">
+                <a14:useLocalDpi xmlns:a14="http://schemas.microsoft.com/office/drawing/2010/main" val="0"/>
+              </a:ext>
+            </a:extLst>
+          </a:blip>
+          <a:stretch>
+            <a:fillRect/>
+          </a:stretch>
+        </p:blipFill>
         <p:spPr>
           <a:xfrm>
-            <a:off x="903005" y="1653050"/>
-            <a:ext cx="6096000" cy="646331"/>
+            <a:off x="6096000" y="4018158"/>
+            <a:ext cx="4876800" cy="2338192"/>
           </a:xfrm>
           <a:prstGeom prst="rect">
             <a:avLst/>
           </a:prstGeom>
         </p:spPr>
-        <p:txBody>
-          <a:bodyPr>
-            <a:spAutoFit/>
-          </a:bodyPr>
-          <a:lstStyle/>
-          <a:p>
-            <a:r>
-              <a:rPr lang="ko-KR" altLang="en-US" dirty="0"/>
-              <a:t>자바</a:t>
-            </a:r>
-            <a:br>
-              <a:rPr lang="en-US" altLang="ko-KR" dirty="0"/>
-            </a:br>
-            <a:r>
-              <a:rPr lang="ko-KR" altLang="en-US" dirty="0"/>
-              <a:t>이클립스</a:t>
-            </a:r>
-          </a:p>
-        </p:txBody>
-      </p:sp>
+      </p:pic>
+      <p:pic>
+        <p:nvPicPr>
+          <p:cNvPr id="9" name="그림 8">
+            <a:extLst>
+              <a:ext uri="{FF2B5EF4-FFF2-40B4-BE49-F238E27FC236}">
+                <a16:creationId xmlns:a16="http://schemas.microsoft.com/office/drawing/2014/main" id="{CA60A2B5-FA62-4110-BD58-75053D8CF931}"/>
+              </a:ext>
+            </a:extLst>
+          </p:cNvPr>
+          <p:cNvPicPr>
+            <a:picLocks noChangeAspect="1"/>
+          </p:cNvPicPr>
+          <p:nvPr/>
+        </p:nvPicPr>
+        <p:blipFill>
+          <a:blip r:embed="rId3">
+            <a:extLst>
+              <a:ext uri="{28A0092B-C50C-407E-A947-70E740481C1C}">
+                <a14:useLocalDpi xmlns:a14="http://schemas.microsoft.com/office/drawing/2010/main" val="0"/>
+              </a:ext>
+            </a:extLst>
+          </a:blip>
+          <a:stretch>
+            <a:fillRect/>
+          </a:stretch>
+        </p:blipFill>
+        <p:spPr>
+          <a:xfrm>
+            <a:off x="3480166" y="1720325"/>
+            <a:ext cx="4055533" cy="2269071"/>
+          </a:xfrm>
+          <a:prstGeom prst="rect">
+            <a:avLst/>
+          </a:prstGeom>
+        </p:spPr>
+      </p:pic>
     </p:spTree>
     <p:extLst>
       <p:ext uri="{BB962C8B-B14F-4D97-AF65-F5344CB8AC3E}">
@@ -6059,6 +5449,18 @@
   <p:clrMapOvr>
     <a:masterClrMapping/>
   </p:clrMapOvr>
+  <mc:AlternateContent xmlns:mc="http://schemas.openxmlformats.org/markup-compatibility/2006">
+    <mc:Choice xmlns:p159="http://schemas.microsoft.com/office/powerpoint/2015/09/main" Requires="p159">
+      <p:transition>
+        <p159:morph option="byObject"/>
+      </p:transition>
+    </mc:Choice>
+    <mc:Fallback>
+      <p:transition>
+        <p:fade/>
+      </p:transition>
+    </mc:Fallback>
+  </mc:AlternateContent>
 </p:sld>
 </file>
 
@@ -6098,7 +5500,7 @@
         <p:spPr/>
         <p:txBody>
           <a:bodyPr>
-            <a:normAutofit fontScale="90000"/>
+            <a:normAutofit/>
           </a:bodyPr>
           <a:lstStyle/>
           <a:p>
@@ -6156,7 +5558,9 @@
         </p:nvSpPr>
         <p:spPr/>
         <p:txBody>
-          <a:bodyPr/>
+          <a:bodyPr>
+            <a:normAutofit/>
+          </a:bodyPr>
           <a:lstStyle/>
           <a:p>
             <a:r>
@@ -6188,6 +5592,18 @@
   <p:clrMapOvr>
     <a:masterClrMapping/>
   </p:clrMapOvr>
+  <mc:AlternateContent xmlns:mc="http://schemas.openxmlformats.org/markup-compatibility/2006">
+    <mc:Choice xmlns:p159="http://schemas.microsoft.com/office/powerpoint/2015/09/main" Requires="p159">
+      <p:transition>
+        <p159:morph option="byObject"/>
+      </p:transition>
+    </mc:Choice>
+    <mc:Fallback>
+      <p:transition>
+        <p:fade/>
+      </p:transition>
+    </mc:Fallback>
+  </mc:AlternateContent>
 </p:sld>
 </file>
 
@@ -6227,7 +5643,7 @@
         <p:spPr/>
         <p:txBody>
           <a:bodyPr>
-            <a:normAutofit fontScale="90000"/>
+            <a:normAutofit/>
           </a:bodyPr>
           <a:lstStyle/>
           <a:p>
@@ -6285,7 +5701,9 @@
         </p:nvSpPr>
         <p:spPr/>
         <p:txBody>
-          <a:bodyPr/>
+          <a:bodyPr>
+            <a:normAutofit/>
+          </a:bodyPr>
           <a:lstStyle/>
           <a:p>
             <a:r>
@@ -6317,6 +5735,18 @@
   <p:clrMapOvr>
     <a:masterClrMapping/>
   </p:clrMapOvr>
+  <mc:AlternateContent xmlns:mc="http://schemas.openxmlformats.org/markup-compatibility/2006">
+    <mc:Choice xmlns:p159="http://schemas.microsoft.com/office/powerpoint/2015/09/main" Requires="p159">
+      <p:transition>
+        <p159:morph option="byObject"/>
+      </p:transition>
+    </mc:Choice>
+    <mc:Fallback>
+      <p:transition>
+        <p:fade/>
+      </p:transition>
+    </mc:Fallback>
+  </mc:AlternateContent>
 </p:sld>
 </file>
 
@@ -6356,7 +5786,7 @@
         <p:spPr/>
         <p:txBody>
           <a:bodyPr>
-            <a:normAutofit fontScale="90000"/>
+            <a:normAutofit/>
           </a:bodyPr>
           <a:lstStyle/>
           <a:p>
@@ -6414,7 +5844,9 @@
         </p:nvSpPr>
         <p:spPr/>
         <p:txBody>
-          <a:bodyPr/>
+          <a:bodyPr>
+            <a:normAutofit/>
+          </a:bodyPr>
           <a:lstStyle/>
           <a:p>
             <a:r>
@@ -6446,6 +5878,18 @@
   <p:clrMapOvr>
     <a:masterClrMapping/>
   </p:clrMapOvr>
+  <mc:AlternateContent xmlns:mc="http://schemas.openxmlformats.org/markup-compatibility/2006">
+    <mc:Choice xmlns:p159="http://schemas.microsoft.com/office/powerpoint/2015/09/main" Requires="p159">
+      <p:transition>
+        <p159:morph option="byObject"/>
+      </p:transition>
+    </mc:Choice>
+    <mc:Fallback>
+      <p:transition>
+        <p:fade/>
+      </p:transition>
+    </mc:Fallback>
+  </mc:AlternateContent>
 </p:sld>
 </file>
 

</xml_diff>